<commit_message>
more analysis based on imdb rating and number of votes recieved
</commit_message>
<xml_diff>
--- a/Analysis of Disney Plus Competitiveness over Netflix.pptx
+++ b/Analysis of Disney Plus Competitiveness over Netflix.pptx
@@ -1004,7 +1004,7 @@
   <dgm:whole/>
   <dgm:extLst>
     <a:ext uri="http://schemas.microsoft.com/office/drawing/2008/diagram">
-      <dsp:dataModelExt xmlns:dsp="http://schemas.microsoft.com/office/drawing/2008/diagram" relId="rId6" minVer="http://schemas.openxmlformats.org/drawingml/2006/diagram"/>
+      <dsp:dataModelExt xmlns:dsp="http://schemas.microsoft.com/office/drawing/2008/diagram" relId="rId7" minVer="http://schemas.openxmlformats.org/drawingml/2006/diagram"/>
     </a:ext>
   </dgm:extLst>
 </dgm:dataModel>
@@ -2517,7 +2517,7 @@
           <a:p>
             <a:fld id="{A5C20BB3-3CCB-4FE5-991B-82F6BCB48AF3}" type="datetimeFigureOut">
               <a:rPr lang="en-US" smtClean="0"/>
-              <a:t>10/17/21</a:t>
+              <a:t>10/18/21</a:t>
             </a:fld>
             <a:endParaRPr lang="en-US"/>
           </a:p>
@@ -2828,6 +2828,342 @@
           <a:bodyPr/>
           <a:lstStyle/>
           <a:p>
+            <a:endParaRPr lang="en-US" dirty="0"/>
+          </a:p>
+        </p:txBody>
+      </p:sp>
+      <p:sp>
+        <p:nvSpPr>
+          <p:cNvPr id="4" name="Slide Number Placeholder 3"/>
+          <p:cNvSpPr>
+            <a:spLocks noGrp="1"/>
+          </p:cNvSpPr>
+          <p:nvPr>
+            <p:ph type="sldNum" sz="quarter" idx="5"/>
+          </p:nvPr>
+        </p:nvSpPr>
+        <p:spPr/>
+        <p:txBody>
+          <a:bodyPr/>
+          <a:lstStyle/>
+          <a:p>
+            <a:fld id="{E0746DE6-3336-457D-A091-FA20AC1C536E}" type="slidenum">
+              <a:rPr lang="en-US" smtClean="0"/>
+              <a:t>1</a:t>
+            </a:fld>
+            <a:endParaRPr lang="en-US"/>
+          </a:p>
+        </p:txBody>
+      </p:sp>
+    </p:spTree>
+    <p:extLst>
+      <p:ext uri="{BB962C8B-B14F-4D97-AF65-F5344CB8AC3E}">
+        <p14:creationId xmlns:p14="http://schemas.microsoft.com/office/powerpoint/2010/main" val="4191194849"/>
+      </p:ext>
+    </p:extLst>
+  </p:cSld>
+  <p:clrMapOvr>
+    <a:masterClrMapping/>
+  </p:clrMapOvr>
+</p:notes>
+</file>
+
+<file path=ppt/notesSlides/notesSlide2.xml><?xml version="1.0" encoding="utf-8"?>
+<p:notes xmlns:a="http://schemas.openxmlformats.org/drawingml/2006/main" xmlns:r="http://schemas.openxmlformats.org/officeDocument/2006/relationships" xmlns:p="http://schemas.openxmlformats.org/presentationml/2006/main">
+  <p:cSld>
+    <p:spTree>
+      <p:nvGrpSpPr>
+        <p:cNvPr id="1" name=""/>
+        <p:cNvGrpSpPr/>
+        <p:nvPr/>
+      </p:nvGrpSpPr>
+      <p:grpSpPr>
+        <a:xfrm>
+          <a:off x="0" y="0"/>
+          <a:ext cx="0" cy="0"/>
+          <a:chOff x="0" y="0"/>
+          <a:chExt cx="0" cy="0"/>
+        </a:xfrm>
+      </p:grpSpPr>
+      <p:sp>
+        <p:nvSpPr>
+          <p:cNvPr id="2" name="Slide Image Placeholder 1"/>
+          <p:cNvSpPr>
+            <a:spLocks noGrp="1" noRot="1" noChangeAspect="1"/>
+          </p:cNvSpPr>
+          <p:nvPr>
+            <p:ph type="sldImg"/>
+          </p:nvPr>
+        </p:nvSpPr>
+        <p:spPr/>
+      </p:sp>
+      <p:sp>
+        <p:nvSpPr>
+          <p:cNvPr id="3" name="Notes Placeholder 2"/>
+          <p:cNvSpPr>
+            <a:spLocks noGrp="1"/>
+          </p:cNvSpPr>
+          <p:nvPr>
+            <p:ph type="body" idx="1"/>
+          </p:nvPr>
+        </p:nvSpPr>
+        <p:spPr/>
+        <p:txBody>
+          <a:bodyPr/>
+          <a:lstStyle/>
+          <a:p>
+            <a:endParaRPr lang="en-US" dirty="0"/>
+          </a:p>
+        </p:txBody>
+      </p:sp>
+      <p:sp>
+        <p:nvSpPr>
+          <p:cNvPr id="4" name="Slide Number Placeholder 3"/>
+          <p:cNvSpPr>
+            <a:spLocks noGrp="1"/>
+          </p:cNvSpPr>
+          <p:nvPr>
+            <p:ph type="sldNum" sz="quarter" idx="5"/>
+          </p:nvPr>
+        </p:nvSpPr>
+        <p:spPr/>
+        <p:txBody>
+          <a:bodyPr/>
+          <a:lstStyle/>
+          <a:p>
+            <a:fld id="{E0746DE6-3336-457D-A091-FA20AC1C536E}" type="slidenum">
+              <a:rPr lang="en-US" smtClean="0"/>
+              <a:t>3</a:t>
+            </a:fld>
+            <a:endParaRPr lang="en-US"/>
+          </a:p>
+        </p:txBody>
+      </p:sp>
+    </p:spTree>
+    <p:extLst>
+      <p:ext uri="{BB962C8B-B14F-4D97-AF65-F5344CB8AC3E}">
+        <p14:creationId xmlns:p14="http://schemas.microsoft.com/office/powerpoint/2010/main" val="32934835"/>
+      </p:ext>
+    </p:extLst>
+  </p:cSld>
+  <p:clrMapOvr>
+    <a:masterClrMapping/>
+  </p:clrMapOvr>
+</p:notes>
+</file>
+
+<file path=ppt/notesSlides/notesSlide3.xml><?xml version="1.0" encoding="utf-8"?>
+<p:notes xmlns:a="http://schemas.openxmlformats.org/drawingml/2006/main" xmlns:r="http://schemas.openxmlformats.org/officeDocument/2006/relationships" xmlns:p="http://schemas.openxmlformats.org/presentationml/2006/main">
+  <p:cSld>
+    <p:spTree>
+      <p:nvGrpSpPr>
+        <p:cNvPr id="1" name=""/>
+        <p:cNvGrpSpPr/>
+        <p:nvPr/>
+      </p:nvGrpSpPr>
+      <p:grpSpPr>
+        <a:xfrm>
+          <a:off x="0" y="0"/>
+          <a:ext cx="0" cy="0"/>
+          <a:chOff x="0" y="0"/>
+          <a:chExt cx="0" cy="0"/>
+        </a:xfrm>
+      </p:grpSpPr>
+      <p:sp>
+        <p:nvSpPr>
+          <p:cNvPr id="2" name="Slide Image Placeholder 1"/>
+          <p:cNvSpPr>
+            <a:spLocks noGrp="1" noRot="1" noChangeAspect="1"/>
+          </p:cNvSpPr>
+          <p:nvPr>
+            <p:ph type="sldImg"/>
+          </p:nvPr>
+        </p:nvSpPr>
+        <p:spPr/>
+      </p:sp>
+      <p:sp>
+        <p:nvSpPr>
+          <p:cNvPr id="3" name="Notes Placeholder 2"/>
+          <p:cNvSpPr>
+            <a:spLocks noGrp="1"/>
+          </p:cNvSpPr>
+          <p:nvPr>
+            <p:ph type="body" idx="1"/>
+          </p:nvPr>
+        </p:nvSpPr>
+        <p:spPr/>
+        <p:txBody>
+          <a:bodyPr/>
+          <a:lstStyle/>
+          <a:p>
+            <a:endParaRPr lang="en-US" dirty="0"/>
+          </a:p>
+        </p:txBody>
+      </p:sp>
+      <p:sp>
+        <p:nvSpPr>
+          <p:cNvPr id="4" name="Slide Number Placeholder 3"/>
+          <p:cNvSpPr>
+            <a:spLocks noGrp="1"/>
+          </p:cNvSpPr>
+          <p:nvPr>
+            <p:ph type="sldNum" sz="quarter" idx="5"/>
+          </p:nvPr>
+        </p:nvSpPr>
+        <p:spPr/>
+        <p:txBody>
+          <a:bodyPr/>
+          <a:lstStyle/>
+          <a:p>
+            <a:fld id="{E0746DE6-3336-457D-A091-FA20AC1C536E}" type="slidenum">
+              <a:rPr lang="en-US" smtClean="0"/>
+              <a:t>4</a:t>
+            </a:fld>
+            <a:endParaRPr lang="en-US"/>
+          </a:p>
+        </p:txBody>
+      </p:sp>
+    </p:spTree>
+    <p:extLst>
+      <p:ext uri="{BB962C8B-B14F-4D97-AF65-F5344CB8AC3E}">
+        <p14:creationId xmlns:p14="http://schemas.microsoft.com/office/powerpoint/2010/main" val="2099555281"/>
+      </p:ext>
+    </p:extLst>
+  </p:cSld>
+  <p:clrMapOvr>
+    <a:masterClrMapping/>
+  </p:clrMapOvr>
+</p:notes>
+</file>
+
+<file path=ppt/notesSlides/notesSlide4.xml><?xml version="1.0" encoding="utf-8"?>
+<p:notes xmlns:a="http://schemas.openxmlformats.org/drawingml/2006/main" xmlns:r="http://schemas.openxmlformats.org/officeDocument/2006/relationships" xmlns:p="http://schemas.openxmlformats.org/presentationml/2006/main">
+  <p:cSld>
+    <p:spTree>
+      <p:nvGrpSpPr>
+        <p:cNvPr id="1" name=""/>
+        <p:cNvGrpSpPr/>
+        <p:nvPr/>
+      </p:nvGrpSpPr>
+      <p:grpSpPr>
+        <a:xfrm>
+          <a:off x="0" y="0"/>
+          <a:ext cx="0" cy="0"/>
+          <a:chOff x="0" y="0"/>
+          <a:chExt cx="0" cy="0"/>
+        </a:xfrm>
+      </p:grpSpPr>
+      <p:sp>
+        <p:nvSpPr>
+          <p:cNvPr id="2" name="Slide Image Placeholder 1"/>
+          <p:cNvSpPr>
+            <a:spLocks noGrp="1" noRot="1" noChangeAspect="1"/>
+          </p:cNvSpPr>
+          <p:nvPr>
+            <p:ph type="sldImg"/>
+          </p:nvPr>
+        </p:nvSpPr>
+        <p:spPr/>
+      </p:sp>
+      <p:sp>
+        <p:nvSpPr>
+          <p:cNvPr id="3" name="Notes Placeholder 2"/>
+          <p:cNvSpPr>
+            <a:spLocks noGrp="1"/>
+          </p:cNvSpPr>
+          <p:nvPr>
+            <p:ph type="body" idx="1"/>
+          </p:nvPr>
+        </p:nvSpPr>
+        <p:spPr/>
+        <p:txBody>
+          <a:bodyPr/>
+          <a:lstStyle/>
+          <a:p>
+            <a:endParaRPr lang="en-US" dirty="0"/>
+          </a:p>
+        </p:txBody>
+      </p:sp>
+      <p:sp>
+        <p:nvSpPr>
+          <p:cNvPr id="4" name="Slide Number Placeholder 3"/>
+          <p:cNvSpPr>
+            <a:spLocks noGrp="1"/>
+          </p:cNvSpPr>
+          <p:nvPr>
+            <p:ph type="sldNum" sz="quarter" idx="5"/>
+          </p:nvPr>
+        </p:nvSpPr>
+        <p:spPr/>
+        <p:txBody>
+          <a:bodyPr/>
+          <a:lstStyle/>
+          <a:p>
+            <a:fld id="{E0746DE6-3336-457D-A091-FA20AC1C536E}" type="slidenum">
+              <a:rPr lang="en-US" smtClean="0"/>
+              <a:t>7</a:t>
+            </a:fld>
+            <a:endParaRPr lang="en-US"/>
+          </a:p>
+        </p:txBody>
+      </p:sp>
+    </p:spTree>
+    <p:extLst>
+      <p:ext uri="{BB962C8B-B14F-4D97-AF65-F5344CB8AC3E}">
+        <p14:creationId xmlns:p14="http://schemas.microsoft.com/office/powerpoint/2010/main" val="2573084290"/>
+      </p:ext>
+    </p:extLst>
+  </p:cSld>
+  <p:clrMapOvr>
+    <a:masterClrMapping/>
+  </p:clrMapOvr>
+</p:notes>
+</file>
+
+<file path=ppt/notesSlides/notesSlide5.xml><?xml version="1.0" encoding="utf-8"?>
+<p:notes xmlns:a="http://schemas.openxmlformats.org/drawingml/2006/main" xmlns:r="http://schemas.openxmlformats.org/officeDocument/2006/relationships" xmlns:p="http://schemas.openxmlformats.org/presentationml/2006/main">
+  <p:cSld>
+    <p:spTree>
+      <p:nvGrpSpPr>
+        <p:cNvPr id="1" name=""/>
+        <p:cNvGrpSpPr/>
+        <p:nvPr/>
+      </p:nvGrpSpPr>
+      <p:grpSpPr>
+        <a:xfrm>
+          <a:off x="0" y="0"/>
+          <a:ext cx="0" cy="0"/>
+          <a:chOff x="0" y="0"/>
+          <a:chExt cx="0" cy="0"/>
+        </a:xfrm>
+      </p:grpSpPr>
+      <p:sp>
+        <p:nvSpPr>
+          <p:cNvPr id="2" name="Slide Image Placeholder 1"/>
+          <p:cNvSpPr>
+            <a:spLocks noGrp="1" noRot="1" noChangeAspect="1"/>
+          </p:cNvSpPr>
+          <p:nvPr>
+            <p:ph type="sldImg"/>
+          </p:nvPr>
+        </p:nvSpPr>
+        <p:spPr/>
+      </p:sp>
+      <p:sp>
+        <p:nvSpPr>
+          <p:cNvPr id="3" name="Notes Placeholder 2"/>
+          <p:cNvSpPr>
+            <a:spLocks noGrp="1"/>
+          </p:cNvSpPr>
+          <p:nvPr>
+            <p:ph type="body" idx="1"/>
+          </p:nvPr>
+        </p:nvSpPr>
+        <p:spPr/>
+        <p:txBody>
+          <a:bodyPr/>
+          <a:lstStyle/>
+          <a:p>
             <a:endParaRPr lang="en-US"/>
           </a:p>
         </p:txBody>
@@ -3236,7 +3572,7 @@
             <a:fld id="{3C633830-2244-49AE-BC4A-47F415C177C6}" type="datetimeFigureOut">
               <a:rPr lang="en-US" dirty="0"/>
               <a:pPr/>
-              <a:t>10/17/21</a:t>
+              <a:t>10/18/21</a:t>
             </a:fld>
             <a:endParaRPr lang="en-US" dirty="0"/>
           </a:p>
@@ -3484,7 +3820,7 @@
           <a:p>
             <a:fld id="{3C633830-2244-49AE-BC4A-47F415C177C6}" type="datetimeFigureOut">
               <a:rPr lang="en-US" dirty="0"/>
-              <a:t>10/17/21</a:t>
+              <a:t>10/18/21</a:t>
             </a:fld>
             <a:endParaRPr lang="en-US" dirty="0"/>
           </a:p>
@@ -3870,7 +4206,7 @@
           <a:p>
             <a:fld id="{3C633830-2244-49AE-BC4A-47F415C177C6}" type="datetimeFigureOut">
               <a:rPr lang="en-US" dirty="0"/>
-              <a:t>10/17/21</a:t>
+              <a:t>10/18/21</a:t>
             </a:fld>
             <a:endParaRPr lang="en-US" dirty="0"/>
           </a:p>
@@ -4099,7 +4435,7 @@
           <a:p>
             <a:fld id="{3C633830-2244-49AE-BC4A-47F415C177C6}" type="datetimeFigureOut">
               <a:rPr lang="en-US" dirty="0"/>
-              <a:t>10/17/21</a:t>
+              <a:t>10/18/21</a:t>
             </a:fld>
             <a:endParaRPr lang="en-US" dirty="0"/>
           </a:p>
@@ -4591,7 +4927,7 @@
             <a:fld id="{3C633830-2244-49AE-BC4A-47F415C177C6}" type="datetimeFigureOut">
               <a:rPr lang="en-US" dirty="0"/>
               <a:pPr/>
-              <a:t>10/17/21</a:t>
+              <a:t>10/18/21</a:t>
             </a:fld>
             <a:endParaRPr lang="en-US" dirty="0"/>
           </a:p>
@@ -4902,7 +5238,7 @@
           <a:p>
             <a:fld id="{3C633830-2244-49AE-BC4A-47F415C177C6}" type="datetimeFigureOut">
               <a:rPr lang="en-US" dirty="0"/>
-              <a:t>10/17/21</a:t>
+              <a:t>10/18/21</a:t>
             </a:fld>
             <a:endParaRPr lang="en-US" dirty="0"/>
           </a:p>
@@ -5293,7 +5629,7 @@
           <a:p>
             <a:fld id="{3C633830-2244-49AE-BC4A-47F415C177C6}" type="datetimeFigureOut">
               <a:rPr lang="en-US" dirty="0"/>
-              <a:t>10/17/21</a:t>
+              <a:t>10/18/21</a:t>
             </a:fld>
             <a:endParaRPr lang="en-US" dirty="0"/>
           </a:p>
@@ -5411,7 +5747,7 @@
           <a:p>
             <a:fld id="{3C633830-2244-49AE-BC4A-47F415C177C6}" type="datetimeFigureOut">
               <a:rPr lang="en-US" dirty="0"/>
-              <a:t>10/17/21</a:t>
+              <a:t>10/18/21</a:t>
             </a:fld>
             <a:endParaRPr lang="en-US" dirty="0"/>
           </a:p>
@@ -5506,7 +5842,7 @@
           <a:p>
             <a:fld id="{3C633830-2244-49AE-BC4A-47F415C177C6}" type="datetimeFigureOut">
               <a:rPr lang="en-US" dirty="0"/>
-              <a:t>10/17/21</a:t>
+              <a:t>10/18/21</a:t>
             </a:fld>
             <a:endParaRPr lang="en-US" dirty="0"/>
           </a:p>
@@ -5806,7 +6142,7 @@
           <a:p>
             <a:fld id="{3C633830-2244-49AE-BC4A-47F415C177C6}" type="datetimeFigureOut">
               <a:rPr lang="en-US" dirty="0"/>
-              <a:t>10/17/21</a:t>
+              <a:t>10/18/21</a:t>
             </a:fld>
             <a:endParaRPr lang="en-US" dirty="0"/>
           </a:p>
@@ -6071,7 +6407,7 @@
           <a:p>
             <a:fld id="{3C633830-2244-49AE-BC4A-47F415C177C6}" type="datetimeFigureOut">
               <a:rPr lang="en-US" dirty="0"/>
-              <a:t>10/17/21</a:t>
+              <a:t>10/18/21</a:t>
             </a:fld>
             <a:endParaRPr lang="en-US" dirty="0"/>
           </a:p>
@@ -6490,7 +6826,7 @@
             <a:fld id="{3C633830-2244-49AE-BC4A-47F415C177C6}" type="datetimeFigureOut">
               <a:rPr lang="en-US" dirty="0"/>
               <a:pPr/>
-              <a:t>10/17/21</a:t>
+              <a:t>10/18/21</a:t>
             </a:fld>
             <a:endParaRPr lang="en-US" dirty="0"/>
           </a:p>
@@ -7006,7 +7342,76 @@
       </p:grpSpPr>
       <p:sp>
         <p:nvSpPr>
-          <p:cNvPr id="2" name="Title 1"/>
+          <p:cNvPr id="18" name="Rectangle 12">
+            <a:extLst>
+              <a:ext uri="{FF2B5EF4-FFF2-40B4-BE49-F238E27FC236}">
+                <a16:creationId xmlns:a16="http://schemas.microsoft.com/office/drawing/2014/main" id="{BCB3501C-0BF6-4941-B958-27196AD9A396}"/>
+              </a:ext>
+              <a:ext uri="{C183D7F6-B498-43B3-948B-1728B52AA6E4}">
+                <adec:decorative xmlns:adec="http://schemas.microsoft.com/office/drawing/2017/decorative" val="1"/>
+              </a:ext>
+            </a:extLst>
+          </p:cNvPr>
+          <p:cNvSpPr>
+            <a:spLocks noGrp="1" noRot="1" noChangeAspect="1" noMove="1" noResize="1" noEditPoints="1" noAdjustHandles="1" noChangeArrowheads="1" noChangeShapeType="1" noTextEdit="1"/>
+          </p:cNvSpPr>
+          <p:nvPr>
+            <p:extLst>
+              <p:ext uri="{386F3935-93C4-4BCD-93E2-E3B085C9AB24}">
+                <p16:designElem xmlns:p16="http://schemas.microsoft.com/office/powerpoint/2015/main" val="1"/>
+              </p:ext>
+            </p:extLst>
+          </p:nvPr>
+        </p:nvSpPr>
+        <p:spPr>
+          <a:xfrm>
+            <a:off x="0" y="0"/>
+            <a:ext cx="12192000" cy="6858000"/>
+          </a:xfrm>
+          <a:prstGeom prst="rect">
+            <a:avLst/>
+          </a:prstGeom>
+          <a:solidFill>
+            <a:schemeClr val="tx1"/>
+          </a:solidFill>
+          <a:ln>
+            <a:noFill/>
+          </a:ln>
+        </p:spPr>
+        <p:style>
+          <a:lnRef idx="2">
+            <a:schemeClr val="accent1">
+              <a:shade val="50000"/>
+            </a:schemeClr>
+          </a:lnRef>
+          <a:fillRef idx="1">
+            <a:schemeClr val="accent1"/>
+          </a:fillRef>
+          <a:effectRef idx="0">
+            <a:schemeClr val="accent1"/>
+          </a:effectRef>
+          <a:fontRef idx="minor">
+            <a:schemeClr val="lt1"/>
+          </a:fontRef>
+        </p:style>
+        <p:txBody>
+          <a:bodyPr rtlCol="0" anchor="ctr"/>
+          <a:lstStyle/>
+          <a:p>
+            <a:pPr algn="ctr"/>
+            <a:endParaRPr lang="en-US"/>
+          </a:p>
+        </p:txBody>
+      </p:sp>
+      <p:sp>
+        <p:nvSpPr>
+          <p:cNvPr id="8" name="Title 7">
+            <a:extLst>
+              <a:ext uri="{FF2B5EF4-FFF2-40B4-BE49-F238E27FC236}">
+                <a16:creationId xmlns:a16="http://schemas.microsoft.com/office/drawing/2014/main" id="{D4C00582-55B2-1142-A08E-55046839A89E}"/>
+              </a:ext>
+            </a:extLst>
+          </p:cNvPr>
           <p:cNvSpPr>
             <a:spLocks noGrp="1"/>
           </p:cNvSpPr>
@@ -7016,71 +7421,8 @@
         </p:nvSpPr>
         <p:spPr>
           <a:xfrm>
-            <a:off x="7488211" y="1090707"/>
-            <a:ext cx="4345201" cy="4676588"/>
-          </a:xfrm>
-        </p:spPr>
-        <p:txBody>
-          <a:bodyPr anchor="ctr">
-            <a:normAutofit/>
-          </a:bodyPr>
-          <a:lstStyle/>
-          <a:p>
-            <a:r>
-              <a:rPr lang="en-US" sz="2000" dirty="0">
-                <a:solidFill>
-                  <a:schemeClr val="bg1"/>
-                </a:solidFill>
-              </a:rPr>
-              <a:t>How will Disney compete with Netflix? </a:t>
-            </a:r>
-          </a:p>
-        </p:txBody>
-      </p:sp>
-      <p:sp>
-        <p:nvSpPr>
-          <p:cNvPr id="3" name="Content Placeholder 2"/>
-          <p:cNvSpPr>
-            <a:spLocks noGrp="1"/>
-          </p:cNvSpPr>
-          <p:nvPr>
-            <p:ph type="subTitle" idx="1"/>
-          </p:nvPr>
-        </p:nvSpPr>
-        <p:spPr>
-          <a:xfrm>
-            <a:off x="980140" y="5345953"/>
-            <a:ext cx="5528236" cy="898327"/>
-          </a:xfrm>
-        </p:spPr>
-        <p:txBody>
-          <a:bodyPr anchor="ctr">
-            <a:normAutofit/>
-          </a:bodyPr>
-          <a:lstStyle/>
-          <a:p>
-            <a:r>
-              <a:rPr lang="en-US" sz="2400" dirty="0"/>
-              <a:t>A comparative study</a:t>
-            </a:r>
-            <a:endParaRPr sz="2400" dirty="0"/>
-          </a:p>
-        </p:txBody>
-      </p:sp>
-      <p:sp>
-        <p:nvSpPr>
-          <p:cNvPr id="5" name="Footer PlaceHolder 3"/>
-          <p:cNvSpPr>
-            <a:spLocks noGrp="1"/>
-          </p:cNvSpPr>
-          <p:nvPr>
-            <p:ph type="ftr" sz="quarter" idx="11"/>
-          </p:nvPr>
-        </p:nvSpPr>
-        <p:spPr>
-          <a:xfrm>
-            <a:off x="917583" y="6314440"/>
-            <a:ext cx="5199411" cy="365125"/>
+            <a:off x="7585348" y="1143293"/>
+            <a:ext cx="3953059" cy="4268965"/>
           </a:xfrm>
         </p:spPr>
         <p:txBody>
@@ -7089,60 +7431,423 @@
           </a:bodyPr>
           <a:lstStyle/>
           <a:p>
+            <a:r>
+              <a:rPr lang="en-US" sz="3200" dirty="0">
+                <a:solidFill>
+                  <a:schemeClr val="bg2"/>
+                </a:solidFill>
+              </a:rPr>
+              <a:t>Can Disney Movie Contents Compete with Netflix?</a:t>
+            </a:r>
+            <a:br>
+              <a:rPr lang="en-US" sz="3200" dirty="0">
+                <a:solidFill>
+                  <a:schemeClr val="bg2"/>
+                </a:solidFill>
+              </a:rPr>
+            </a:br>
+            <a:endParaRPr lang="en-US" sz="3200" dirty="0">
+              <a:solidFill>
+                <a:schemeClr val="bg2"/>
+              </a:solidFill>
+            </a:endParaRPr>
+          </a:p>
+        </p:txBody>
+      </p:sp>
+      <p:sp>
+        <p:nvSpPr>
+          <p:cNvPr id="3" name="Content Placeholder 2"/>
+          <p:cNvSpPr>
+            <a:spLocks noGrp="1"/>
+          </p:cNvSpPr>
+          <p:nvPr>
+            <p:ph type="subTitle" idx="1"/>
+          </p:nvPr>
+        </p:nvSpPr>
+        <p:spPr>
+          <a:xfrm>
+            <a:off x="8188390" y="5537925"/>
+            <a:ext cx="3350017" cy="706355"/>
+          </a:xfrm>
+        </p:spPr>
+        <p:txBody>
+          <a:bodyPr>
+            <a:normAutofit/>
+          </a:bodyPr>
+          <a:lstStyle/>
+          <a:p>
             <a:pPr>
               <a:spcAft>
                 <a:spcPts val="600"/>
               </a:spcAft>
             </a:pPr>
             <a:r>
-              <a:rPr lang="en-US" dirty="0">
-                <a:hlinkClick r:id="rId2"/>
+              <a:rPr lang="en-US">
+                <a:solidFill>
+                  <a:schemeClr val="bg2"/>
+                </a:solidFill>
               </a:rPr>
-              <a:t>Photo</a:t>
-            </a:r>
-            <a:r>
-              <a:rPr lang="en-US" dirty="0"/>
-              <a:t> by NathaliFranco / </a:t>
-            </a:r>
-            <a:r>
-              <a:rPr lang="en-US" dirty="0">
-                <a:hlinkClick r:id="rId3"/>
-              </a:rPr>
-              <a:t>CC BY-SA 4.0</a:t>
+              <a:t>A comparative study</a:t>
             </a:r>
           </a:p>
         </p:txBody>
       </p:sp>
+      <p:sp useBgFill="1">
+        <p:nvSpPr>
+          <p:cNvPr id="20" name="Rectangle 14">
+            <a:extLst>
+              <a:ext uri="{FF2B5EF4-FFF2-40B4-BE49-F238E27FC236}">
+                <a16:creationId xmlns:a16="http://schemas.microsoft.com/office/drawing/2014/main" id="{5D42485B-30FD-4C7E-978A-3962892E3306}"/>
+              </a:ext>
+              <a:ext uri="{C183D7F6-B498-43B3-948B-1728B52AA6E4}">
+                <adec:decorative xmlns:adec="http://schemas.microsoft.com/office/drawing/2017/decorative" val="1"/>
+              </a:ext>
+            </a:extLst>
+          </p:cNvPr>
+          <p:cNvSpPr>
+            <a:spLocks noGrp="1" noRot="1" noChangeAspect="1" noMove="1" noResize="1" noEditPoints="1" noAdjustHandles="1" noChangeArrowheads="1" noChangeShapeType="1" noTextEdit="1"/>
+          </p:cNvSpPr>
+          <p:nvPr>
+            <p:extLst>
+              <p:ext uri="{386F3935-93C4-4BCD-93E2-E3B085C9AB24}">
+                <p16:designElem xmlns:p16="http://schemas.microsoft.com/office/powerpoint/2015/main" val="1"/>
+              </p:ext>
+            </p:extLst>
+          </p:nvPr>
+        </p:nvSpPr>
+        <p:spPr>
+          <a:xfrm>
+            <a:off x="0" y="0"/>
+            <a:ext cx="7552578" cy="6858000"/>
+          </a:xfrm>
+          <a:prstGeom prst="rect">
+            <a:avLst/>
+          </a:prstGeom>
+          <a:ln>
+            <a:noFill/>
+          </a:ln>
+        </p:spPr>
+        <p:style>
+          <a:lnRef idx="2">
+            <a:schemeClr val="accent1">
+              <a:shade val="50000"/>
+            </a:schemeClr>
+          </a:lnRef>
+          <a:fillRef idx="1">
+            <a:schemeClr val="accent1"/>
+          </a:fillRef>
+          <a:effectRef idx="0">
+            <a:schemeClr val="accent1"/>
+          </a:effectRef>
+          <a:fontRef idx="minor">
+            <a:schemeClr val="lt1"/>
+          </a:fontRef>
+        </p:style>
+        <p:txBody>
+          <a:bodyPr rtlCol="0" anchor="ctr"/>
+          <a:lstStyle/>
+          <a:p>
+            <a:pPr algn="ctr"/>
+            <a:endParaRPr lang="en-US"/>
+          </a:p>
+        </p:txBody>
+      </p:sp>
+      <p:cxnSp>
+        <p:nvCxnSpPr>
+          <p:cNvPr id="17" name="Straight Connector 16">
+            <a:extLst>
+              <a:ext uri="{FF2B5EF4-FFF2-40B4-BE49-F238E27FC236}">
+                <a16:creationId xmlns:a16="http://schemas.microsoft.com/office/drawing/2014/main" id="{703E6347-0C1B-4131-8BB1-F198DEFDF82C}"/>
+              </a:ext>
+              <a:ext uri="{C183D7F6-B498-43B3-948B-1728B52AA6E4}">
+                <adec:decorative xmlns:adec="http://schemas.microsoft.com/office/drawing/2017/decorative" val="1"/>
+              </a:ext>
+            </a:extLst>
+          </p:cNvPr>
+          <p:cNvCxnSpPr>
+            <a:cxnSpLocks noGrp="1" noRot="1" noChangeAspect="1" noMove="1" noResize="1" noEditPoints="1" noAdjustHandles="1" noChangeArrowheads="1" noChangeShapeType="1"/>
+          </p:cNvCxnSpPr>
+          <p:nvPr>
+            <p:extLst>
+              <p:ext uri="{386F3935-93C4-4BCD-93E2-E3B085C9AB24}">
+                <p16:designElem xmlns:p16="http://schemas.microsoft.com/office/powerpoint/2015/main" val="1"/>
+              </p:ext>
+            </p:extLst>
+          </p:nvPr>
+        </p:nvCxnSpPr>
+        <p:spPr>
+          <a:xfrm>
+            <a:off x="773855" y="1257300"/>
+            <a:ext cx="0" cy="5600700"/>
+          </a:xfrm>
+          <a:prstGeom prst="line">
+            <a:avLst/>
+          </a:prstGeom>
+          <a:ln w="25400">
+            <a:solidFill>
+              <a:schemeClr val="tx2"/>
+            </a:solidFill>
+          </a:ln>
+        </p:spPr>
+        <p:style>
+          <a:lnRef idx="1">
+            <a:schemeClr val="accent1"/>
+          </a:lnRef>
+          <a:fillRef idx="0">
+            <a:schemeClr val="accent1"/>
+          </a:fillRef>
+          <a:effectRef idx="0">
+            <a:schemeClr val="accent1"/>
+          </a:effectRef>
+          <a:fontRef idx="minor">
+            <a:schemeClr val="tx1"/>
+          </a:fontRef>
+        </p:style>
+      </p:cxnSp>
       <p:pic>
         <p:nvPicPr>
-          <p:cNvPr id="4" name="Picture 3" descr="Investigación de mercados"/>
+          <p:cNvPr id="7" name="Picture 6" descr="A picture containing logo&#10;&#10;Description automatically generated">
+            <a:extLst>
+              <a:ext uri="{FF2B5EF4-FFF2-40B4-BE49-F238E27FC236}">
+                <a16:creationId xmlns:a16="http://schemas.microsoft.com/office/drawing/2014/main" id="{32F31F66-1CA0-3847-9E8C-F8B48A69D72C}"/>
+              </a:ext>
+            </a:extLst>
+          </p:cNvPr>
           <p:cNvPicPr>
             <a:picLocks noChangeAspect="1"/>
           </p:cNvPicPr>
           <p:nvPr/>
         </p:nvPicPr>
         <p:blipFill>
-          <a:blip r:embed="rId4">
-            <a:extLst>
-              <a:ext uri="{28A0092B-C50C-407E-A947-70E740481C1C}">
-                <a14:useLocalDpi xmlns:a14="http://schemas.microsoft.com/office/drawing/2010/main" val="0"/>
-              </a:ext>
-            </a:extLst>
-          </a:blip>
+          <a:blip r:embed="rId3"/>
           <a:stretch>
             <a:fillRect/>
           </a:stretch>
         </p:blipFill>
         <p:spPr>
           <a:xfrm>
-            <a:off x="1022425" y="1324538"/>
-            <a:ext cx="5234940" cy="3533584"/>
+            <a:off x="1128096" y="1940418"/>
+            <a:ext cx="6103012" cy="3463458"/>
           </a:xfrm>
           <a:prstGeom prst="rect">
             <a:avLst/>
           </a:prstGeom>
         </p:spPr>
       </p:pic>
+      <p:sp>
+        <p:nvSpPr>
+          <p:cNvPr id="19" name="Freeform 6">
+            <a:extLst>
+              <a:ext uri="{FF2B5EF4-FFF2-40B4-BE49-F238E27FC236}">
+                <a16:creationId xmlns:a16="http://schemas.microsoft.com/office/drawing/2014/main" id="{97E55B52-5304-40DB-BE2D-8EEB104CA2BC}"/>
+              </a:ext>
+              <a:ext uri="{C183D7F6-B498-43B3-948B-1728B52AA6E4}">
+                <adec:decorative xmlns:adec="http://schemas.microsoft.com/office/drawing/2017/decorative" val="1"/>
+              </a:ext>
+            </a:extLst>
+          </p:cNvPr>
+          <p:cNvSpPr>
+            <a:spLocks noGrp="1" noRot="1" noChangeAspect="1" noMove="1" noResize="1" noEditPoints="1" noAdjustHandles="1" noChangeArrowheads="1" noChangeShapeType="1" noTextEdit="1"/>
+          </p:cNvSpPr>
+          <p:nvPr>
+            <p:extLst>
+              <p:ext uri="{386F3935-93C4-4BCD-93E2-E3B085C9AB24}">
+                <p16:designElem xmlns:p16="http://schemas.microsoft.com/office/powerpoint/2015/main" val="1"/>
+              </p:ext>
+            </p:extLst>
+          </p:nvPr>
+        </p:nvSpPr>
+        <p:spPr bwMode="auto">
+          <a:xfrm>
+            <a:off x="11784011" y="1189204"/>
+            <a:ext cx="407988" cy="819150"/>
+          </a:xfrm>
+          <a:custGeom>
+            <a:avLst/>
+            <a:gdLst/>
+            <a:ahLst/>
+            <a:cxnLst/>
+            <a:rect l="0" t="0" r="r" b="b"/>
+            <a:pathLst>
+              <a:path w="1799" h="3612">
+                <a:moveTo>
+                  <a:pt x="1799" y="0"/>
+                </a:moveTo>
+                <a:lnTo>
+                  <a:pt x="1799" y="3612"/>
+                </a:lnTo>
+                <a:lnTo>
+                  <a:pt x="1686" y="3609"/>
+                </a:lnTo>
+                <a:lnTo>
+                  <a:pt x="1574" y="3598"/>
+                </a:lnTo>
+                <a:lnTo>
+                  <a:pt x="1464" y="3581"/>
+                </a:lnTo>
+                <a:lnTo>
+                  <a:pt x="1357" y="3557"/>
+                </a:lnTo>
+                <a:lnTo>
+                  <a:pt x="1251" y="3527"/>
+                </a:lnTo>
+                <a:lnTo>
+                  <a:pt x="1150" y="3490"/>
+                </a:lnTo>
+                <a:lnTo>
+                  <a:pt x="1050" y="3448"/>
+                </a:lnTo>
+                <a:lnTo>
+                  <a:pt x="953" y="3401"/>
+                </a:lnTo>
+                <a:lnTo>
+                  <a:pt x="860" y="3347"/>
+                </a:lnTo>
+                <a:lnTo>
+                  <a:pt x="771" y="3289"/>
+                </a:lnTo>
+                <a:lnTo>
+                  <a:pt x="686" y="3224"/>
+                </a:lnTo>
+                <a:lnTo>
+                  <a:pt x="604" y="3156"/>
+                </a:lnTo>
+                <a:lnTo>
+                  <a:pt x="527" y="3083"/>
+                </a:lnTo>
+                <a:lnTo>
+                  <a:pt x="454" y="3005"/>
+                </a:lnTo>
+                <a:lnTo>
+                  <a:pt x="386" y="2923"/>
+                </a:lnTo>
+                <a:lnTo>
+                  <a:pt x="323" y="2838"/>
+                </a:lnTo>
+                <a:lnTo>
+                  <a:pt x="265" y="2748"/>
+                </a:lnTo>
+                <a:lnTo>
+                  <a:pt x="211" y="2655"/>
+                </a:lnTo>
+                <a:lnTo>
+                  <a:pt x="163" y="2559"/>
+                </a:lnTo>
+                <a:lnTo>
+                  <a:pt x="121" y="2459"/>
+                </a:lnTo>
+                <a:lnTo>
+                  <a:pt x="85" y="2356"/>
+                </a:lnTo>
+                <a:lnTo>
+                  <a:pt x="55" y="2251"/>
+                </a:lnTo>
+                <a:lnTo>
+                  <a:pt x="32" y="2143"/>
+                </a:lnTo>
+                <a:lnTo>
+                  <a:pt x="14" y="2033"/>
+                </a:lnTo>
+                <a:lnTo>
+                  <a:pt x="4" y="1920"/>
+                </a:lnTo>
+                <a:lnTo>
+                  <a:pt x="0" y="1806"/>
+                </a:lnTo>
+                <a:lnTo>
+                  <a:pt x="4" y="1692"/>
+                </a:lnTo>
+                <a:lnTo>
+                  <a:pt x="14" y="1580"/>
+                </a:lnTo>
+                <a:lnTo>
+                  <a:pt x="32" y="1469"/>
+                </a:lnTo>
+                <a:lnTo>
+                  <a:pt x="55" y="1362"/>
+                </a:lnTo>
+                <a:lnTo>
+                  <a:pt x="85" y="1256"/>
+                </a:lnTo>
+                <a:lnTo>
+                  <a:pt x="121" y="1154"/>
+                </a:lnTo>
+                <a:lnTo>
+                  <a:pt x="163" y="1054"/>
+                </a:lnTo>
+                <a:lnTo>
+                  <a:pt x="211" y="958"/>
+                </a:lnTo>
+                <a:lnTo>
+                  <a:pt x="265" y="864"/>
+                </a:lnTo>
+                <a:lnTo>
+                  <a:pt x="323" y="774"/>
+                </a:lnTo>
+                <a:lnTo>
+                  <a:pt x="386" y="689"/>
+                </a:lnTo>
+                <a:lnTo>
+                  <a:pt x="454" y="607"/>
+                </a:lnTo>
+                <a:lnTo>
+                  <a:pt x="527" y="529"/>
+                </a:lnTo>
+                <a:lnTo>
+                  <a:pt x="604" y="456"/>
+                </a:lnTo>
+                <a:lnTo>
+                  <a:pt x="686" y="388"/>
+                </a:lnTo>
+                <a:lnTo>
+                  <a:pt x="771" y="325"/>
+                </a:lnTo>
+                <a:lnTo>
+                  <a:pt x="860" y="266"/>
+                </a:lnTo>
+                <a:lnTo>
+                  <a:pt x="953" y="212"/>
+                </a:lnTo>
+                <a:lnTo>
+                  <a:pt x="1050" y="164"/>
+                </a:lnTo>
+                <a:lnTo>
+                  <a:pt x="1150" y="122"/>
+                </a:lnTo>
+                <a:lnTo>
+                  <a:pt x="1251" y="85"/>
+                </a:lnTo>
+                <a:lnTo>
+                  <a:pt x="1357" y="55"/>
+                </a:lnTo>
+                <a:lnTo>
+                  <a:pt x="1464" y="32"/>
+                </a:lnTo>
+                <a:lnTo>
+                  <a:pt x="1574" y="14"/>
+                </a:lnTo>
+                <a:lnTo>
+                  <a:pt x="1686" y="5"/>
+                </a:lnTo>
+                <a:lnTo>
+                  <a:pt x="1799" y="0"/>
+                </a:lnTo>
+                <a:close/>
+              </a:path>
+            </a:pathLst>
+          </a:custGeom>
+          <a:solidFill>
+            <a:schemeClr val="bg2"/>
+          </a:solidFill>
+          <a:ln w="0">
+            <a:noFill/>
+            <a:prstDash val="solid"/>
+            <a:round/>
+            <a:headEnd/>
+            <a:tailEnd/>
+          </a:ln>
+        </p:spPr>
+      </p:sp>
     </p:spTree>
     <p:extLst>
       <p:ext uri="{BB962C8B-B14F-4D97-AF65-F5344CB8AC3E}">
@@ -7368,7 +8073,7 @@
         </p:xfrm>
         <a:graphic>
           <a:graphicData uri="http://schemas.openxmlformats.org/drawingml/2006/diagram">
-            <dgm:relIds xmlns:dgm="http://schemas.openxmlformats.org/drawingml/2006/diagram" xmlns:r="http://schemas.openxmlformats.org/officeDocument/2006/relationships" r:dm="rId2" r:lo="rId3" r:qs="rId4" r:cs="rId5"/>
+            <dgm:relIds xmlns:dgm="http://schemas.openxmlformats.org/drawingml/2006/diagram" xmlns:r="http://schemas.openxmlformats.org/officeDocument/2006/relationships" r:dm="rId3" r:lo="rId4" r:qs="rId5" r:cs="rId6"/>
           </a:graphicData>
         </a:graphic>
       </p:graphicFrame>
@@ -7387,15 +8092,15 @@
           <p:nvPr/>
         </p:nvPicPr>
         <p:blipFill>
-          <a:blip r:embed="rId7"/>
+          <a:blip r:embed="rId8"/>
           <a:stretch>
             <a:fillRect/>
           </a:stretch>
         </p:blipFill>
         <p:spPr>
           <a:xfrm>
-            <a:off x="6066618" y="559678"/>
-            <a:ext cx="4010167" cy="2335922"/>
+            <a:off x="5486400" y="221701"/>
+            <a:ext cx="5872805" cy="3420909"/>
           </a:xfrm>
           <a:prstGeom prst="rect">
             <a:avLst/>
@@ -7570,7 +8275,7 @@
                   <a:schemeClr val="bg1"/>
                 </a:solidFill>
               </a:rPr>
-              <a:t>How do the movies in Disney’s top most produced genres perform in terms of ratings as compared with Netflix’ movies of the same genres? </a:t>
+              <a:t>How do the movies in Disney movies perform in terms of ratings as compared with Netflix’ movies of the same genres? </a:t>
             </a:r>
           </a:p>
           <a:p>
@@ -7601,9 +8306,9 @@
           </a:p>
         </p:txBody>
       </p:sp>
-      <mc:AlternateContent xmlns:mc="http://schemas.openxmlformats.org/markup-compatibility/2006">
-        <mc:Choice xmlns:p14="http://schemas.microsoft.com/office/powerpoint/2010/main" Requires="p14">
-          <p:contentPart p14:bwMode="auto" r:id="rId2">
+      <mc:AlternateContent xmlns:mc="http://schemas.openxmlformats.org/markup-compatibility/2006" xmlns:p14="http://schemas.microsoft.com/office/powerpoint/2010/main">
+        <mc:Choice Requires="p14">
+          <p:contentPart p14:bwMode="auto" r:id="rId3">
             <p14:nvContentPartPr>
               <p14:cNvPr id="6" name="Ink 5">
                 <a:extLst>
@@ -7621,7 +8326,7 @@
             </p14:xfrm>
           </p:contentPart>
         </mc:Choice>
-        <mc:Fallback>
+        <mc:Fallback xmlns="">
           <p:pic>
             <p:nvPicPr>
               <p:cNvPr id="6" name="Ink 5">
@@ -7635,7 +8340,7 @@
               <p:nvPr/>
             </p:nvPicPr>
             <p:blipFill>
-              <a:blip r:embed="rId3"/>
+              <a:blip r:embed="rId4"/>
               <a:stretch>
                 <a:fillRect/>
               </a:stretch>
@@ -7652,58 +8357,6 @@
           </p:pic>
         </mc:Fallback>
       </mc:AlternateContent>
-      <p:sp>
-        <p:nvSpPr>
-          <p:cNvPr id="8" name="Rectangle 7">
-            <a:extLst>
-              <a:ext uri="{FF2B5EF4-FFF2-40B4-BE49-F238E27FC236}">
-                <a16:creationId xmlns:a16="http://schemas.microsoft.com/office/drawing/2014/main" id="{295B56E6-06D0-E94C-A5FC-C5EBB10F9E50}"/>
-              </a:ext>
-            </a:extLst>
-          </p:cNvPr>
-          <p:cNvSpPr/>
-          <p:nvPr/>
-        </p:nvSpPr>
-        <p:spPr>
-          <a:xfrm>
-            <a:off x="3444240" y="1300477"/>
-            <a:ext cx="3352800" cy="3652523"/>
-          </a:xfrm>
-          <a:prstGeom prst="rect">
-            <a:avLst/>
-          </a:prstGeom>
-          <a:noFill/>
-          <a:ln>
-            <a:solidFill>
-              <a:srgbClr val="FFFF00"/>
-            </a:solidFill>
-          </a:ln>
-        </p:spPr>
-        <p:style>
-          <a:lnRef idx="2">
-            <a:schemeClr val="accent1">
-              <a:shade val="50000"/>
-            </a:schemeClr>
-          </a:lnRef>
-          <a:fillRef idx="1">
-            <a:schemeClr val="accent1"/>
-          </a:fillRef>
-          <a:effectRef idx="0">
-            <a:schemeClr val="accent1"/>
-          </a:effectRef>
-          <a:fontRef idx="minor">
-            <a:schemeClr val="lt1"/>
-          </a:fontRef>
-        </p:style>
-        <p:txBody>
-          <a:bodyPr rtlCol="0" anchor="ctr"/>
-          <a:lstStyle/>
-          <a:p>
-            <a:pPr algn="ctr"/>
-            <a:endParaRPr lang="en-US"/>
-          </a:p>
-        </p:txBody>
-      </p:sp>
       <p:pic>
         <p:nvPicPr>
           <p:cNvPr id="12" name="Picture 11" descr="Chart, bar chart&#10;&#10;Description automatically generated">
@@ -7719,14 +8372,14 @@
           <p:nvPr/>
         </p:nvPicPr>
         <p:blipFill>
-          <a:blip r:embed="rId4"/>
+          <a:blip r:embed="rId5"/>
           <a:stretch>
             <a:fillRect/>
           </a:stretch>
         </p:blipFill>
         <p:spPr>
           <a:xfrm>
-            <a:off x="349980" y="778100"/>
+            <a:off x="401096" y="663373"/>
             <a:ext cx="7471522" cy="5436437"/>
           </a:xfrm>
           <a:prstGeom prst="rect">
@@ -7734,58 +8387,6 @@
           </a:prstGeom>
         </p:spPr>
       </p:pic>
-      <p:sp>
-        <p:nvSpPr>
-          <p:cNvPr id="14" name="Rounded Rectangle 13">
-            <a:extLst>
-              <a:ext uri="{FF2B5EF4-FFF2-40B4-BE49-F238E27FC236}">
-                <a16:creationId xmlns:a16="http://schemas.microsoft.com/office/drawing/2014/main" id="{2AE0FC5A-47BF-834D-813A-F3C23004E534}"/>
-              </a:ext>
-            </a:extLst>
-          </p:cNvPr>
-          <p:cNvSpPr/>
-          <p:nvPr/>
-        </p:nvSpPr>
-        <p:spPr>
-          <a:xfrm>
-            <a:off x="3337560" y="1188720"/>
-            <a:ext cx="3642360" cy="4373880"/>
-          </a:xfrm>
-          <a:prstGeom prst="roundRect">
-            <a:avLst/>
-          </a:prstGeom>
-          <a:noFill/>
-          <a:ln w="57150">
-            <a:solidFill>
-              <a:srgbClr val="FF0000"/>
-            </a:solidFill>
-          </a:ln>
-        </p:spPr>
-        <p:style>
-          <a:lnRef idx="2">
-            <a:schemeClr val="accent1">
-              <a:shade val="50000"/>
-            </a:schemeClr>
-          </a:lnRef>
-          <a:fillRef idx="1">
-            <a:schemeClr val="accent1"/>
-          </a:fillRef>
-          <a:effectRef idx="0">
-            <a:schemeClr val="accent1"/>
-          </a:effectRef>
-          <a:fontRef idx="minor">
-            <a:schemeClr val="lt1"/>
-          </a:fontRef>
-        </p:style>
-        <p:txBody>
-          <a:bodyPr rtlCol="0" anchor="ctr"/>
-          <a:lstStyle/>
-          <a:p>
-            <a:pPr algn="ctr"/>
-            <a:endParaRPr lang="en-US"/>
-          </a:p>
-        </p:txBody>
-      </p:sp>
     </p:spTree>
     <p:extLst>
       <p:ext uri="{BB962C8B-B14F-4D97-AF65-F5344CB8AC3E}">
@@ -7796,6 +8397,84 @@
   <p:clrMapOvr>
     <a:masterClrMapping/>
   </p:clrMapOvr>
+  <p:timing>
+    <p:tnLst>
+      <p:par>
+        <p:cTn id="1" dur="indefinite" restart="never" nodeType="tmRoot">
+          <p:childTnLst>
+            <p:seq concurrent="1" nextAc="seek">
+              <p:cTn id="2" restart="whenNotActive" fill="hold" evtFilter="cancelBubble" nodeType="interactiveSeq">
+                <p:stCondLst>
+                  <p:cond evt="onClick" delay="0">
+                    <p:tgtEl>
+                      <p:spTgt spid="12"/>
+                    </p:tgtEl>
+                  </p:cond>
+                </p:stCondLst>
+                <p:endSync evt="end" delay="0">
+                  <p:rtn val="all"/>
+                </p:endSync>
+                <p:childTnLst>
+                  <p:par>
+                    <p:cTn id="3" fill="hold">
+                      <p:stCondLst>
+                        <p:cond delay="0"/>
+                      </p:stCondLst>
+                      <p:childTnLst>
+                        <p:par>
+                          <p:cTn id="4" fill="hold">
+                            <p:stCondLst>
+                              <p:cond delay="0"/>
+                            </p:stCondLst>
+                            <p:childTnLst>
+                              <p:par>
+                                <p:cTn id="5" presetID="1" presetClass="entr" presetSubtype="0" fill="hold" nodeType="clickEffect">
+                                  <p:stCondLst>
+                                    <p:cond delay="0"/>
+                                  </p:stCondLst>
+                                  <p:childTnLst>
+                                    <p:set>
+                                      <p:cBhvr>
+                                        <p:cTn id="6" dur="1" fill="hold">
+                                          <p:stCondLst>
+                                            <p:cond delay="0"/>
+                                          </p:stCondLst>
+                                        </p:cTn>
+                                        <p:tgtEl>
+                                          <p:spTgt spid="12"/>
+                                        </p:tgtEl>
+                                        <p:attrNameLst>
+                                          <p:attrName>style.visibility</p:attrName>
+                                        </p:attrNameLst>
+                                      </p:cBhvr>
+                                      <p:to>
+                                        <p:strVal val="visible"/>
+                                      </p:to>
+                                    </p:set>
+                                  </p:childTnLst>
+                                </p:cTn>
+                              </p:par>
+                            </p:childTnLst>
+                          </p:cTn>
+                        </p:par>
+                      </p:childTnLst>
+                    </p:cTn>
+                  </p:par>
+                </p:childTnLst>
+              </p:cTn>
+              <p:nextCondLst>
+                <p:cond evt="onClick" delay="0">
+                  <p:tgtEl>
+                    <p:spTgt spid="12"/>
+                  </p:tgtEl>
+                </p:cond>
+              </p:nextCondLst>
+            </p:seq>
+          </p:childTnLst>
+        </p:cTn>
+      </p:par>
+    </p:tnLst>
+  </p:timing>
 </p:sld>
 </file>
 
@@ -7836,17 +8515,32 @@
         </p:nvSpPr>
         <p:spPr>
           <a:xfrm>
-            <a:off x="643467" y="643466"/>
-            <a:ext cx="3933390" cy="4937287"/>
+            <a:off x="643466" y="643467"/>
+            <a:ext cx="8648451" cy="1750109"/>
           </a:xfrm>
         </p:spPr>
         <p:txBody>
           <a:bodyPr anchor="ctr">
-            <a:normAutofit/>
+            <a:normAutofit fontScale="90000"/>
           </a:bodyPr>
           <a:lstStyle/>
           <a:p>
             <a:pPr algn="l"/>
+            <a:r>
+              <a:rPr lang="en-US" sz="3400" dirty="0">
+                <a:solidFill>
+                  <a:schemeClr val="tx1"/>
+                </a:solidFill>
+              </a:rPr>
+              <a:t>Ratings of the top 5 genres with the most movies, compared with Netflix: </a:t>
+            </a:r>
+            <a:br>
+              <a:rPr lang="en-US" sz="3400" dirty="0">
+                <a:solidFill>
+                  <a:schemeClr val="tx1"/>
+                </a:solidFill>
+              </a:rPr>
+            </a:br>
             <a:r>
               <a:rPr lang="en-US" sz="3400" dirty="0">
                 <a:solidFill>
@@ -7897,8 +8591,8 @@
         </p:blipFill>
         <p:spPr>
           <a:xfrm>
-            <a:off x="5784576" y="270604"/>
-            <a:ext cx="2395494" cy="2970910"/>
+            <a:off x="643467" y="3511461"/>
+            <a:ext cx="1939389" cy="2405245"/>
           </a:xfrm>
         </p:spPr>
       </p:pic>
@@ -7924,8 +8618,8 @@
         </p:blipFill>
         <p:spPr>
           <a:xfrm>
-            <a:off x="8649301" y="270604"/>
-            <a:ext cx="2395494" cy="2938990"/>
+            <a:off x="2614154" y="3511461"/>
+            <a:ext cx="1962703" cy="2408006"/>
           </a:xfrm>
           <a:prstGeom prst="rect">
             <a:avLst/>
@@ -7954,8 +8648,8 @@
         </p:blipFill>
         <p:spPr>
           <a:xfrm>
-            <a:off x="4541520" y="3557547"/>
-            <a:ext cx="2206682" cy="2984419"/>
+            <a:off x="4599464" y="3508700"/>
+            <a:ext cx="1911130" cy="2408006"/>
           </a:xfrm>
           <a:prstGeom prst="rect">
             <a:avLst/>
@@ -7984,8 +8678,8 @@
         </p:blipFill>
         <p:spPr>
           <a:xfrm>
-            <a:off x="7004643" y="3580262"/>
-            <a:ext cx="2323104" cy="2984419"/>
+            <a:off x="6510594" y="3508700"/>
+            <a:ext cx="1936458" cy="2408007"/>
           </a:xfrm>
           <a:prstGeom prst="rect">
             <a:avLst/>
@@ -8014,8 +8708,8 @@
         </p:blipFill>
         <p:spPr>
           <a:xfrm>
-            <a:off x="9510628" y="3602977"/>
-            <a:ext cx="2437532" cy="2938990"/>
+            <a:off x="8461318" y="3508699"/>
+            <a:ext cx="2070525" cy="2408007"/>
           </a:xfrm>
           <a:prstGeom prst="rect">
             <a:avLst/>
@@ -8666,8 +9360,8 @@
         </p:blipFill>
         <p:spPr>
           <a:xfrm>
-            <a:off x="1128095" y="1603945"/>
-            <a:ext cx="2949431" cy="1526330"/>
+            <a:off x="809043" y="1438835"/>
+            <a:ext cx="3268484" cy="1691440"/>
           </a:xfrm>
           <a:prstGeom prst="rect">
             <a:avLst/>
@@ -9042,7 +9736,11 @@
           <a:p>
             <a:pPr algn="l"/>
             <a:r>
-              <a:rPr lang="en-US" sz="3100" dirty="0"/>
+              <a:rPr lang="en-US" sz="3100" dirty="0">
+                <a:solidFill>
+                  <a:schemeClr val="bg1"/>
+                </a:solidFill>
+              </a:rPr>
               <a:t>How did Disney Plus grow its movie contents since its launch?</a:t>
             </a:r>
           </a:p>
@@ -9095,7 +9793,7 @@
           <p:nvPr/>
         </p:nvPicPr>
         <p:blipFill>
-          <a:blip r:embed="rId2"/>
+          <a:blip r:embed="rId3"/>
           <a:stretch>
             <a:fillRect/>
           </a:stretch>
@@ -9209,7 +9907,15 @@
             </a:pPr>
             <a:r>
               <a:rPr lang="en-US" dirty="0"/>
-              <a:t>Integrate other measurements of evaluating the health of the network: </a:t>
+              <a:t>Integrate other metrics </a:t>
+            </a:r>
+            <a:r>
+              <a:rPr lang="en-US"/>
+              <a:t>to evaluate </a:t>
+            </a:r>
+            <a:r>
+              <a:rPr lang="en-US" dirty="0"/>
+              <a:t>the health of the network: </a:t>
             </a:r>
           </a:p>
           <a:p>

</xml_diff>

<commit_message>
Analysis of further research
</commit_message>
<xml_diff>
--- a/Analysis of Disney Plus Competitiveness over Netflix.pptx
+++ b/Analysis of Disney Plus Competitiveness over Netflix.pptx
@@ -5,18 +5,22 @@
     <p:sldMasterId id="2147483648" r:id="rId1"/>
   </p:sldMasterIdLst>
   <p:notesMasterIdLst>
-    <p:notesMasterId r:id="rId11"/>
+    <p:notesMasterId r:id="rId15"/>
   </p:notesMasterIdLst>
   <p:sldIdLst>
     <p:sldId id="258" r:id="rId2"/>
     <p:sldId id="259" r:id="rId3"/>
     <p:sldId id="266" r:id="rId4"/>
     <p:sldId id="260" r:id="rId5"/>
-    <p:sldId id="261" r:id="rId6"/>
-    <p:sldId id="267" r:id="rId7"/>
-    <p:sldId id="263" r:id="rId8"/>
-    <p:sldId id="262" r:id="rId9"/>
-    <p:sldId id="264" r:id="rId10"/>
+    <p:sldId id="270" r:id="rId6"/>
+    <p:sldId id="261" r:id="rId7"/>
+    <p:sldId id="267" r:id="rId8"/>
+    <p:sldId id="268" r:id="rId9"/>
+    <p:sldId id="263" r:id="rId10"/>
+    <p:sldId id="271" r:id="rId11"/>
+    <p:sldId id="269" r:id="rId12"/>
+    <p:sldId id="262" r:id="rId13"/>
+    <p:sldId id="264" r:id="rId14"/>
   </p:sldIdLst>
   <p:sldSz cx="12192000" cy="6858000"/>
   <p:notesSz cx="6858000" cy="9144000"/>
@@ -896,7 +900,7 @@
         <a:lstStyle/>
         <a:p>
           <a:r>
-            <a:rPr lang="en-US"/>
+            <a:rPr lang="en-US" dirty="0"/>
             <a:t>Disney entered the streaming market in October 2019.</a:t>
           </a:r>
         </a:p>
@@ -1109,7 +1113,7 @@
             <a:buNone/>
           </a:pPr>
           <a:r>
-            <a:rPr lang="en-US" sz="2400" kern="1200"/>
+            <a:rPr lang="en-US" sz="2400" kern="1200" dirty="0"/>
             <a:t>Disney entered the streaming market in October 2019.</a:t>
           </a:r>
         </a:p>
@@ -2912,7 +2916,45 @@
           <a:bodyPr/>
           <a:lstStyle/>
           <a:p>
+            <a:r>
+              <a:rPr lang="en-US" dirty="0"/>
+              <a:t>-There are very few shared titles between the two networks: </a:t>
+            </a:r>
+          </a:p>
+          <a:p>
+            <a:r>
+              <a:rPr lang="en-US" dirty="0"/>
+              <a:t>101 Dalmatians</a:t>
+            </a:r>
+          </a:p>
+          <a:p>
+            <a:r>
+              <a:rPr lang="en-US" dirty="0"/>
+              <a:t>Cars 3</a:t>
+            </a:r>
+          </a:p>
+          <a:p>
+            <a:r>
+              <a:rPr lang="en-US" dirty="0"/>
+              <a:t>Little </a:t>
+            </a:r>
+            <a:r>
+              <a:rPr lang="en-US" dirty="0" err="1"/>
+              <a:t>Einsteins</a:t>
+            </a:r>
             <a:endParaRPr lang="en-US" dirty="0"/>
+          </a:p>
+          <a:p>
+            <a:r>
+              <a:rPr lang="en-US" dirty="0"/>
+              <a:t>Finding Dory</a:t>
+            </a:r>
+          </a:p>
+          <a:p>
+            <a:r>
+              <a:rPr lang="en-US" dirty="0"/>
+              <a:t>Frozen</a:t>
+            </a:r>
           </a:p>
         </p:txBody>
       </p:sp>
@@ -3101,7 +3143,7 @@
           <a:p>
             <a:fld id="{E0746DE6-3336-457D-A091-FA20AC1C536E}" type="slidenum">
               <a:rPr lang="en-US" smtClean="0"/>
-              <a:t>7</a:t>
+              <a:t>9</a:t>
             </a:fld>
             <a:endParaRPr lang="en-US"/>
           </a:p>
@@ -3185,7 +3227,7 @@
           <a:p>
             <a:fld id="{E0746DE6-3336-457D-A091-FA20AC1C536E}" type="slidenum">
               <a:rPr lang="en-US" smtClean="0"/>
-              <a:t>9</a:t>
+              <a:t>13</a:t>
             </a:fld>
             <a:endParaRPr lang="en-US"/>
           </a:p>
@@ -7861,6 +7903,1655 @@
 </p:sld>
 </file>
 
+<file path=ppt/slides/slide10.xml><?xml version="1.0" encoding="utf-8"?>
+<p:sld xmlns:a="http://schemas.openxmlformats.org/drawingml/2006/main" xmlns:r="http://schemas.openxmlformats.org/officeDocument/2006/relationships" xmlns:p="http://schemas.openxmlformats.org/presentationml/2006/main">
+  <p:cSld>
+    <p:spTree>
+      <p:nvGrpSpPr>
+        <p:cNvPr id="1" name=""/>
+        <p:cNvGrpSpPr/>
+        <p:nvPr/>
+      </p:nvGrpSpPr>
+      <p:grpSpPr>
+        <a:xfrm>
+          <a:off x="0" y="0"/>
+          <a:ext cx="0" cy="0"/>
+          <a:chOff x="0" y="0"/>
+          <a:chExt cx="0" cy="0"/>
+        </a:xfrm>
+      </p:grpSpPr>
+      <p:sp>
+        <p:nvSpPr>
+          <p:cNvPr id="3" name="Content Placeholder 2">
+            <a:extLst>
+              <a:ext uri="{FF2B5EF4-FFF2-40B4-BE49-F238E27FC236}">
+                <a16:creationId xmlns:a16="http://schemas.microsoft.com/office/drawing/2014/main" id="{F89B23F9-D452-454B-8421-9914B767C9FF}"/>
+              </a:ext>
+            </a:extLst>
+          </p:cNvPr>
+          <p:cNvSpPr>
+            <a:spLocks noGrp="1"/>
+          </p:cNvSpPr>
+          <p:nvPr>
+            <p:ph idx="1"/>
+          </p:nvPr>
+        </p:nvSpPr>
+        <p:spPr/>
+        <p:txBody>
+          <a:bodyPr/>
+          <a:lstStyle/>
+          <a:p>
+            <a:endParaRPr lang="en-US"/>
+          </a:p>
+        </p:txBody>
+      </p:sp>
+      <p:pic>
+        <p:nvPicPr>
+          <p:cNvPr id="4" name="Content Placeholder 4" descr="Chart, line chart&#10;&#10;Description automatically generated">
+            <a:extLst>
+              <a:ext uri="{FF2B5EF4-FFF2-40B4-BE49-F238E27FC236}">
+                <a16:creationId xmlns:a16="http://schemas.microsoft.com/office/drawing/2014/main" id="{BCFB80C9-550F-5441-A2D3-55F9D4B76110}"/>
+              </a:ext>
+            </a:extLst>
+          </p:cNvPr>
+          <p:cNvPicPr>
+            <a:picLocks noChangeAspect="1"/>
+          </p:cNvPicPr>
+          <p:nvPr/>
+        </p:nvPicPr>
+        <p:blipFill>
+          <a:blip r:embed="rId2"/>
+          <a:stretch>
+            <a:fillRect/>
+          </a:stretch>
+        </p:blipFill>
+        <p:spPr>
+          <a:xfrm>
+            <a:off x="1587023" y="633778"/>
+            <a:ext cx="8970141" cy="5590444"/>
+          </a:xfrm>
+          <a:prstGeom prst="rect">
+            <a:avLst/>
+          </a:prstGeom>
+        </p:spPr>
+      </p:pic>
+    </p:spTree>
+    <p:extLst>
+      <p:ext uri="{BB962C8B-B14F-4D97-AF65-F5344CB8AC3E}">
+        <p14:creationId xmlns:p14="http://schemas.microsoft.com/office/powerpoint/2010/main" val="663025093"/>
+      </p:ext>
+    </p:extLst>
+  </p:cSld>
+  <p:clrMapOvr>
+    <a:masterClrMapping/>
+  </p:clrMapOvr>
+</p:sld>
+</file>
+
+<file path=ppt/slides/slide11.xml><?xml version="1.0" encoding="utf-8"?>
+<p:sld xmlns:a="http://schemas.openxmlformats.org/drawingml/2006/main" xmlns:r="http://schemas.openxmlformats.org/officeDocument/2006/relationships" xmlns:p="http://schemas.openxmlformats.org/presentationml/2006/main">
+  <p:cSld>
+    <p:bg>
+      <p:bgPr>
+        <a:solidFill>
+          <a:schemeClr val="tx1"/>
+        </a:solidFill>
+        <a:effectLst/>
+      </p:bgPr>
+    </p:bg>
+    <p:spTree>
+      <p:nvGrpSpPr>
+        <p:cNvPr id="1" name=""/>
+        <p:cNvGrpSpPr/>
+        <p:nvPr/>
+      </p:nvGrpSpPr>
+      <p:grpSpPr>
+        <a:xfrm>
+          <a:off x="0" y="0"/>
+          <a:ext cx="0" cy="0"/>
+          <a:chOff x="0" y="0"/>
+          <a:chExt cx="0" cy="0"/>
+        </a:xfrm>
+      </p:grpSpPr>
+      <p:sp>
+        <p:nvSpPr>
+          <p:cNvPr id="2" name="Title 1">
+            <a:extLst>
+              <a:ext uri="{FF2B5EF4-FFF2-40B4-BE49-F238E27FC236}">
+                <a16:creationId xmlns:a16="http://schemas.microsoft.com/office/drawing/2014/main" id="{90D9430A-BA3A-AE4E-AADB-3386BB9A3AAA}"/>
+              </a:ext>
+            </a:extLst>
+          </p:cNvPr>
+          <p:cNvSpPr>
+            <a:spLocks noGrp="1"/>
+          </p:cNvSpPr>
+          <p:nvPr>
+            <p:ph type="title"/>
+          </p:nvPr>
+        </p:nvSpPr>
+        <p:spPr/>
+        <p:txBody>
+          <a:bodyPr>
+            <a:normAutofit/>
+          </a:bodyPr>
+          <a:lstStyle/>
+          <a:p>
+            <a:r>
+              <a:rPr lang="en-US" sz="4000" dirty="0">
+                <a:solidFill>
+                  <a:schemeClr val="bg1"/>
+                </a:solidFill>
+              </a:rPr>
+              <a:t>Grow Internationally</a:t>
+            </a:r>
+          </a:p>
+        </p:txBody>
+      </p:sp>
+      <p:graphicFrame>
+        <p:nvGraphicFramePr>
+          <p:cNvPr id="8" name="Table 7">
+            <a:extLst>
+              <a:ext uri="{FF2B5EF4-FFF2-40B4-BE49-F238E27FC236}">
+                <a16:creationId xmlns:a16="http://schemas.microsoft.com/office/drawing/2014/main" id="{7E9A0616-98D1-D044-A552-1DCB735A3282}"/>
+              </a:ext>
+            </a:extLst>
+          </p:cNvPr>
+          <p:cNvGraphicFramePr>
+            <a:graphicFrameLocks noGrp="1"/>
+          </p:cNvGraphicFramePr>
+          <p:nvPr>
+            <p:extLst>
+              <p:ext uri="{D42A27DB-BD31-4B8C-83A1-F6EECF244321}">
+                <p14:modId xmlns:p14="http://schemas.microsoft.com/office/powerpoint/2010/main" val="1218475165"/>
+              </p:ext>
+            </p:extLst>
+          </p:nvPr>
+        </p:nvGraphicFramePr>
+        <p:xfrm>
+          <a:off x="5552902" y="3869573"/>
+          <a:ext cx="5469774" cy="2215560"/>
+        </p:xfrm>
+        <a:graphic>
+          <a:graphicData uri="http://schemas.openxmlformats.org/drawingml/2006/table">
+            <a:tbl>
+              <a:tblPr/>
+              <a:tblGrid>
+                <a:gridCol w="1396539">
+                  <a:extLst>
+                    <a:ext uri="{9D8B030D-6E8A-4147-A177-3AD203B41FA5}">
+                      <a16:colId xmlns:a16="http://schemas.microsoft.com/office/drawing/2014/main" val="83949932"/>
+                    </a:ext>
+                  </a:extLst>
+                </a:gridCol>
+                <a:gridCol w="1757216">
+                  <a:extLst>
+                    <a:ext uri="{9D8B030D-6E8A-4147-A177-3AD203B41FA5}">
+                      <a16:colId xmlns:a16="http://schemas.microsoft.com/office/drawing/2014/main" val="2793464415"/>
+                    </a:ext>
+                  </a:extLst>
+                </a:gridCol>
+                <a:gridCol w="2316019">
+                  <a:extLst>
+                    <a:ext uri="{9D8B030D-6E8A-4147-A177-3AD203B41FA5}">
+                      <a16:colId xmlns:a16="http://schemas.microsoft.com/office/drawing/2014/main" val="1607588711"/>
+                    </a:ext>
+                  </a:extLst>
+                </a:gridCol>
+              </a:tblGrid>
+              <a:tr h="443112">
+                <a:tc>
+                  <a:txBody>
+                    <a:bodyPr/>
+                    <a:lstStyle/>
+                    <a:p>
+                      <a:pPr algn="l" fontAlgn="b"/>
+                      <a:r>
+                        <a:rPr lang="en-US" sz="2000" b="1" i="0" u="none" strike="noStrike" dirty="0">
+                          <a:solidFill>
+                            <a:schemeClr val="bg1"/>
+                          </a:solidFill>
+                          <a:effectLst/>
+                          <a:latin typeface="Calibri" panose="020F0502020204030204" pitchFamily="34" charset="0"/>
+                        </a:rPr>
+                        <a:t>Network</a:t>
+                      </a:r>
+                    </a:p>
+                  </a:txBody>
+                  <a:tcPr marL="9525" marR="9525" marT="9525" marB="0" anchor="b">
+                    <a:lnL>
+                      <a:noFill/>
+                    </a:lnL>
+                    <a:lnR>
+                      <a:noFill/>
+                    </a:lnR>
+                    <a:lnT>
+                      <a:noFill/>
+                    </a:lnT>
+                    <a:lnB>
+                      <a:noFill/>
+                    </a:lnB>
+                  </a:tcPr>
+                </a:tc>
+                <a:tc>
+                  <a:txBody>
+                    <a:bodyPr/>
+                    <a:lstStyle/>
+                    <a:p>
+                      <a:pPr algn="l" fontAlgn="b"/>
+                      <a:r>
+                        <a:rPr lang="en-US" sz="2000" b="1" i="0" u="none" strike="noStrike" dirty="0">
+                          <a:solidFill>
+                            <a:schemeClr val="bg1"/>
+                          </a:solidFill>
+                          <a:effectLst/>
+                          <a:latin typeface="Calibri" panose="020F0502020204030204" pitchFamily="34" charset="0"/>
+                        </a:rPr>
+                        <a:t>is international? </a:t>
+                      </a:r>
+                    </a:p>
+                  </a:txBody>
+                  <a:tcPr marL="9525" marR="9525" marT="9525" marB="0" anchor="b">
+                    <a:lnL>
+                      <a:noFill/>
+                    </a:lnL>
+                    <a:lnR>
+                      <a:noFill/>
+                    </a:lnR>
+                    <a:lnT>
+                      <a:noFill/>
+                    </a:lnT>
+                    <a:lnB>
+                      <a:noFill/>
+                    </a:lnB>
+                  </a:tcPr>
+                </a:tc>
+                <a:tc>
+                  <a:txBody>
+                    <a:bodyPr/>
+                    <a:lstStyle/>
+                    <a:p>
+                      <a:pPr algn="l" fontAlgn="b"/>
+                      <a:r>
+                        <a:rPr lang="en-US" sz="2000" b="1" i="0" u="none" strike="noStrike" dirty="0">
+                          <a:solidFill>
+                            <a:schemeClr val="bg1"/>
+                          </a:solidFill>
+                          <a:effectLst/>
+                          <a:latin typeface="Calibri" panose="020F0502020204030204" pitchFamily="34" charset="0"/>
+                        </a:rPr>
+                        <a:t>number of movies</a:t>
+                      </a:r>
+                    </a:p>
+                  </a:txBody>
+                  <a:tcPr marL="9525" marR="9525" marT="9525" marB="0" anchor="b">
+                    <a:lnL>
+                      <a:noFill/>
+                    </a:lnL>
+                    <a:lnR>
+                      <a:noFill/>
+                    </a:lnR>
+                    <a:lnT>
+                      <a:noFill/>
+                    </a:lnT>
+                    <a:lnB>
+                      <a:noFill/>
+                    </a:lnB>
+                  </a:tcPr>
+                </a:tc>
+                <a:extLst>
+                  <a:ext uri="{0D108BD9-81ED-4DB2-BD59-A6C34878D82A}">
+                    <a16:rowId xmlns:a16="http://schemas.microsoft.com/office/drawing/2014/main" val="2542871057"/>
+                  </a:ext>
+                </a:extLst>
+              </a:tr>
+              <a:tr h="443112">
+                <a:tc>
+                  <a:txBody>
+                    <a:bodyPr/>
+                    <a:lstStyle/>
+                    <a:p>
+                      <a:pPr algn="l" fontAlgn="b"/>
+                      <a:r>
+                        <a:rPr lang="en-US" sz="2000" b="0" i="0" u="none" strike="noStrike">
+                          <a:solidFill>
+                            <a:schemeClr val="bg1"/>
+                          </a:solidFill>
+                          <a:effectLst/>
+                          <a:latin typeface="Calibri" panose="020F0502020204030204" pitchFamily="34" charset="0"/>
+                        </a:rPr>
+                        <a:t>Disney _plus</a:t>
+                      </a:r>
+                    </a:p>
+                  </a:txBody>
+                  <a:tcPr marL="9525" marR="9525" marT="9525" marB="0" anchor="b">
+                    <a:lnL>
+                      <a:noFill/>
+                    </a:lnL>
+                    <a:lnR>
+                      <a:noFill/>
+                    </a:lnR>
+                    <a:lnT>
+                      <a:noFill/>
+                    </a:lnT>
+                    <a:lnB>
+                      <a:noFill/>
+                    </a:lnB>
+                  </a:tcPr>
+                </a:tc>
+                <a:tc>
+                  <a:txBody>
+                    <a:bodyPr/>
+                    <a:lstStyle/>
+                    <a:p>
+                      <a:pPr algn="l" fontAlgn="b"/>
+                      <a:r>
+                        <a:rPr lang="en-US" sz="2000" b="0" i="0" u="none" strike="noStrike" dirty="0">
+                          <a:solidFill>
+                            <a:schemeClr val="bg1"/>
+                          </a:solidFill>
+                          <a:effectLst/>
+                          <a:latin typeface="Calibri" panose="020F0502020204030204" pitchFamily="34" charset="0"/>
+                        </a:rPr>
+                        <a:t>Non-US</a:t>
+                      </a:r>
+                    </a:p>
+                  </a:txBody>
+                  <a:tcPr marL="9525" marR="9525" marT="9525" marB="0" anchor="b">
+                    <a:lnL>
+                      <a:noFill/>
+                    </a:lnL>
+                    <a:lnR>
+                      <a:noFill/>
+                    </a:lnR>
+                    <a:lnT>
+                      <a:noFill/>
+                    </a:lnT>
+                    <a:lnB>
+                      <a:noFill/>
+                    </a:lnB>
+                  </a:tcPr>
+                </a:tc>
+                <a:tc>
+                  <a:txBody>
+                    <a:bodyPr/>
+                    <a:lstStyle/>
+                    <a:p>
+                      <a:pPr algn="r" fontAlgn="b"/>
+                      <a:r>
+                        <a:rPr lang="en-US" sz="2000" b="0" i="0" u="none" strike="noStrike" dirty="0">
+                          <a:solidFill>
+                            <a:schemeClr val="bg1"/>
+                          </a:solidFill>
+                          <a:effectLst/>
+                          <a:latin typeface="Calibri" panose="020F0502020204030204" pitchFamily="34" charset="0"/>
+                        </a:rPr>
+                        <a:t>144</a:t>
+                      </a:r>
+                    </a:p>
+                  </a:txBody>
+                  <a:tcPr marL="9525" marR="9525" marT="9525" marB="0" anchor="b">
+                    <a:lnL>
+                      <a:noFill/>
+                    </a:lnL>
+                    <a:lnR>
+                      <a:noFill/>
+                    </a:lnR>
+                    <a:lnT>
+                      <a:noFill/>
+                    </a:lnT>
+                    <a:lnB>
+                      <a:noFill/>
+                    </a:lnB>
+                  </a:tcPr>
+                </a:tc>
+                <a:extLst>
+                  <a:ext uri="{0D108BD9-81ED-4DB2-BD59-A6C34878D82A}">
+                    <a16:rowId xmlns:a16="http://schemas.microsoft.com/office/drawing/2014/main" val="1804272441"/>
+                  </a:ext>
+                </a:extLst>
+              </a:tr>
+              <a:tr h="443112">
+                <a:tc>
+                  <a:txBody>
+                    <a:bodyPr/>
+                    <a:lstStyle/>
+                    <a:p>
+                      <a:pPr algn="l" fontAlgn="b"/>
+                      <a:r>
+                        <a:rPr lang="en-US" sz="2000" b="0" i="0" u="none" strike="noStrike">
+                          <a:solidFill>
+                            <a:schemeClr val="bg1"/>
+                          </a:solidFill>
+                          <a:effectLst/>
+                          <a:latin typeface="Calibri" panose="020F0502020204030204" pitchFamily="34" charset="0"/>
+                        </a:rPr>
+                        <a:t>Disney _plus</a:t>
+                      </a:r>
+                    </a:p>
+                  </a:txBody>
+                  <a:tcPr marL="9525" marR="9525" marT="9525" marB="0" anchor="b">
+                    <a:lnL>
+                      <a:noFill/>
+                    </a:lnL>
+                    <a:lnR>
+                      <a:noFill/>
+                    </a:lnR>
+                    <a:lnT>
+                      <a:noFill/>
+                    </a:lnT>
+                    <a:lnB>
+                      <a:noFill/>
+                    </a:lnB>
+                  </a:tcPr>
+                </a:tc>
+                <a:tc>
+                  <a:txBody>
+                    <a:bodyPr/>
+                    <a:lstStyle/>
+                    <a:p>
+                      <a:pPr algn="l" fontAlgn="b"/>
+                      <a:r>
+                        <a:rPr lang="en-US" sz="2000" b="0" i="0" u="none" strike="noStrike" dirty="0">
+                          <a:solidFill>
+                            <a:schemeClr val="bg1"/>
+                          </a:solidFill>
+                          <a:effectLst/>
+                          <a:latin typeface="Calibri" panose="020F0502020204030204" pitchFamily="34" charset="0"/>
+                        </a:rPr>
+                        <a:t>US</a:t>
+                      </a:r>
+                    </a:p>
+                  </a:txBody>
+                  <a:tcPr marL="9525" marR="9525" marT="9525" marB="0" anchor="b">
+                    <a:lnL>
+                      <a:noFill/>
+                    </a:lnL>
+                    <a:lnR>
+                      <a:noFill/>
+                    </a:lnR>
+                    <a:lnT>
+                      <a:noFill/>
+                    </a:lnT>
+                    <a:lnB>
+                      <a:noFill/>
+                    </a:lnB>
+                  </a:tcPr>
+                </a:tc>
+                <a:tc>
+                  <a:txBody>
+                    <a:bodyPr/>
+                    <a:lstStyle/>
+                    <a:p>
+                      <a:pPr algn="r" fontAlgn="b"/>
+                      <a:r>
+                        <a:rPr lang="en-US" sz="2000" b="0" i="0" u="none" strike="noStrike" dirty="0">
+                          <a:solidFill>
+                            <a:schemeClr val="bg1"/>
+                          </a:solidFill>
+                          <a:effectLst/>
+                          <a:latin typeface="Calibri" panose="020F0502020204030204" pitchFamily="34" charset="0"/>
+                        </a:rPr>
+                        <a:t>573</a:t>
+                      </a:r>
+                    </a:p>
+                  </a:txBody>
+                  <a:tcPr marL="9525" marR="9525" marT="9525" marB="0" anchor="b">
+                    <a:lnL>
+                      <a:noFill/>
+                    </a:lnL>
+                    <a:lnR>
+                      <a:noFill/>
+                    </a:lnR>
+                    <a:lnT>
+                      <a:noFill/>
+                    </a:lnT>
+                    <a:lnB>
+                      <a:noFill/>
+                    </a:lnB>
+                  </a:tcPr>
+                </a:tc>
+                <a:extLst>
+                  <a:ext uri="{0D108BD9-81ED-4DB2-BD59-A6C34878D82A}">
+                    <a16:rowId xmlns:a16="http://schemas.microsoft.com/office/drawing/2014/main" val="1839733206"/>
+                  </a:ext>
+                </a:extLst>
+              </a:tr>
+              <a:tr h="443112">
+                <a:tc>
+                  <a:txBody>
+                    <a:bodyPr/>
+                    <a:lstStyle/>
+                    <a:p>
+                      <a:pPr algn="l" fontAlgn="b"/>
+                      <a:r>
+                        <a:rPr lang="en-US" sz="2000" b="0" i="0" u="none" strike="noStrike">
+                          <a:solidFill>
+                            <a:schemeClr val="bg1"/>
+                          </a:solidFill>
+                          <a:effectLst/>
+                          <a:latin typeface="Calibri" panose="020F0502020204030204" pitchFamily="34" charset="0"/>
+                        </a:rPr>
+                        <a:t>Netflix</a:t>
+                      </a:r>
+                    </a:p>
+                  </a:txBody>
+                  <a:tcPr marL="9525" marR="9525" marT="9525" marB="0" anchor="b">
+                    <a:lnL>
+                      <a:noFill/>
+                    </a:lnL>
+                    <a:lnR>
+                      <a:noFill/>
+                    </a:lnR>
+                    <a:lnT>
+                      <a:noFill/>
+                    </a:lnT>
+                    <a:lnB>
+                      <a:noFill/>
+                    </a:lnB>
+                  </a:tcPr>
+                </a:tc>
+                <a:tc>
+                  <a:txBody>
+                    <a:bodyPr/>
+                    <a:lstStyle/>
+                    <a:p>
+                      <a:pPr algn="l" fontAlgn="b"/>
+                      <a:r>
+                        <a:rPr lang="en-US" sz="2000" b="0" i="0" u="none" strike="noStrike">
+                          <a:solidFill>
+                            <a:schemeClr val="bg1"/>
+                          </a:solidFill>
+                          <a:effectLst/>
+                          <a:latin typeface="Calibri" panose="020F0502020204030204" pitchFamily="34" charset="0"/>
+                        </a:rPr>
+                        <a:t>Non-US</a:t>
+                      </a:r>
+                    </a:p>
+                  </a:txBody>
+                  <a:tcPr marL="9525" marR="9525" marT="9525" marB="0" anchor="b">
+                    <a:lnL>
+                      <a:noFill/>
+                    </a:lnL>
+                    <a:lnR>
+                      <a:noFill/>
+                    </a:lnR>
+                    <a:lnT>
+                      <a:noFill/>
+                    </a:lnT>
+                    <a:lnB>
+                      <a:noFill/>
+                    </a:lnB>
+                  </a:tcPr>
+                </a:tc>
+                <a:tc>
+                  <a:txBody>
+                    <a:bodyPr/>
+                    <a:lstStyle/>
+                    <a:p>
+                      <a:pPr algn="r" fontAlgn="b"/>
+                      <a:r>
+                        <a:rPr lang="en-US" sz="2000" b="0" i="0" u="none" strike="noStrike" dirty="0">
+                          <a:solidFill>
+                            <a:schemeClr val="bg1"/>
+                          </a:solidFill>
+                          <a:effectLst/>
+                          <a:latin typeface="Calibri" panose="020F0502020204030204" pitchFamily="34" charset="0"/>
+                        </a:rPr>
+                        <a:t>1782</a:t>
+                      </a:r>
+                    </a:p>
+                  </a:txBody>
+                  <a:tcPr marL="9525" marR="9525" marT="9525" marB="0" anchor="b">
+                    <a:lnL>
+                      <a:noFill/>
+                    </a:lnL>
+                    <a:lnR>
+                      <a:noFill/>
+                    </a:lnR>
+                    <a:lnT>
+                      <a:noFill/>
+                    </a:lnT>
+                    <a:lnB>
+                      <a:noFill/>
+                    </a:lnB>
+                  </a:tcPr>
+                </a:tc>
+                <a:extLst>
+                  <a:ext uri="{0D108BD9-81ED-4DB2-BD59-A6C34878D82A}">
+                    <a16:rowId xmlns:a16="http://schemas.microsoft.com/office/drawing/2014/main" val="463723674"/>
+                  </a:ext>
+                </a:extLst>
+              </a:tr>
+              <a:tr h="443112">
+                <a:tc>
+                  <a:txBody>
+                    <a:bodyPr/>
+                    <a:lstStyle/>
+                    <a:p>
+                      <a:pPr algn="l" fontAlgn="b"/>
+                      <a:r>
+                        <a:rPr lang="en-US" sz="2000" b="0" i="0" u="none" strike="noStrike">
+                          <a:solidFill>
+                            <a:schemeClr val="bg1"/>
+                          </a:solidFill>
+                          <a:effectLst/>
+                          <a:latin typeface="Calibri" panose="020F0502020204030204" pitchFamily="34" charset="0"/>
+                        </a:rPr>
+                        <a:t>Netflix</a:t>
+                      </a:r>
+                    </a:p>
+                  </a:txBody>
+                  <a:tcPr marL="9525" marR="9525" marT="9525" marB="0" anchor="b">
+                    <a:lnL>
+                      <a:noFill/>
+                    </a:lnL>
+                    <a:lnR>
+                      <a:noFill/>
+                    </a:lnR>
+                    <a:lnT>
+                      <a:noFill/>
+                    </a:lnT>
+                    <a:lnB>
+                      <a:noFill/>
+                    </a:lnB>
+                  </a:tcPr>
+                </a:tc>
+                <a:tc>
+                  <a:txBody>
+                    <a:bodyPr/>
+                    <a:lstStyle/>
+                    <a:p>
+                      <a:pPr algn="l" fontAlgn="b"/>
+                      <a:r>
+                        <a:rPr lang="en-US" sz="2000" b="0" i="0" u="none" strike="noStrike">
+                          <a:solidFill>
+                            <a:schemeClr val="bg1"/>
+                          </a:solidFill>
+                          <a:effectLst/>
+                          <a:latin typeface="Calibri" panose="020F0502020204030204" pitchFamily="34" charset="0"/>
+                        </a:rPr>
+                        <a:t>US</a:t>
+                      </a:r>
+                    </a:p>
+                  </a:txBody>
+                  <a:tcPr marL="9525" marR="9525" marT="9525" marB="0" anchor="b">
+                    <a:lnL>
+                      <a:noFill/>
+                    </a:lnL>
+                    <a:lnR>
+                      <a:noFill/>
+                    </a:lnR>
+                    <a:lnT>
+                      <a:noFill/>
+                    </a:lnT>
+                    <a:lnB>
+                      <a:noFill/>
+                    </a:lnB>
+                  </a:tcPr>
+                </a:tc>
+                <a:tc>
+                  <a:txBody>
+                    <a:bodyPr/>
+                    <a:lstStyle/>
+                    <a:p>
+                      <a:pPr algn="r" fontAlgn="b"/>
+                      <a:r>
+                        <a:rPr lang="en-US" sz="2000" b="0" i="0" u="none" strike="noStrike" dirty="0">
+                          <a:solidFill>
+                            <a:schemeClr val="bg1"/>
+                          </a:solidFill>
+                          <a:effectLst/>
+                          <a:latin typeface="Calibri" panose="020F0502020204030204" pitchFamily="34" charset="0"/>
+                        </a:rPr>
+                        <a:t>1274</a:t>
+                      </a:r>
+                    </a:p>
+                  </a:txBody>
+                  <a:tcPr marL="9525" marR="9525" marT="9525" marB="0" anchor="b">
+                    <a:lnL>
+                      <a:noFill/>
+                    </a:lnL>
+                    <a:lnR>
+                      <a:noFill/>
+                    </a:lnR>
+                    <a:lnT>
+                      <a:noFill/>
+                    </a:lnT>
+                    <a:lnB>
+                      <a:noFill/>
+                    </a:lnB>
+                  </a:tcPr>
+                </a:tc>
+                <a:extLst>
+                  <a:ext uri="{0D108BD9-81ED-4DB2-BD59-A6C34878D82A}">
+                    <a16:rowId xmlns:a16="http://schemas.microsoft.com/office/drawing/2014/main" val="871215959"/>
+                  </a:ext>
+                </a:extLst>
+              </a:tr>
+            </a:tbl>
+          </a:graphicData>
+        </a:graphic>
+      </p:graphicFrame>
+      <p:graphicFrame>
+        <p:nvGraphicFramePr>
+          <p:cNvPr id="11" name="Content Placeholder 10">
+            <a:extLst>
+              <a:ext uri="{FF2B5EF4-FFF2-40B4-BE49-F238E27FC236}">
+                <a16:creationId xmlns:a16="http://schemas.microsoft.com/office/drawing/2014/main" id="{31D951D4-C1BC-154C-9B4D-A9D9294D49DE}"/>
+              </a:ext>
+            </a:extLst>
+          </p:cNvPr>
+          <p:cNvGraphicFramePr>
+            <a:graphicFrameLocks noGrp="1"/>
+          </p:cNvGraphicFramePr>
+          <p:nvPr>
+            <p:ph idx="1"/>
+            <p:extLst>
+              <p:ext uri="{D42A27DB-BD31-4B8C-83A1-F6EECF244321}">
+                <p14:modId xmlns:p14="http://schemas.microsoft.com/office/powerpoint/2010/main" val="1946850641"/>
+              </p:ext>
+            </p:extLst>
+          </p:nvPr>
+        </p:nvGraphicFramePr>
+        <p:xfrm>
+          <a:off x="5552902" y="980903"/>
+          <a:ext cx="5320146" cy="2411773"/>
+        </p:xfrm>
+        <a:graphic>
+          <a:graphicData uri="http://schemas.openxmlformats.org/drawingml/2006/table">
+            <a:tbl>
+              <a:tblPr/>
+              <a:tblGrid>
+                <a:gridCol w="1344200">
+                  <a:extLst>
+                    <a:ext uri="{9D8B030D-6E8A-4147-A177-3AD203B41FA5}">
+                      <a16:colId xmlns:a16="http://schemas.microsoft.com/office/drawing/2014/main" val="976824927"/>
+                    </a:ext>
+                  </a:extLst>
+                </a:gridCol>
+                <a:gridCol w="1751064">
+                  <a:extLst>
+                    <a:ext uri="{9D8B030D-6E8A-4147-A177-3AD203B41FA5}">
+                      <a16:colId xmlns:a16="http://schemas.microsoft.com/office/drawing/2014/main" val="2680426985"/>
+                    </a:ext>
+                  </a:extLst>
+                </a:gridCol>
+                <a:gridCol w="2224882">
+                  <a:extLst>
+                    <a:ext uri="{9D8B030D-6E8A-4147-A177-3AD203B41FA5}">
+                      <a16:colId xmlns:a16="http://schemas.microsoft.com/office/drawing/2014/main" val="792410495"/>
+                    </a:ext>
+                  </a:extLst>
+                </a:gridCol>
+              </a:tblGrid>
+              <a:tr h="432261">
+                <a:tc>
+                  <a:txBody>
+                    <a:bodyPr/>
+                    <a:lstStyle/>
+                    <a:p>
+                      <a:pPr algn="l" fontAlgn="b"/>
+                      <a:r>
+                        <a:rPr lang="en-US" sz="2000" b="1" i="0" u="none" strike="noStrike" dirty="0">
+                          <a:solidFill>
+                            <a:schemeClr val="bg1"/>
+                          </a:solidFill>
+                          <a:effectLst/>
+                          <a:latin typeface="Calibri" panose="020F0502020204030204" pitchFamily="34" charset="0"/>
+                        </a:rPr>
+                        <a:t>Network</a:t>
+                      </a:r>
+                    </a:p>
+                  </a:txBody>
+                  <a:tcPr marL="9525" marR="9525" marT="9525" marB="0" anchor="b">
+                    <a:lnL>
+                      <a:noFill/>
+                    </a:lnL>
+                    <a:lnR>
+                      <a:noFill/>
+                    </a:lnR>
+                    <a:lnT>
+                      <a:noFill/>
+                    </a:lnT>
+                    <a:lnB>
+                      <a:noFill/>
+                    </a:lnB>
+                  </a:tcPr>
+                </a:tc>
+                <a:tc>
+                  <a:txBody>
+                    <a:bodyPr/>
+                    <a:lstStyle/>
+                    <a:p>
+                      <a:pPr algn="l" fontAlgn="b"/>
+                      <a:r>
+                        <a:rPr lang="en-US" sz="2000" b="1" i="0" u="none" strike="noStrike" dirty="0">
+                          <a:solidFill>
+                            <a:schemeClr val="bg1"/>
+                          </a:solidFill>
+                          <a:effectLst/>
+                          <a:latin typeface="Calibri" panose="020F0502020204030204" pitchFamily="34" charset="0"/>
+                        </a:rPr>
+                        <a:t>is international? </a:t>
+                      </a:r>
+                    </a:p>
+                  </a:txBody>
+                  <a:tcPr marL="9525" marR="9525" marT="9525" marB="0" anchor="b">
+                    <a:lnL>
+                      <a:noFill/>
+                    </a:lnL>
+                    <a:lnR>
+                      <a:noFill/>
+                    </a:lnR>
+                    <a:lnT>
+                      <a:noFill/>
+                    </a:lnT>
+                    <a:lnB>
+                      <a:noFill/>
+                    </a:lnB>
+                  </a:tcPr>
+                </a:tc>
+                <a:tc>
+                  <a:txBody>
+                    <a:bodyPr/>
+                    <a:lstStyle/>
+                    <a:p>
+                      <a:pPr algn="r" fontAlgn="b"/>
+                      <a:r>
+                        <a:rPr lang="en-US" sz="2000" b="1" i="0" u="none" strike="noStrike" dirty="0">
+                          <a:solidFill>
+                            <a:schemeClr val="bg1"/>
+                          </a:solidFill>
+                          <a:effectLst/>
+                          <a:latin typeface="Calibri" panose="020F0502020204030204" pitchFamily="34" charset="0"/>
+                        </a:rPr>
+                        <a:t>rating</a:t>
+                      </a:r>
+                    </a:p>
+                  </a:txBody>
+                  <a:tcPr marL="9525" marR="9525" marT="9525" marB="0" anchor="b">
+                    <a:lnL>
+                      <a:noFill/>
+                    </a:lnL>
+                    <a:lnR>
+                      <a:noFill/>
+                    </a:lnR>
+                    <a:lnT>
+                      <a:noFill/>
+                    </a:lnT>
+                    <a:lnB>
+                      <a:noFill/>
+                    </a:lnB>
+                  </a:tcPr>
+                </a:tc>
+                <a:extLst>
+                  <a:ext uri="{0D108BD9-81ED-4DB2-BD59-A6C34878D82A}">
+                    <a16:rowId xmlns:a16="http://schemas.microsoft.com/office/drawing/2014/main" val="2328699400"/>
+                  </a:ext>
+                </a:extLst>
+              </a:tr>
+              <a:tr h="494878">
+                <a:tc>
+                  <a:txBody>
+                    <a:bodyPr/>
+                    <a:lstStyle/>
+                    <a:p>
+                      <a:pPr algn="l" fontAlgn="b"/>
+                      <a:r>
+                        <a:rPr lang="en-US" sz="2000" b="0" i="0" u="none" strike="noStrike" dirty="0">
+                          <a:solidFill>
+                            <a:schemeClr val="bg1"/>
+                          </a:solidFill>
+                          <a:effectLst/>
+                          <a:latin typeface="Calibri" panose="020F0502020204030204" pitchFamily="34" charset="0"/>
+                        </a:rPr>
+                        <a:t>Disney _plus</a:t>
+                      </a:r>
+                    </a:p>
+                  </a:txBody>
+                  <a:tcPr marL="9525" marR="9525" marT="9525" marB="0" anchor="b">
+                    <a:lnL>
+                      <a:noFill/>
+                    </a:lnL>
+                    <a:lnR>
+                      <a:noFill/>
+                    </a:lnR>
+                    <a:lnT>
+                      <a:noFill/>
+                    </a:lnT>
+                    <a:lnB>
+                      <a:noFill/>
+                    </a:lnB>
+                  </a:tcPr>
+                </a:tc>
+                <a:tc>
+                  <a:txBody>
+                    <a:bodyPr/>
+                    <a:lstStyle/>
+                    <a:p>
+                      <a:pPr algn="l" fontAlgn="b"/>
+                      <a:r>
+                        <a:rPr lang="en-US" sz="2000" b="0" i="0" u="none" strike="noStrike" dirty="0">
+                          <a:solidFill>
+                            <a:schemeClr val="bg1"/>
+                          </a:solidFill>
+                          <a:effectLst/>
+                          <a:latin typeface="Calibri" panose="020F0502020204030204" pitchFamily="34" charset="0"/>
+                        </a:rPr>
+                        <a:t>Non-US</a:t>
+                      </a:r>
+                    </a:p>
+                  </a:txBody>
+                  <a:tcPr marL="9525" marR="9525" marT="9525" marB="0" anchor="b">
+                    <a:lnL>
+                      <a:noFill/>
+                    </a:lnL>
+                    <a:lnR>
+                      <a:noFill/>
+                    </a:lnR>
+                    <a:lnT>
+                      <a:noFill/>
+                    </a:lnT>
+                    <a:lnB>
+                      <a:noFill/>
+                    </a:lnB>
+                  </a:tcPr>
+                </a:tc>
+                <a:tc>
+                  <a:txBody>
+                    <a:bodyPr/>
+                    <a:lstStyle/>
+                    <a:p>
+                      <a:pPr algn="r" fontAlgn="b"/>
+                      <a:r>
+                        <a:rPr lang="en-US" sz="2000" b="0" i="0" u="none" strike="noStrike" dirty="0">
+                          <a:solidFill>
+                            <a:schemeClr val="bg1"/>
+                          </a:solidFill>
+                          <a:effectLst/>
+                          <a:latin typeface="Calibri" panose="020F0502020204030204" pitchFamily="34" charset="0"/>
+                        </a:rPr>
+                        <a:t>6.37</a:t>
+                      </a:r>
+                    </a:p>
+                  </a:txBody>
+                  <a:tcPr marL="9525" marR="9525" marT="9525" marB="0" anchor="b">
+                    <a:lnL>
+                      <a:noFill/>
+                    </a:lnL>
+                    <a:lnR>
+                      <a:noFill/>
+                    </a:lnR>
+                    <a:lnT>
+                      <a:noFill/>
+                    </a:lnT>
+                    <a:lnB>
+                      <a:noFill/>
+                    </a:lnB>
+                  </a:tcPr>
+                </a:tc>
+                <a:extLst>
+                  <a:ext uri="{0D108BD9-81ED-4DB2-BD59-A6C34878D82A}">
+                    <a16:rowId xmlns:a16="http://schemas.microsoft.com/office/drawing/2014/main" val="3005424163"/>
+                  </a:ext>
+                </a:extLst>
+              </a:tr>
+              <a:tr h="494878">
+                <a:tc>
+                  <a:txBody>
+                    <a:bodyPr/>
+                    <a:lstStyle/>
+                    <a:p>
+                      <a:pPr algn="l" fontAlgn="b"/>
+                      <a:r>
+                        <a:rPr lang="en-US" sz="2000" b="0" i="0" u="none" strike="noStrike">
+                          <a:solidFill>
+                            <a:schemeClr val="bg1"/>
+                          </a:solidFill>
+                          <a:effectLst/>
+                          <a:latin typeface="Calibri" panose="020F0502020204030204" pitchFamily="34" charset="0"/>
+                        </a:rPr>
+                        <a:t>Disney _plus</a:t>
+                      </a:r>
+                    </a:p>
+                  </a:txBody>
+                  <a:tcPr marL="9525" marR="9525" marT="9525" marB="0" anchor="b">
+                    <a:lnL>
+                      <a:noFill/>
+                    </a:lnL>
+                    <a:lnR>
+                      <a:noFill/>
+                    </a:lnR>
+                    <a:lnT>
+                      <a:noFill/>
+                    </a:lnT>
+                    <a:lnB>
+                      <a:noFill/>
+                    </a:lnB>
+                  </a:tcPr>
+                </a:tc>
+                <a:tc>
+                  <a:txBody>
+                    <a:bodyPr/>
+                    <a:lstStyle/>
+                    <a:p>
+                      <a:pPr algn="l" fontAlgn="b"/>
+                      <a:r>
+                        <a:rPr lang="en-US" sz="2000" b="0" i="0" u="none" strike="noStrike">
+                          <a:solidFill>
+                            <a:schemeClr val="bg1"/>
+                          </a:solidFill>
+                          <a:effectLst/>
+                          <a:latin typeface="Calibri" panose="020F0502020204030204" pitchFamily="34" charset="0"/>
+                        </a:rPr>
+                        <a:t>US</a:t>
+                      </a:r>
+                    </a:p>
+                  </a:txBody>
+                  <a:tcPr marL="9525" marR="9525" marT="9525" marB="0" anchor="b">
+                    <a:lnL>
+                      <a:noFill/>
+                    </a:lnL>
+                    <a:lnR>
+                      <a:noFill/>
+                    </a:lnR>
+                    <a:lnT>
+                      <a:noFill/>
+                    </a:lnT>
+                    <a:lnB>
+                      <a:noFill/>
+                    </a:lnB>
+                  </a:tcPr>
+                </a:tc>
+                <a:tc>
+                  <a:txBody>
+                    <a:bodyPr/>
+                    <a:lstStyle/>
+                    <a:p>
+                      <a:pPr algn="r" fontAlgn="b"/>
+                      <a:r>
+                        <a:rPr lang="en-US" sz="2000" b="0" i="0" u="none" strike="noStrike" dirty="0">
+                          <a:solidFill>
+                            <a:schemeClr val="bg1"/>
+                          </a:solidFill>
+                          <a:effectLst/>
+                          <a:latin typeface="Calibri" panose="020F0502020204030204" pitchFamily="34" charset="0"/>
+                        </a:rPr>
+                        <a:t>6.55</a:t>
+                      </a:r>
+                    </a:p>
+                  </a:txBody>
+                  <a:tcPr marL="9525" marR="9525" marT="9525" marB="0" anchor="b">
+                    <a:lnL>
+                      <a:noFill/>
+                    </a:lnL>
+                    <a:lnR>
+                      <a:noFill/>
+                    </a:lnR>
+                    <a:lnT>
+                      <a:noFill/>
+                    </a:lnT>
+                    <a:lnB>
+                      <a:noFill/>
+                    </a:lnB>
+                  </a:tcPr>
+                </a:tc>
+                <a:extLst>
+                  <a:ext uri="{0D108BD9-81ED-4DB2-BD59-A6C34878D82A}">
+                    <a16:rowId xmlns:a16="http://schemas.microsoft.com/office/drawing/2014/main" val="2567706794"/>
+                  </a:ext>
+                </a:extLst>
+              </a:tr>
+              <a:tr h="494878">
+                <a:tc>
+                  <a:txBody>
+                    <a:bodyPr/>
+                    <a:lstStyle/>
+                    <a:p>
+                      <a:pPr algn="l" fontAlgn="b"/>
+                      <a:r>
+                        <a:rPr lang="en-US" sz="2000" b="0" i="0" u="none" strike="noStrike">
+                          <a:solidFill>
+                            <a:schemeClr val="bg1"/>
+                          </a:solidFill>
+                          <a:effectLst/>
+                          <a:latin typeface="Calibri" panose="020F0502020204030204" pitchFamily="34" charset="0"/>
+                        </a:rPr>
+                        <a:t>Netflix</a:t>
+                      </a:r>
+                    </a:p>
+                  </a:txBody>
+                  <a:tcPr marL="9525" marR="9525" marT="9525" marB="0" anchor="b">
+                    <a:lnL>
+                      <a:noFill/>
+                    </a:lnL>
+                    <a:lnR>
+                      <a:noFill/>
+                    </a:lnR>
+                    <a:lnT>
+                      <a:noFill/>
+                    </a:lnT>
+                    <a:lnB>
+                      <a:noFill/>
+                    </a:lnB>
+                  </a:tcPr>
+                </a:tc>
+                <a:tc>
+                  <a:txBody>
+                    <a:bodyPr/>
+                    <a:lstStyle/>
+                    <a:p>
+                      <a:pPr algn="l" fontAlgn="b"/>
+                      <a:r>
+                        <a:rPr lang="en-US" sz="2000" b="0" i="0" u="none" strike="noStrike">
+                          <a:solidFill>
+                            <a:schemeClr val="bg1"/>
+                          </a:solidFill>
+                          <a:effectLst/>
+                          <a:latin typeface="Calibri" panose="020F0502020204030204" pitchFamily="34" charset="0"/>
+                        </a:rPr>
+                        <a:t>Non-US</a:t>
+                      </a:r>
+                    </a:p>
+                  </a:txBody>
+                  <a:tcPr marL="9525" marR="9525" marT="9525" marB="0" anchor="b">
+                    <a:lnL>
+                      <a:noFill/>
+                    </a:lnL>
+                    <a:lnR>
+                      <a:noFill/>
+                    </a:lnR>
+                    <a:lnT>
+                      <a:noFill/>
+                    </a:lnT>
+                    <a:lnB>
+                      <a:noFill/>
+                    </a:lnB>
+                  </a:tcPr>
+                </a:tc>
+                <a:tc>
+                  <a:txBody>
+                    <a:bodyPr/>
+                    <a:lstStyle/>
+                    <a:p>
+                      <a:pPr algn="r" fontAlgn="b"/>
+                      <a:r>
+                        <a:rPr lang="en-US" sz="2000" b="0" i="0" u="none" strike="noStrike" dirty="0">
+                          <a:solidFill>
+                            <a:schemeClr val="bg1"/>
+                          </a:solidFill>
+                          <a:effectLst/>
+                          <a:latin typeface="Calibri" panose="020F0502020204030204" pitchFamily="34" charset="0"/>
+                        </a:rPr>
+                        <a:t>6.11</a:t>
+                      </a:r>
+                    </a:p>
+                  </a:txBody>
+                  <a:tcPr marL="9525" marR="9525" marT="9525" marB="0" anchor="b">
+                    <a:lnL>
+                      <a:noFill/>
+                    </a:lnL>
+                    <a:lnR>
+                      <a:noFill/>
+                    </a:lnR>
+                    <a:lnT>
+                      <a:noFill/>
+                    </a:lnT>
+                    <a:lnB>
+                      <a:noFill/>
+                    </a:lnB>
+                  </a:tcPr>
+                </a:tc>
+                <a:extLst>
+                  <a:ext uri="{0D108BD9-81ED-4DB2-BD59-A6C34878D82A}">
+                    <a16:rowId xmlns:a16="http://schemas.microsoft.com/office/drawing/2014/main" val="3509964866"/>
+                  </a:ext>
+                </a:extLst>
+              </a:tr>
+              <a:tr h="494878">
+                <a:tc>
+                  <a:txBody>
+                    <a:bodyPr/>
+                    <a:lstStyle/>
+                    <a:p>
+                      <a:pPr algn="l" fontAlgn="b"/>
+                      <a:r>
+                        <a:rPr lang="en-US" sz="2000" b="0" i="0" u="none" strike="noStrike">
+                          <a:solidFill>
+                            <a:schemeClr val="bg1"/>
+                          </a:solidFill>
+                          <a:effectLst/>
+                          <a:latin typeface="Calibri" panose="020F0502020204030204" pitchFamily="34" charset="0"/>
+                        </a:rPr>
+                        <a:t>Netflix</a:t>
+                      </a:r>
+                    </a:p>
+                  </a:txBody>
+                  <a:tcPr marL="9525" marR="9525" marT="9525" marB="0" anchor="b">
+                    <a:lnL>
+                      <a:noFill/>
+                    </a:lnL>
+                    <a:lnR>
+                      <a:noFill/>
+                    </a:lnR>
+                    <a:lnT>
+                      <a:noFill/>
+                    </a:lnT>
+                    <a:lnB>
+                      <a:noFill/>
+                    </a:lnB>
+                  </a:tcPr>
+                </a:tc>
+                <a:tc>
+                  <a:txBody>
+                    <a:bodyPr/>
+                    <a:lstStyle/>
+                    <a:p>
+                      <a:pPr algn="l" fontAlgn="b"/>
+                      <a:r>
+                        <a:rPr lang="en-US" sz="2000" b="0" i="0" u="none" strike="noStrike">
+                          <a:solidFill>
+                            <a:schemeClr val="bg1"/>
+                          </a:solidFill>
+                          <a:effectLst/>
+                          <a:latin typeface="Calibri" panose="020F0502020204030204" pitchFamily="34" charset="0"/>
+                        </a:rPr>
+                        <a:t>US</a:t>
+                      </a:r>
+                    </a:p>
+                  </a:txBody>
+                  <a:tcPr marL="9525" marR="9525" marT="9525" marB="0" anchor="b">
+                    <a:lnL>
+                      <a:noFill/>
+                    </a:lnL>
+                    <a:lnR>
+                      <a:noFill/>
+                    </a:lnR>
+                    <a:lnT>
+                      <a:noFill/>
+                    </a:lnT>
+                    <a:lnB>
+                      <a:noFill/>
+                    </a:lnB>
+                  </a:tcPr>
+                </a:tc>
+                <a:tc>
+                  <a:txBody>
+                    <a:bodyPr/>
+                    <a:lstStyle/>
+                    <a:p>
+                      <a:pPr algn="r" fontAlgn="b"/>
+                      <a:r>
+                        <a:rPr lang="en-US" sz="2000" b="0" i="0" u="none" strike="noStrike" dirty="0">
+                          <a:solidFill>
+                            <a:schemeClr val="bg1"/>
+                          </a:solidFill>
+                          <a:effectLst/>
+                          <a:latin typeface="Calibri" panose="020F0502020204030204" pitchFamily="34" charset="0"/>
+                        </a:rPr>
+                        <a:t>6.12</a:t>
+                      </a:r>
+                    </a:p>
+                  </a:txBody>
+                  <a:tcPr marL="9525" marR="9525" marT="9525" marB="0" anchor="b">
+                    <a:lnL>
+                      <a:noFill/>
+                    </a:lnL>
+                    <a:lnR>
+                      <a:noFill/>
+                    </a:lnR>
+                    <a:lnT>
+                      <a:noFill/>
+                    </a:lnT>
+                    <a:lnB>
+                      <a:noFill/>
+                    </a:lnB>
+                  </a:tcPr>
+                </a:tc>
+                <a:extLst>
+                  <a:ext uri="{0D108BD9-81ED-4DB2-BD59-A6C34878D82A}">
+                    <a16:rowId xmlns:a16="http://schemas.microsoft.com/office/drawing/2014/main" val="718340116"/>
+                  </a:ext>
+                </a:extLst>
+              </a:tr>
+            </a:tbl>
+          </a:graphicData>
+        </a:graphic>
+      </p:graphicFrame>
+    </p:spTree>
+    <p:extLst>
+      <p:ext uri="{BB962C8B-B14F-4D97-AF65-F5344CB8AC3E}">
+        <p14:creationId xmlns:p14="http://schemas.microsoft.com/office/powerpoint/2010/main" val="4144514840"/>
+      </p:ext>
+    </p:extLst>
+  </p:cSld>
+  <p:clrMapOvr>
+    <a:masterClrMapping/>
+  </p:clrMapOvr>
+</p:sld>
+</file>
+
+<file path=ppt/slides/slide12.xml><?xml version="1.0" encoding="utf-8"?>
+<p:sld xmlns:a="http://schemas.openxmlformats.org/drawingml/2006/main" xmlns:r="http://schemas.openxmlformats.org/officeDocument/2006/relationships" xmlns:p="http://schemas.openxmlformats.org/presentationml/2006/main">
+  <p:cSld>
+    <p:bg>
+      <p:bgPr>
+        <a:solidFill>
+          <a:schemeClr val="bg1"/>
+        </a:solidFill>
+        <a:effectLst/>
+      </p:bgPr>
+    </p:bg>
+    <p:spTree>
+      <p:nvGrpSpPr>
+        <p:cNvPr id="1" name=""/>
+        <p:cNvGrpSpPr/>
+        <p:nvPr/>
+      </p:nvGrpSpPr>
+      <p:grpSpPr>
+        <a:xfrm>
+          <a:off x="0" y="0"/>
+          <a:ext cx="0" cy="0"/>
+          <a:chOff x="0" y="0"/>
+          <a:chExt cx="0" cy="0"/>
+        </a:xfrm>
+      </p:grpSpPr>
+      <p:sp>
+        <p:nvSpPr>
+          <p:cNvPr id="2" name="Title 1"/>
+          <p:cNvSpPr>
+            <a:spLocks noGrp="1"/>
+          </p:cNvSpPr>
+          <p:nvPr>
+            <p:ph type="title"/>
+          </p:nvPr>
+        </p:nvSpPr>
+        <p:spPr>
+          <a:xfrm>
+            <a:off x="643467" y="643466"/>
+            <a:ext cx="3933390" cy="4937287"/>
+          </a:xfrm>
+        </p:spPr>
+        <p:txBody>
+          <a:bodyPr anchor="ctr">
+            <a:normAutofit/>
+          </a:bodyPr>
+          <a:lstStyle/>
+          <a:p>
+            <a:pPr algn="l"/>
+            <a:r>
+              <a:rPr lang="en-US" sz="4800" dirty="0">
+                <a:solidFill>
+                  <a:schemeClr val="tx1"/>
+                </a:solidFill>
+              </a:rPr>
+              <a:t>Net Steps </a:t>
+            </a:r>
+          </a:p>
+        </p:txBody>
+      </p:sp>
+      <p:sp>
+        <p:nvSpPr>
+          <p:cNvPr id="3" name="Content Placeholder 2"/>
+          <p:cNvSpPr>
+            <a:spLocks noGrp="1"/>
+          </p:cNvSpPr>
+          <p:nvPr>
+            <p:ph idx="1"/>
+          </p:nvPr>
+        </p:nvSpPr>
+        <p:spPr>
+          <a:xfrm>
+            <a:off x="4955354" y="643466"/>
+            <a:ext cx="6593180" cy="4937287"/>
+          </a:xfrm>
+        </p:spPr>
+        <p:txBody>
+          <a:bodyPr anchor="ctr">
+            <a:normAutofit/>
+          </a:bodyPr>
+          <a:lstStyle/>
+          <a:p>
+            <a:pPr marL="0" indent="0">
+              <a:buNone/>
+            </a:pPr>
+            <a:r>
+              <a:rPr lang="en-US" dirty="0"/>
+              <a:t>Integrate other metrics to evaluate the health of the network: </a:t>
+            </a:r>
+          </a:p>
+          <a:p>
+            <a:r>
+              <a:rPr lang="en-US" dirty="0"/>
+              <a:t>How the the length of the movies/TV shows affect ratings </a:t>
+            </a:r>
+          </a:p>
+          <a:p>
+            <a:r>
+              <a:rPr lang="en-US" dirty="0"/>
+              <a:t>Growth of subscription numbers </a:t>
+            </a:r>
+          </a:p>
+          <a:p>
+            <a:r>
+              <a:rPr lang="en-US" dirty="0">
+                <a:sym typeface="Wingdings" pitchFamily="2" charset="2"/>
+              </a:rPr>
+              <a:t>length of TV runtime analysis of the two networks.</a:t>
+            </a:r>
+            <a:endParaRPr lang="en-US" dirty="0"/>
+          </a:p>
+          <a:p>
+            <a:pPr marL="0" indent="0">
+              <a:buNone/>
+            </a:pPr>
+            <a:r>
+              <a:rPr lang="en-US" dirty="0"/>
+              <a:t>A deeper dive into subtypes of products provided: </a:t>
+            </a:r>
+          </a:p>
+          <a:p>
+            <a:r>
+              <a:rPr lang="en-US" dirty="0"/>
+              <a:t>Movies  </a:t>
+            </a:r>
+            <a:r>
+              <a:rPr lang="en-US" dirty="0">
+                <a:sym typeface="Wingdings" pitchFamily="2" charset="2"/>
+              </a:rPr>
+              <a:t> TV movies </a:t>
+            </a:r>
+          </a:p>
+          <a:p>
+            <a:r>
+              <a:rPr lang="en-US" dirty="0">
+                <a:sym typeface="Wingdings" pitchFamily="2" charset="2"/>
+              </a:rPr>
+              <a:t>TV shows  mini series </a:t>
+            </a:r>
+            <a:endParaRPr lang="en-US" dirty="0"/>
+          </a:p>
+          <a:p>
+            <a:endParaRPr lang="en-US" dirty="0"/>
+          </a:p>
+          <a:p>
+            <a:endParaRPr dirty="0"/>
+          </a:p>
+        </p:txBody>
+      </p:sp>
+    </p:spTree>
+    <p:extLst>
+      <p:ext uri="{BB962C8B-B14F-4D97-AF65-F5344CB8AC3E}">
+        <p14:creationId xmlns:p14="http://schemas.microsoft.com/office/powerpoint/2010/main" val="3148112563"/>
+      </p:ext>
+    </p:extLst>
+  </p:cSld>
+  <p:clrMapOvr>
+    <a:overrideClrMapping bg1="dk1" tx1="lt1" bg2="dk2" tx2="lt2" accent1="accent1" accent2="accent2" accent3="accent3" accent4="accent4" accent5="accent5" accent6="accent6" hlink="hlink" folHlink="folHlink"/>
+  </p:clrMapOvr>
+</p:sld>
+</file>
+
+<file path=ppt/slides/slide13.xml><?xml version="1.0" encoding="utf-8"?>
+<p:sld xmlns:a="http://schemas.openxmlformats.org/drawingml/2006/main" xmlns:r="http://schemas.openxmlformats.org/officeDocument/2006/relationships" xmlns:p="http://schemas.openxmlformats.org/presentationml/2006/main">
+  <p:cSld>
+    <p:bg>
+      <p:bgPr>
+        <a:solidFill>
+          <a:schemeClr val="tx1"/>
+        </a:solidFill>
+        <a:effectLst/>
+      </p:bgPr>
+    </p:bg>
+    <p:spTree>
+      <p:nvGrpSpPr>
+        <p:cNvPr id="1" name=""/>
+        <p:cNvGrpSpPr/>
+        <p:nvPr/>
+      </p:nvGrpSpPr>
+      <p:grpSpPr>
+        <a:xfrm>
+          <a:off x="0" y="0"/>
+          <a:ext cx="0" cy="0"/>
+          <a:chOff x="0" y="0"/>
+          <a:chExt cx="0" cy="0"/>
+        </a:xfrm>
+      </p:grpSpPr>
+      <p:sp>
+        <p:nvSpPr>
+          <p:cNvPr id="2" name="Title 1"/>
+          <p:cNvSpPr>
+            <a:spLocks noGrp="1"/>
+          </p:cNvSpPr>
+          <p:nvPr>
+            <p:ph type="title"/>
+          </p:nvPr>
+        </p:nvSpPr>
+        <p:spPr>
+          <a:xfrm>
+            <a:off x="643467" y="643466"/>
+            <a:ext cx="3933390" cy="4937287"/>
+          </a:xfrm>
+        </p:spPr>
+        <p:txBody>
+          <a:bodyPr anchor="b">
+            <a:normAutofit/>
+          </a:bodyPr>
+          <a:lstStyle/>
+          <a:p>
+            <a:pPr algn="l"/>
+            <a:r>
+              <a:rPr lang="en-US" sz="4800" dirty="0">
+                <a:solidFill>
+                  <a:schemeClr val="bg1"/>
+                </a:solidFill>
+              </a:rPr>
+              <a:t>Appendix</a:t>
+            </a:r>
+          </a:p>
+        </p:txBody>
+      </p:sp>
+      <p:sp>
+        <p:nvSpPr>
+          <p:cNvPr id="3" name="Content Placeholder 2"/>
+          <p:cNvSpPr>
+            <a:spLocks noGrp="1"/>
+          </p:cNvSpPr>
+          <p:nvPr>
+            <p:ph idx="1"/>
+          </p:nvPr>
+        </p:nvSpPr>
+        <p:spPr>
+          <a:xfrm>
+            <a:off x="4955354" y="643466"/>
+            <a:ext cx="6593180" cy="4937287"/>
+          </a:xfrm>
+        </p:spPr>
+        <p:txBody>
+          <a:bodyPr>
+            <a:normAutofit/>
+          </a:bodyPr>
+          <a:lstStyle/>
+          <a:p>
+            <a:r>
+              <a:rPr lang="en-US" dirty="0">
+                <a:solidFill>
+                  <a:schemeClr val="bg1"/>
+                </a:solidFill>
+              </a:rPr>
+              <a:t>Kaggle Datasets: </a:t>
+            </a:r>
+          </a:p>
+          <a:p>
+            <a:pPr lvl="1"/>
+            <a:r>
+              <a:rPr lang="en-US" dirty="0">
+                <a:solidFill>
+                  <a:schemeClr val="bg1"/>
+                </a:solidFill>
+              </a:rPr>
+              <a:t>Disney Plus Movie and TV shows by Raphael Fontes</a:t>
+            </a:r>
+          </a:p>
+          <a:p>
+            <a:pPr lvl="1"/>
+            <a:r>
+              <a:rPr lang="en-US" dirty="0">
+                <a:solidFill>
+                  <a:schemeClr val="bg1"/>
+                </a:solidFill>
+              </a:rPr>
+              <a:t>Netflix Movie and TV shows by </a:t>
+            </a:r>
+            <a:r>
+              <a:rPr lang="en-US" dirty="0" err="1">
+                <a:solidFill>
+                  <a:schemeClr val="bg1"/>
+                </a:solidFill>
+              </a:rPr>
+              <a:t>Snehaan</a:t>
+            </a:r>
+            <a:r>
+              <a:rPr lang="en-US" dirty="0">
+                <a:solidFill>
+                  <a:schemeClr val="bg1"/>
+                </a:solidFill>
+              </a:rPr>
+              <a:t> </a:t>
+            </a:r>
+            <a:r>
+              <a:rPr lang="en-US" dirty="0" err="1">
+                <a:solidFill>
+                  <a:schemeClr val="bg1"/>
+                </a:solidFill>
+              </a:rPr>
+              <a:t>Bhawal</a:t>
+            </a:r>
+            <a:endParaRPr lang="en-US" dirty="0">
+              <a:solidFill>
+                <a:schemeClr val="bg1"/>
+              </a:solidFill>
+            </a:endParaRPr>
+          </a:p>
+          <a:p>
+            <a:pPr lvl="1"/>
+            <a:endParaRPr dirty="0"/>
+          </a:p>
+        </p:txBody>
+      </p:sp>
+    </p:spTree>
+    <p:extLst>
+      <p:ext uri="{BB962C8B-B14F-4D97-AF65-F5344CB8AC3E}">
+        <p14:creationId xmlns:p14="http://schemas.microsoft.com/office/powerpoint/2010/main" val="1365792527"/>
+      </p:ext>
+    </p:extLst>
+  </p:cSld>
+  <p:clrMapOvr>
+    <a:masterClrMapping/>
+  </p:clrMapOvr>
+</p:sld>
+</file>
+
 <file path=ppt/slides/slide2.xml><?xml version="1.0" encoding="utf-8"?>
 <p:sld xmlns:a="http://schemas.openxmlformats.org/drawingml/2006/main" xmlns:r="http://schemas.openxmlformats.org/officeDocument/2006/relationships" xmlns:p="http://schemas.openxmlformats.org/presentationml/2006/main">
   <p:cSld>
@@ -8219,8 +9910,8 @@
         </p:nvSpPr>
         <p:spPr>
           <a:xfrm>
-            <a:off x="7872618" y="663373"/>
-            <a:ext cx="3684644" cy="1608487"/>
+            <a:off x="2552473" y="646747"/>
+            <a:ext cx="6508400" cy="1608487"/>
           </a:xfrm>
         </p:spPr>
         <p:txBody>
@@ -8259,49 +9950,33 @@
         </p:nvSpPr>
         <p:spPr>
           <a:xfrm>
-            <a:off x="7872618" y="2422689"/>
-            <a:ext cx="3684644" cy="3791848"/>
+            <a:off x="1904080" y="2023678"/>
+            <a:ext cx="8434792" cy="3791848"/>
           </a:xfrm>
         </p:spPr>
         <p:txBody>
           <a:bodyPr>
-            <a:normAutofit/>
+            <a:noAutofit/>
           </a:bodyPr>
           <a:lstStyle/>
           <a:p>
             <a:r>
-              <a:rPr lang="en-US" dirty="0">
+              <a:rPr lang="en-US" sz="3200" dirty="0">
                 <a:solidFill>
                   <a:schemeClr val="bg1"/>
                 </a:solidFill>
               </a:rPr>
-              <a:t>How do the movies in Disney movies perform in terms of ratings as compared with Netflix’ movies of the same genres? </a:t>
+              <a:t>How do the movies in Disney plus network perform in terms of ratings as compared with Netflix’ movies of the same genres? </a:t>
             </a:r>
           </a:p>
           <a:p>
             <a:r>
-              <a:rPr lang="en-US" dirty="0">
+              <a:rPr lang="en-US" sz="3200" dirty="0">
                 <a:solidFill>
                   <a:schemeClr val="bg1"/>
                 </a:solidFill>
               </a:rPr>
-              <a:t>How should Disney </a:t>
-            </a:r>
-            <a:r>
-              <a:rPr lang="en-US" dirty="0" err="1">
-                <a:solidFill>
-                  <a:schemeClr val="bg1"/>
-                </a:solidFill>
-              </a:rPr>
-              <a:t>Plus’</a:t>
-            </a:r>
-            <a:r>
-              <a:rPr lang="en-US" dirty="0">
-                <a:solidFill>
-                  <a:schemeClr val="bg1"/>
-                </a:solidFill>
-              </a:rPr>
-              <a:t> form its strategy going forward to maintain it’s competitive edge? </a:t>
+              <a:t>How should Disney Plus form its strategy going forward to maintain it’s competitiveness. </a:t>
             </a:r>
           </a:p>
         </p:txBody>
@@ -8357,30 +10032,90 @@
           </p:pic>
         </mc:Fallback>
       </mc:AlternateContent>
+    </p:spTree>
+    <p:extLst>
+      <p:ext uri="{BB962C8B-B14F-4D97-AF65-F5344CB8AC3E}">
+        <p14:creationId xmlns:p14="http://schemas.microsoft.com/office/powerpoint/2010/main" val="1604509109"/>
+      </p:ext>
+    </p:extLst>
+  </p:cSld>
+  <p:clrMapOvr>
+    <a:masterClrMapping/>
+  </p:clrMapOvr>
+</p:sld>
+</file>
+
+<file path=ppt/slides/slide5.xml><?xml version="1.0" encoding="utf-8"?>
+<p:sld xmlns:a="http://schemas.openxmlformats.org/drawingml/2006/main" xmlns:r="http://schemas.openxmlformats.org/officeDocument/2006/relationships" xmlns:p="http://schemas.openxmlformats.org/presentationml/2006/main">
+  <p:cSld>
+    <p:spTree>
+      <p:nvGrpSpPr>
+        <p:cNvPr id="1" name=""/>
+        <p:cNvGrpSpPr/>
+        <p:nvPr/>
+      </p:nvGrpSpPr>
+      <p:grpSpPr>
+        <a:xfrm>
+          <a:off x="0" y="0"/>
+          <a:ext cx="0" cy="0"/>
+          <a:chOff x="0" y="0"/>
+          <a:chExt cx="0" cy="0"/>
+        </a:xfrm>
+      </p:grpSpPr>
+      <p:sp>
+        <p:nvSpPr>
+          <p:cNvPr id="2" name="Title 1">
+            <a:extLst>
+              <a:ext uri="{FF2B5EF4-FFF2-40B4-BE49-F238E27FC236}">
+                <a16:creationId xmlns:a16="http://schemas.microsoft.com/office/drawing/2014/main" id="{D01853E3-70EB-A041-968D-49ACEF6978F2}"/>
+              </a:ext>
+            </a:extLst>
+          </p:cNvPr>
+          <p:cNvSpPr>
+            <a:spLocks noGrp="1"/>
+          </p:cNvSpPr>
+          <p:nvPr>
+            <p:ph type="title"/>
+          </p:nvPr>
+        </p:nvSpPr>
+        <p:spPr/>
+        <p:txBody>
+          <a:bodyPr/>
+          <a:lstStyle/>
+          <a:p>
+            <a:r>
+              <a:rPr lang="en-US" dirty="0"/>
+              <a:t>Contents of Disney Plus</a:t>
+            </a:r>
+          </a:p>
+        </p:txBody>
+      </p:sp>
       <p:pic>
         <p:nvPicPr>
-          <p:cNvPr id="12" name="Picture 11" descr="Chart, bar chart&#10;&#10;Description automatically generated">
+          <p:cNvPr id="4" name="Content Placeholder 3" descr="Chart, bar chart&#10;&#10;Description automatically generated">
             <a:extLst>
               <a:ext uri="{FF2B5EF4-FFF2-40B4-BE49-F238E27FC236}">
-                <a16:creationId xmlns:a16="http://schemas.microsoft.com/office/drawing/2014/main" id="{4EE55820-56A1-0040-982D-CE2B840FDB22}"/>
+                <a16:creationId xmlns:a16="http://schemas.microsoft.com/office/drawing/2014/main" id="{6A3E329A-CC45-314C-9969-D4A52C45F9C8}"/>
               </a:ext>
             </a:extLst>
           </p:cNvPr>
           <p:cNvPicPr>
-            <a:picLocks noChangeAspect="1"/>
+            <a:picLocks noGrp="1" noChangeAspect="1"/>
           </p:cNvPicPr>
-          <p:nvPr/>
+          <p:nvPr>
+            <p:ph idx="1"/>
+          </p:nvPr>
         </p:nvPicPr>
         <p:blipFill>
-          <a:blip r:embed="rId5"/>
+          <a:blip r:embed="rId2"/>
           <a:stretch>
             <a:fillRect/>
           </a:stretch>
         </p:blipFill>
         <p:spPr>
           <a:xfrm>
-            <a:off x="401096" y="663373"/>
-            <a:ext cx="7471522" cy="5436437"/>
+            <a:off x="4569025" y="847898"/>
+            <a:ext cx="6860975" cy="4679327"/>
           </a:xfrm>
           <a:prstGeom prst="rect">
             <a:avLst/>
@@ -8390,7 +10125,7 @@
     </p:spTree>
     <p:extLst>
       <p:ext uri="{BB962C8B-B14F-4D97-AF65-F5344CB8AC3E}">
-        <p14:creationId xmlns:p14="http://schemas.microsoft.com/office/powerpoint/2010/main" val="1604509109"/>
+        <p14:creationId xmlns:p14="http://schemas.microsoft.com/office/powerpoint/2010/main" val="2239976508"/>
       </p:ext>
     </p:extLst>
   </p:cSld>
@@ -8407,7 +10142,7 @@
                 <p:stCondLst>
                   <p:cond evt="onClick" delay="0">
                     <p:tgtEl>
-                      <p:spTgt spid="12"/>
+                      <p:spTgt spid="4"/>
                     </p:tgtEl>
                   </p:cond>
                 </p:stCondLst>
@@ -8441,7 +10176,7 @@
                                           </p:stCondLst>
                                         </p:cTn>
                                         <p:tgtEl>
-                                          <p:spTgt spid="12"/>
+                                          <p:spTgt spid="4"/>
                                         </p:tgtEl>
                                         <p:attrNameLst>
                                           <p:attrName>style.visibility</p:attrName>
@@ -8465,7 +10200,7 @@
               <p:nextCondLst>
                 <p:cond evt="onClick" delay="0">
                   <p:tgtEl>
-                    <p:spTgt spid="12"/>
+                    <p:spTgt spid="4"/>
                   </p:tgtEl>
                 </p:cond>
               </p:nextCondLst>
@@ -8478,7 +10213,7 @@
 </p:sld>
 </file>
 
-<file path=ppt/slides/slide5.xml><?xml version="1.0" encoding="utf-8"?>
+<file path=ppt/slides/slide6.xml><?xml version="1.0" encoding="utf-8"?>
 <p:sld xmlns:a="http://schemas.openxmlformats.org/drawingml/2006/main" xmlns:r="http://schemas.openxmlformats.org/officeDocument/2006/relationships" xmlns:p="http://schemas.openxmlformats.org/presentationml/2006/main">
   <p:cSld>
     <p:bg>
@@ -8532,7 +10267,7 @@
                   <a:schemeClr val="tx1"/>
                 </a:solidFill>
               </a:rPr>
-              <a:t>Ratings of the top 5 genres with the most movies, compared with Netflix: </a:t>
+              <a:t>Ratings of the top 5 produced genres on Disney Plus, compared with Netflix: </a:t>
             </a:r>
             <a:br>
               <a:rPr lang="en-US" sz="3400" dirty="0">
@@ -8591,8 +10326,8 @@
         </p:blipFill>
         <p:spPr>
           <a:xfrm>
-            <a:off x="643467" y="3511461"/>
-            <a:ext cx="1939389" cy="2405245"/>
+            <a:off x="404735" y="2818151"/>
+            <a:ext cx="2178122" cy="3098555"/>
           </a:xfrm>
         </p:spPr>
       </p:pic>
@@ -8618,8 +10353,8 @@
         </p:blipFill>
         <p:spPr>
           <a:xfrm>
-            <a:off x="2614154" y="3511461"/>
-            <a:ext cx="1962703" cy="2408006"/>
+            <a:off x="2614154" y="2818151"/>
+            <a:ext cx="1962703" cy="3101316"/>
           </a:xfrm>
           <a:prstGeom prst="rect">
             <a:avLst/>
@@ -8648,8 +10383,8 @@
         </p:blipFill>
         <p:spPr>
           <a:xfrm>
-            <a:off x="4599464" y="3508700"/>
-            <a:ext cx="1911130" cy="2408006"/>
+            <a:off x="4599464" y="2815390"/>
+            <a:ext cx="1911130" cy="3101316"/>
           </a:xfrm>
           <a:prstGeom prst="rect">
             <a:avLst/>
@@ -8678,8 +10413,8 @@
         </p:blipFill>
         <p:spPr>
           <a:xfrm>
-            <a:off x="6510594" y="3508700"/>
-            <a:ext cx="1936458" cy="2408007"/>
+            <a:off x="6510594" y="2815390"/>
+            <a:ext cx="1936458" cy="3101317"/>
           </a:xfrm>
           <a:prstGeom prst="rect">
             <a:avLst/>
@@ -8708,8 +10443,8 @@
         </p:blipFill>
         <p:spPr>
           <a:xfrm>
-            <a:off x="8461318" y="3508699"/>
-            <a:ext cx="2070525" cy="2408007"/>
+            <a:off x="8461318" y="2815391"/>
+            <a:ext cx="2070525" cy="3101316"/>
           </a:xfrm>
           <a:prstGeom prst="rect">
             <a:avLst/>
@@ -8729,13 +10464,13 @@
 </p:sld>
 </file>
 
-<file path=ppt/slides/slide6.xml><?xml version="1.0" encoding="utf-8"?>
+<file path=ppt/slides/slide7.xml><?xml version="1.0" encoding="utf-8"?>
 <p:sld xmlns:a="http://schemas.openxmlformats.org/drawingml/2006/main" xmlns:r="http://schemas.openxmlformats.org/officeDocument/2006/relationships" xmlns:p="http://schemas.openxmlformats.org/presentationml/2006/main">
   <p:cSld>
     <p:bg>
       <p:bgPr>
         <a:solidFill>
-          <a:schemeClr val="tx1"/>
+          <a:schemeClr val="bg1"/>
         </a:solidFill>
         <a:effectLst/>
       </p:bgPr>
@@ -8756,10 +10491,10 @@
       </p:grpSpPr>
       <p:sp>
         <p:nvSpPr>
-          <p:cNvPr id="24" name="Freeform 6">
+          <p:cNvPr id="39" name="Freeform 6">
             <a:extLst>
               <a:ext uri="{FF2B5EF4-FFF2-40B4-BE49-F238E27FC236}">
-                <a16:creationId xmlns:a16="http://schemas.microsoft.com/office/drawing/2014/main" id="{8D703176-F087-49BA-A656-5CC6F20B9F2B}"/>
+                <a16:creationId xmlns:a16="http://schemas.microsoft.com/office/drawing/2014/main" id="{49EC5C96-A5B7-48AF-865B-32EA92606F85}"/>
               </a:ext>
               <a:ext uri="{C183D7F6-B498-43B3-948B-1728B52AA6E4}">
                 <adec:decorative xmlns:adec="http://schemas.microsoft.com/office/drawing/2017/decorative" val="1"/>
@@ -8970,10 +10705,10 @@
       </p:sp>
       <p:cxnSp>
         <p:nvCxnSpPr>
-          <p:cNvPr id="26" name="Straight Connector 25">
+          <p:cNvPr id="41" name="Straight Connector 40">
             <a:extLst>
               <a:ext uri="{FF2B5EF4-FFF2-40B4-BE49-F238E27FC236}">
-                <a16:creationId xmlns:a16="http://schemas.microsoft.com/office/drawing/2014/main" id="{307CD5FC-5DE4-430B-8C6F-CB974291E48C}"/>
+                <a16:creationId xmlns:a16="http://schemas.microsoft.com/office/drawing/2014/main" id="{87D3361C-8AD4-4C09-8E01-4332488617AB}"/>
               </a:ext>
               <a:ext uri="{C183D7F6-B498-43B3-948B-1728B52AA6E4}">
                 <adec:decorative xmlns:adec="http://schemas.microsoft.com/office/drawing/2017/decorative" val="1"/>
@@ -9020,12 +10755,12 @@
           </a:fontRef>
         </p:style>
       </p:cxnSp>
-      <p:sp useBgFill="1">
+      <p:sp>
         <p:nvSpPr>
-          <p:cNvPr id="28" name="Rectangle 27">
+          <p:cNvPr id="43" name="Rectangle 42">
             <a:extLst>
               <a:ext uri="{FF2B5EF4-FFF2-40B4-BE49-F238E27FC236}">
-                <a16:creationId xmlns:a16="http://schemas.microsoft.com/office/drawing/2014/main" id="{83EFD8A7-AA4D-49D8-873D-ACED3DEF11C0}"/>
+                <a16:creationId xmlns:a16="http://schemas.microsoft.com/office/drawing/2014/main" id="{E266C611-E2DB-4A9B-AF4B-5CAAD1419BE8}"/>
               </a:ext>
               <a:ext uri="{C183D7F6-B498-43B3-948B-1728B52AA6E4}">
                 <adec:decorative xmlns:adec="http://schemas.microsoft.com/office/drawing/2017/decorative" val="1"/>
@@ -9043,10 +10778,139 @@
             </p:extLst>
           </p:nvPr>
         </p:nvSpPr>
-        <p:spPr bwMode="white">
+        <p:spPr>
           <a:xfrm>
             <a:off x="0" y="0"/>
             <a:ext cx="12192000" cy="6858000"/>
+          </a:xfrm>
+          <a:prstGeom prst="rect">
+            <a:avLst/>
+          </a:prstGeom>
+          <a:solidFill>
+            <a:schemeClr val="tx1"/>
+          </a:solidFill>
+          <a:ln>
+            <a:noFill/>
+          </a:ln>
+        </p:spPr>
+        <p:style>
+          <a:lnRef idx="2">
+            <a:schemeClr val="accent1">
+              <a:shade val="50000"/>
+            </a:schemeClr>
+          </a:lnRef>
+          <a:fillRef idx="1">
+            <a:schemeClr val="accent1"/>
+          </a:fillRef>
+          <a:effectRef idx="0">
+            <a:schemeClr val="accent1"/>
+          </a:effectRef>
+          <a:fontRef idx="minor">
+            <a:schemeClr val="lt1"/>
+          </a:fontRef>
+        </p:style>
+        <p:txBody>
+          <a:bodyPr rtlCol="0" anchor="ctr"/>
+          <a:lstStyle/>
+          <a:p>
+            <a:pPr algn="ctr"/>
+            <a:endParaRPr lang="en-US"/>
+          </a:p>
+        </p:txBody>
+      </p:sp>
+      <p:sp>
+        <p:nvSpPr>
+          <p:cNvPr id="6" name="Title 5">
+            <a:extLst>
+              <a:ext uri="{FF2B5EF4-FFF2-40B4-BE49-F238E27FC236}">
+                <a16:creationId xmlns:a16="http://schemas.microsoft.com/office/drawing/2014/main" id="{AFB6B711-A033-E44D-A181-09339C8658FD}"/>
+              </a:ext>
+            </a:extLst>
+          </p:cNvPr>
+          <p:cNvSpPr>
+            <a:spLocks noGrp="1"/>
+          </p:cNvSpPr>
+          <p:nvPr>
+            <p:ph type="title"/>
+          </p:nvPr>
+        </p:nvSpPr>
+        <p:spPr>
+          <a:xfrm>
+            <a:off x="6729998" y="1143293"/>
+            <a:ext cx="4808409" cy="4268965"/>
+          </a:xfrm>
+        </p:spPr>
+        <p:txBody>
+          <a:bodyPr vert="horz" lIns="91440" tIns="45720" rIns="91440" bIns="45720" rtlCol="0" anchor="t">
+            <a:normAutofit/>
+          </a:bodyPr>
+          <a:lstStyle/>
+          <a:p>
+            <a:pPr algn="l">
+              <a:lnSpc>
+                <a:spcPct val="85000"/>
+              </a:lnSpc>
+            </a:pPr>
+            <a:r>
+              <a:rPr lang="en-US" sz="2800" cap="all" dirty="0">
+                <a:solidFill>
+                  <a:schemeClr val="bg2"/>
+                </a:solidFill>
+              </a:rPr>
+              <a:t>Additionally…</a:t>
+            </a:r>
+            <a:br>
+              <a:rPr lang="en-US" sz="2800" cap="all" dirty="0">
+                <a:solidFill>
+                  <a:schemeClr val="bg2"/>
+                </a:solidFill>
+              </a:rPr>
+            </a:br>
+            <a:br>
+              <a:rPr lang="en-US" sz="2800" cap="all" dirty="0">
+                <a:solidFill>
+                  <a:schemeClr val="bg2"/>
+                </a:solidFill>
+              </a:rPr>
+            </a:br>
+            <a:r>
+              <a:rPr lang="en-US" sz="2800" cap="all" dirty="0">
+                <a:solidFill>
+                  <a:schemeClr val="bg2"/>
+                </a:solidFill>
+              </a:rPr>
+              <a:t>Disney movies performance in these two categories are also worth noticing. . </a:t>
+            </a:r>
+          </a:p>
+        </p:txBody>
+      </p:sp>
+      <p:sp useBgFill="1">
+        <p:nvSpPr>
+          <p:cNvPr id="45" name="Rectangle 44">
+            <a:extLst>
+              <a:ext uri="{FF2B5EF4-FFF2-40B4-BE49-F238E27FC236}">
+                <a16:creationId xmlns:a16="http://schemas.microsoft.com/office/drawing/2014/main" id="{A515A96A-EDCC-4F66-A9A6-2C9F7E707AE6}"/>
+              </a:ext>
+              <a:ext uri="{C183D7F6-B498-43B3-948B-1728B52AA6E4}">
+                <adec:decorative xmlns:adec="http://schemas.microsoft.com/office/drawing/2017/decorative" val="1"/>
+              </a:ext>
+            </a:extLst>
+          </p:cNvPr>
+          <p:cNvSpPr>
+            <a:spLocks noGrp="1" noRot="1" noChangeAspect="1" noMove="1" noResize="1" noEditPoints="1" noAdjustHandles="1" noChangeArrowheads="1" noChangeShapeType="1" noTextEdit="1"/>
+          </p:cNvSpPr>
+          <p:nvPr>
+            <p:extLst>
+              <p:ext uri="{386F3935-93C4-4BCD-93E2-E3B085C9AB24}">
+                <p16:designElem xmlns:p16="http://schemas.microsoft.com/office/powerpoint/2015/main" val="1"/>
+              </p:ext>
+            </p:extLst>
+          </p:nvPr>
+        </p:nvSpPr>
+        <p:spPr>
+          <a:xfrm>
+            <a:off x="0" y="0"/>
+            <a:ext cx="6096000" cy="6858000"/>
           </a:xfrm>
           <a:prstGeom prst="rect">
             <a:avLst/>
@@ -9072,212 +10936,6 @@
           </a:fontRef>
         </p:style>
         <p:txBody>
-          <a:bodyPr rot="0" spcFirstLastPara="0" vert="horz" wrap="square" lIns="91440" tIns="45720" rIns="91440" bIns="45720" numCol="1" spcCol="0" rtlCol="0" fromWordArt="0" anchor="ctr" anchorCtr="0" forceAA="0" compatLnSpc="1">
-            <a:prstTxWarp prst="textNoShape">
-              <a:avLst/>
-            </a:prstTxWarp>
-            <a:noAutofit/>
-          </a:bodyPr>
-          <a:lstStyle>
-            <a:defPPr>
-              <a:defRPr lang="en-US"/>
-            </a:defPPr>
-            <a:lvl1pPr marL="0" algn="l" defTabSz="457200" rtl="0" eaLnBrk="1" latinLnBrk="0" hangingPunct="1">
-              <a:defRPr sz="1800" kern="1200">
-                <a:solidFill>
-                  <a:schemeClr val="lt1"/>
-                </a:solidFill>
-                <a:latin typeface="+mn-lt"/>
-                <a:ea typeface="+mn-ea"/>
-                <a:cs typeface="+mn-cs"/>
-              </a:defRPr>
-            </a:lvl1pPr>
-            <a:lvl2pPr marL="457200" algn="l" defTabSz="457200" rtl="0" eaLnBrk="1" latinLnBrk="0" hangingPunct="1">
-              <a:defRPr sz="1800" kern="1200">
-                <a:solidFill>
-                  <a:schemeClr val="lt1"/>
-                </a:solidFill>
-                <a:latin typeface="+mn-lt"/>
-                <a:ea typeface="+mn-ea"/>
-                <a:cs typeface="+mn-cs"/>
-              </a:defRPr>
-            </a:lvl2pPr>
-            <a:lvl3pPr marL="914400" algn="l" defTabSz="457200" rtl="0" eaLnBrk="1" latinLnBrk="0" hangingPunct="1">
-              <a:defRPr sz="1800" kern="1200">
-                <a:solidFill>
-                  <a:schemeClr val="lt1"/>
-                </a:solidFill>
-                <a:latin typeface="+mn-lt"/>
-                <a:ea typeface="+mn-ea"/>
-                <a:cs typeface="+mn-cs"/>
-              </a:defRPr>
-            </a:lvl3pPr>
-            <a:lvl4pPr marL="1371600" algn="l" defTabSz="457200" rtl="0" eaLnBrk="1" latinLnBrk="0" hangingPunct="1">
-              <a:defRPr sz="1800" kern="1200">
-                <a:solidFill>
-                  <a:schemeClr val="lt1"/>
-                </a:solidFill>
-                <a:latin typeface="+mn-lt"/>
-                <a:ea typeface="+mn-ea"/>
-                <a:cs typeface="+mn-cs"/>
-              </a:defRPr>
-            </a:lvl4pPr>
-            <a:lvl5pPr marL="1828800" algn="l" defTabSz="457200" rtl="0" eaLnBrk="1" latinLnBrk="0" hangingPunct="1">
-              <a:defRPr sz="1800" kern="1200">
-                <a:solidFill>
-                  <a:schemeClr val="lt1"/>
-                </a:solidFill>
-                <a:latin typeface="+mn-lt"/>
-                <a:ea typeface="+mn-ea"/>
-                <a:cs typeface="+mn-cs"/>
-              </a:defRPr>
-            </a:lvl5pPr>
-            <a:lvl6pPr marL="2286000" algn="l" defTabSz="457200" rtl="0" eaLnBrk="1" latinLnBrk="0" hangingPunct="1">
-              <a:defRPr sz="1800" kern="1200">
-                <a:solidFill>
-                  <a:schemeClr val="lt1"/>
-                </a:solidFill>
-                <a:latin typeface="+mn-lt"/>
-                <a:ea typeface="+mn-ea"/>
-                <a:cs typeface="+mn-cs"/>
-              </a:defRPr>
-            </a:lvl6pPr>
-            <a:lvl7pPr marL="2743200" algn="l" defTabSz="457200" rtl="0" eaLnBrk="1" latinLnBrk="0" hangingPunct="1">
-              <a:defRPr sz="1800" kern="1200">
-                <a:solidFill>
-                  <a:schemeClr val="lt1"/>
-                </a:solidFill>
-                <a:latin typeface="+mn-lt"/>
-                <a:ea typeface="+mn-ea"/>
-                <a:cs typeface="+mn-cs"/>
-              </a:defRPr>
-            </a:lvl7pPr>
-            <a:lvl8pPr marL="3200400" algn="l" defTabSz="457200" rtl="0" eaLnBrk="1" latinLnBrk="0" hangingPunct="1">
-              <a:defRPr sz="1800" kern="1200">
-                <a:solidFill>
-                  <a:schemeClr val="lt1"/>
-                </a:solidFill>
-                <a:latin typeface="+mn-lt"/>
-                <a:ea typeface="+mn-ea"/>
-                <a:cs typeface="+mn-cs"/>
-              </a:defRPr>
-            </a:lvl8pPr>
-            <a:lvl9pPr marL="3657600" algn="l" defTabSz="457200" rtl="0" eaLnBrk="1" latinLnBrk="0" hangingPunct="1">
-              <a:defRPr sz="1800" kern="1200">
-                <a:solidFill>
-                  <a:schemeClr val="lt1"/>
-                </a:solidFill>
-                <a:latin typeface="+mn-lt"/>
-                <a:ea typeface="+mn-ea"/>
-                <a:cs typeface="+mn-cs"/>
-              </a:defRPr>
-            </a:lvl9pPr>
-          </a:lstStyle>
-          <a:p>
-            <a:pPr algn="ctr"/>
-            <a:endParaRPr lang="en-US"/>
-          </a:p>
-        </p:txBody>
-      </p:sp>
-      <p:sp>
-        <p:nvSpPr>
-          <p:cNvPr id="2" name="Title 1">
-            <a:extLst>
-              <a:ext uri="{FF2B5EF4-FFF2-40B4-BE49-F238E27FC236}">
-                <a16:creationId xmlns:a16="http://schemas.microsoft.com/office/drawing/2014/main" id="{4E50BC31-FA77-F24A-9C72-778483D1E765}"/>
-              </a:ext>
-            </a:extLst>
-          </p:cNvPr>
-          <p:cNvSpPr>
-            <a:spLocks noGrp="1"/>
-          </p:cNvSpPr>
-          <p:nvPr>
-            <p:ph type="title"/>
-          </p:nvPr>
-        </p:nvSpPr>
-        <p:spPr>
-          <a:xfrm>
-            <a:off x="8188391" y="1143293"/>
-            <a:ext cx="3350016" cy="4268965"/>
-          </a:xfrm>
-        </p:spPr>
-        <p:txBody>
-          <a:bodyPr vert="horz" lIns="91440" tIns="45720" rIns="91440" bIns="45720" rtlCol="0" anchor="t">
-            <a:normAutofit/>
-          </a:bodyPr>
-          <a:lstStyle/>
-          <a:p>
-            <a:pPr algn="l">
-              <a:lnSpc>
-                <a:spcPct val="85000"/>
-              </a:lnSpc>
-            </a:pPr>
-            <a:r>
-              <a:rPr lang="en-US" sz="5400" cap="all" dirty="0">
-                <a:solidFill>
-                  <a:schemeClr val="bg1"/>
-                </a:solidFill>
-              </a:rPr>
-              <a:t>What about other genres?</a:t>
-            </a:r>
-          </a:p>
-        </p:txBody>
-      </p:sp>
-      <p:sp>
-        <p:nvSpPr>
-          <p:cNvPr id="30" name="Rectangle 29">
-            <a:extLst>
-              <a:ext uri="{FF2B5EF4-FFF2-40B4-BE49-F238E27FC236}">
-                <a16:creationId xmlns:a16="http://schemas.microsoft.com/office/drawing/2014/main" id="{22F657E9-3064-48B4-8664-72991DD51188}"/>
-              </a:ext>
-              <a:ext uri="{C183D7F6-B498-43B3-948B-1728B52AA6E4}">
-                <adec:decorative xmlns:adec="http://schemas.microsoft.com/office/drawing/2017/decorative" val="1"/>
-              </a:ext>
-            </a:extLst>
-          </p:cNvPr>
-          <p:cNvSpPr>
-            <a:spLocks noGrp="1" noRot="1" noChangeAspect="1" noMove="1" noResize="1" noEditPoints="1" noAdjustHandles="1" noChangeArrowheads="1" noChangeShapeType="1" noTextEdit="1"/>
-          </p:cNvSpPr>
-          <p:nvPr>
-            <p:extLst>
-              <p:ext uri="{386F3935-93C4-4BCD-93E2-E3B085C9AB24}">
-                <p16:designElem xmlns:p16="http://schemas.microsoft.com/office/powerpoint/2015/main" val="1"/>
-              </p:ext>
-            </p:extLst>
-          </p:nvPr>
-        </p:nvSpPr>
-        <p:spPr>
-          <a:xfrm>
-            <a:off x="0" y="0"/>
-            <a:ext cx="7552578" cy="6858000"/>
-          </a:xfrm>
-          <a:prstGeom prst="rect">
-            <a:avLst/>
-          </a:prstGeom>
-          <a:solidFill>
-            <a:srgbClr val="FFFFFF"/>
-          </a:solidFill>
-          <a:ln>
-            <a:noFill/>
-          </a:ln>
-        </p:spPr>
-        <p:style>
-          <a:lnRef idx="2">
-            <a:schemeClr val="accent1">
-              <a:shade val="50000"/>
-            </a:schemeClr>
-          </a:lnRef>
-          <a:fillRef idx="1">
-            <a:schemeClr val="accent1"/>
-          </a:fillRef>
-          <a:effectRef idx="0">
-            <a:schemeClr val="accent1"/>
-          </a:effectRef>
-          <a:fontRef idx="minor">
-            <a:schemeClr val="lt1"/>
-          </a:fontRef>
-        </p:style>
-        <p:txBody>
           <a:bodyPr rtlCol="0" anchor="ctr"/>
           <a:lstStyle/>
           <a:p>
@@ -9288,10 +10946,10 @@
       </p:sp>
       <p:cxnSp>
         <p:nvCxnSpPr>
-          <p:cNvPr id="32" name="Straight Connector 31">
+          <p:cNvPr id="47" name="Straight Connector 46">
             <a:extLst>
               <a:ext uri="{FF2B5EF4-FFF2-40B4-BE49-F238E27FC236}">
-                <a16:creationId xmlns:a16="http://schemas.microsoft.com/office/drawing/2014/main" id="{D118C93E-025C-4159-B9F9-8C0F79B8E30C}"/>
+                <a16:creationId xmlns:a16="http://schemas.microsoft.com/office/drawing/2014/main" id="{F6CB954E-283F-476E-A23C-E68827B9BC55}"/>
               </a:ext>
               <a:ext uri="{C183D7F6-B498-43B3-948B-1728B52AA6E4}">
                 <adec:decorative xmlns:adec="http://schemas.microsoft.com/office/drawing/2017/decorative" val="1"/>
@@ -9319,7 +10977,7 @@
           </a:prstGeom>
           <a:ln w="25400">
             <a:solidFill>
-              <a:srgbClr val="1D1A1D"/>
+              <a:schemeClr val="tx2"/>
             </a:solidFill>
           </a:ln>
         </p:spPr>
@@ -9360,38 +11018,8 @@
         </p:blipFill>
         <p:spPr>
           <a:xfrm>
-            <a:off x="809043" y="1438835"/>
-            <a:ext cx="3268484" cy="1691440"/>
-          </a:xfrm>
-          <a:prstGeom prst="rect">
-            <a:avLst/>
-          </a:prstGeom>
-        </p:spPr>
-      </p:pic>
-      <p:pic>
-        <p:nvPicPr>
-          <p:cNvPr id="19" name="Picture 18" descr="Chart, box and whisker chart&#10;&#10;Description automatically generated">
-            <a:extLst>
-              <a:ext uri="{FF2B5EF4-FFF2-40B4-BE49-F238E27FC236}">
-                <a16:creationId xmlns:a16="http://schemas.microsoft.com/office/drawing/2014/main" id="{4E016D63-9C77-AF42-B57F-B579B0B3282E}"/>
-              </a:ext>
-            </a:extLst>
-          </p:cNvPr>
-          <p:cNvPicPr>
-            <a:picLocks noChangeAspect="1"/>
-          </p:cNvPicPr>
-          <p:nvPr/>
-        </p:nvPicPr>
-        <p:blipFill>
-          <a:blip r:embed="rId3"/>
-          <a:stretch>
-            <a:fillRect/>
-          </a:stretch>
-        </p:blipFill>
-        <p:spPr>
-          <a:xfrm>
-            <a:off x="4281677" y="1143293"/>
-            <a:ext cx="2949431" cy="1489462"/>
+            <a:off x="773854" y="1618938"/>
+            <a:ext cx="5302549" cy="3981761"/>
           </a:xfrm>
           <a:prstGeom prst="rect">
             <a:avLst/>
@@ -9400,10 +11028,10 @@
       </p:pic>
       <p:sp>
         <p:nvSpPr>
-          <p:cNvPr id="34" name="Freeform 6">
+          <p:cNvPr id="49" name="Freeform 6">
             <a:extLst>
               <a:ext uri="{FF2B5EF4-FFF2-40B4-BE49-F238E27FC236}">
-                <a16:creationId xmlns:a16="http://schemas.microsoft.com/office/drawing/2014/main" id="{CB9BD557-2EFD-490D-A981-000015760371}"/>
+                <a16:creationId xmlns:a16="http://schemas.microsoft.com/office/drawing/2014/main" id="{F54799E2-F4CD-4D3E-93AE-30EFA6487459}"/>
               </a:ext>
               <a:ext uri="{C183D7F6-B498-43B3-948B-1728B52AA6E4}">
                 <adec:decorative xmlns:adec="http://schemas.microsoft.com/office/drawing/2017/decorative" val="1"/>
@@ -9601,7 +11229,7 @@
             </a:pathLst>
           </a:custGeom>
           <a:solidFill>
-            <a:schemeClr val="tx2"/>
+            <a:schemeClr val="bg2"/>
           </a:solidFill>
           <a:ln w="0">
             <a:noFill/>
@@ -9612,68 +11240,6 @@
           </a:ln>
         </p:spPr>
       </p:sp>
-      <p:pic>
-        <p:nvPicPr>
-          <p:cNvPr id="11" name="Content Placeholder 10" descr="Chart, box and whisker chart&#10;&#10;Description automatically generated">
-            <a:extLst>
-              <a:ext uri="{FF2B5EF4-FFF2-40B4-BE49-F238E27FC236}">
-                <a16:creationId xmlns:a16="http://schemas.microsoft.com/office/drawing/2014/main" id="{0803CF04-3E9E-F840-9009-EB0FD9D36ADB}"/>
-              </a:ext>
-            </a:extLst>
-          </p:cNvPr>
-          <p:cNvPicPr>
-            <a:picLocks noGrp="1" noChangeAspect="1"/>
-          </p:cNvPicPr>
-          <p:nvPr>
-            <p:ph idx="1"/>
-          </p:nvPr>
-        </p:nvPicPr>
-        <p:blipFill>
-          <a:blip r:embed="rId4"/>
-          <a:stretch>
-            <a:fillRect/>
-          </a:stretch>
-        </p:blipFill>
-        <p:spPr>
-          <a:xfrm>
-            <a:off x="1128096" y="4279979"/>
-            <a:ext cx="2942864" cy="1471431"/>
-          </a:xfrm>
-          <a:prstGeom prst="rect">
-            <a:avLst/>
-          </a:prstGeom>
-        </p:spPr>
-      </p:pic>
-      <p:pic>
-        <p:nvPicPr>
-          <p:cNvPr id="15" name="Picture 14" descr="Chart, box and whisker chart&#10;&#10;Description automatically generated">
-            <a:extLst>
-              <a:ext uri="{FF2B5EF4-FFF2-40B4-BE49-F238E27FC236}">
-                <a16:creationId xmlns:a16="http://schemas.microsoft.com/office/drawing/2014/main" id="{27FEE460-52AB-094C-B34D-970B932EA71D}"/>
-              </a:ext>
-            </a:extLst>
-          </p:cNvPr>
-          <p:cNvPicPr>
-            <a:picLocks noChangeAspect="1"/>
-          </p:cNvPicPr>
-          <p:nvPr/>
-        </p:nvPicPr>
-        <p:blipFill>
-          <a:blip r:embed="rId5"/>
-          <a:stretch>
-            <a:fillRect/>
-          </a:stretch>
-        </p:blipFill>
-        <p:spPr>
-          <a:xfrm>
-            <a:off x="4281676" y="3810000"/>
-            <a:ext cx="2949431" cy="1474714"/>
-          </a:xfrm>
-          <a:prstGeom prst="rect">
-            <a:avLst/>
-          </a:prstGeom>
-        </p:spPr>
-      </p:pic>
     </p:spTree>
     <p:extLst>
       <p:ext uri="{BB962C8B-B14F-4D97-AF65-F5344CB8AC3E}">
@@ -9687,13 +11253,13 @@
 </p:sld>
 </file>
 
-<file path=ppt/slides/slide7.xml><?xml version="1.0" encoding="utf-8"?>
+<file path=ppt/slides/slide8.xml><?xml version="1.0" encoding="utf-8"?>
 <p:sld xmlns:a="http://schemas.openxmlformats.org/drawingml/2006/main" xmlns:r="http://schemas.openxmlformats.org/officeDocument/2006/relationships" xmlns:p="http://schemas.openxmlformats.org/presentationml/2006/main">
   <p:cSld>
     <p:bg>
       <p:bgPr>
         <a:solidFill>
-          <a:schemeClr val="tx1"/>
+          <a:schemeClr val="bg2"/>
         </a:solidFill>
         <a:effectLst/>
       </p:bgPr>
@@ -9712,9 +11278,138 @@
           <a:chExt cx="0" cy="0"/>
         </a:xfrm>
       </p:grpSpPr>
+      <p:sp useBgFill="1">
+        <p:nvSpPr>
+          <p:cNvPr id="19" name="Rectangle 18">
+            <a:extLst>
+              <a:ext uri="{FF2B5EF4-FFF2-40B4-BE49-F238E27FC236}">
+                <a16:creationId xmlns:a16="http://schemas.microsoft.com/office/drawing/2014/main" id="{4281BC32-FF58-4898-A6B5-7B3D059BCEB0}"/>
+              </a:ext>
+              <a:ext uri="{C183D7F6-B498-43B3-948B-1728B52AA6E4}">
+                <adec:decorative xmlns:adec="http://schemas.microsoft.com/office/drawing/2017/decorative" val="1"/>
+              </a:ext>
+            </a:extLst>
+          </p:cNvPr>
+          <p:cNvSpPr>
+            <a:spLocks noGrp="1" noRot="1" noChangeAspect="1" noMove="1" noResize="1" noEditPoints="1" noAdjustHandles="1" noChangeArrowheads="1" noChangeShapeType="1" noTextEdit="1"/>
+          </p:cNvSpPr>
+          <p:nvPr>
+            <p:extLst>
+              <p:ext uri="{386F3935-93C4-4BCD-93E2-E3B085C9AB24}">
+                <p16:designElem xmlns:p16="http://schemas.microsoft.com/office/powerpoint/2015/main" val="1"/>
+              </p:ext>
+            </p:extLst>
+          </p:nvPr>
+        </p:nvSpPr>
+        <p:spPr>
+          <a:xfrm>
+            <a:off x="0" y="0"/>
+            <a:ext cx="12192000" cy="6858000"/>
+          </a:xfrm>
+          <a:prstGeom prst="rect">
+            <a:avLst/>
+          </a:prstGeom>
+          <a:ln>
+            <a:noFill/>
+          </a:ln>
+        </p:spPr>
+        <p:style>
+          <a:lnRef idx="2">
+            <a:schemeClr val="accent1">
+              <a:shade val="50000"/>
+            </a:schemeClr>
+          </a:lnRef>
+          <a:fillRef idx="1">
+            <a:schemeClr val="accent1"/>
+          </a:fillRef>
+          <a:effectRef idx="0">
+            <a:schemeClr val="accent1"/>
+          </a:effectRef>
+          <a:fontRef idx="minor">
+            <a:schemeClr val="lt1"/>
+          </a:fontRef>
+        </p:style>
+        <p:txBody>
+          <a:bodyPr rtlCol="0" anchor="ctr"/>
+          <a:lstStyle/>
+          <a:p>
+            <a:pPr algn="ctr"/>
+            <a:endParaRPr lang="en-US"/>
+          </a:p>
+        </p:txBody>
+      </p:sp>
       <p:sp>
         <p:nvSpPr>
-          <p:cNvPr id="2" name="Title 1"/>
+          <p:cNvPr id="21" name="Rectangle 20">
+            <a:extLst>
+              <a:ext uri="{FF2B5EF4-FFF2-40B4-BE49-F238E27FC236}">
+                <a16:creationId xmlns:a16="http://schemas.microsoft.com/office/drawing/2014/main" id="{0D614406-135F-4875-9C87-53822CB19ABB}"/>
+              </a:ext>
+              <a:ext uri="{C183D7F6-B498-43B3-948B-1728B52AA6E4}">
+                <adec:decorative xmlns:adec="http://schemas.microsoft.com/office/drawing/2017/decorative" val="1"/>
+              </a:ext>
+            </a:extLst>
+          </p:cNvPr>
+          <p:cNvSpPr>
+            <a:spLocks noGrp="1" noRot="1" noChangeAspect="1" noMove="1" noResize="1" noEditPoints="1" noAdjustHandles="1" noChangeArrowheads="1" noChangeShapeType="1" noTextEdit="1"/>
+          </p:cNvSpPr>
+          <p:nvPr>
+            <p:extLst>
+              <p:ext uri="{386F3935-93C4-4BCD-93E2-E3B085C9AB24}">
+                <p16:designElem xmlns:p16="http://schemas.microsoft.com/office/powerpoint/2015/main" val="1"/>
+              </p:ext>
+            </p:extLst>
+          </p:nvPr>
+        </p:nvSpPr>
+        <p:spPr>
+          <a:xfrm>
+            <a:off x="0" y="0"/>
+            <a:ext cx="12191999" cy="2285999"/>
+          </a:xfrm>
+          <a:prstGeom prst="rect">
+            <a:avLst/>
+          </a:prstGeom>
+          <a:solidFill>
+            <a:schemeClr val="tx1"/>
+          </a:solidFill>
+          <a:ln>
+            <a:noFill/>
+          </a:ln>
+        </p:spPr>
+        <p:style>
+          <a:lnRef idx="2">
+            <a:schemeClr val="accent1">
+              <a:shade val="50000"/>
+            </a:schemeClr>
+          </a:lnRef>
+          <a:fillRef idx="1">
+            <a:schemeClr val="accent1"/>
+          </a:fillRef>
+          <a:effectRef idx="0">
+            <a:schemeClr val="accent1"/>
+          </a:effectRef>
+          <a:fontRef idx="minor">
+            <a:schemeClr val="lt1"/>
+          </a:fontRef>
+        </p:style>
+        <p:txBody>
+          <a:bodyPr rtlCol="0" anchor="ctr"/>
+          <a:lstStyle/>
+          <a:p>
+            <a:pPr algn="ctr"/>
+            <a:endParaRPr lang="en-US"/>
+          </a:p>
+        </p:txBody>
+      </p:sp>
+      <p:sp>
+        <p:nvSpPr>
+          <p:cNvPr id="2" name="Title 1">
+            <a:extLst>
+              <a:ext uri="{FF2B5EF4-FFF2-40B4-BE49-F238E27FC236}">
+                <a16:creationId xmlns:a16="http://schemas.microsoft.com/office/drawing/2014/main" id="{1F4141D7-9417-8643-91A5-1104E1740292}"/>
+              </a:ext>
+            </a:extLst>
+          </p:cNvPr>
           <p:cNvSpPr>
             <a:spLocks noGrp="1"/>
           </p:cNvSpPr>
@@ -9724,66 +11419,328 @@
         </p:nvSpPr>
         <p:spPr>
           <a:xfrm>
-            <a:off x="7872618" y="663373"/>
-            <a:ext cx="3684644" cy="1608487"/>
+            <a:off x="960120" y="434101"/>
+            <a:ext cx="10440697" cy="1232750"/>
           </a:xfrm>
         </p:spPr>
         <p:txBody>
-          <a:bodyPr>
-            <a:normAutofit fontScale="90000"/>
+          <a:bodyPr anchor="b">
+            <a:normAutofit/>
           </a:bodyPr>
           <a:lstStyle/>
           <a:p>
-            <a:pPr algn="l"/>
             <a:r>
-              <a:rPr lang="en-US" sz="3100" dirty="0">
+              <a:rPr lang="en-US" sz="3900" dirty="0">
                 <a:solidFill>
                   <a:schemeClr val="bg1"/>
                 </a:solidFill>
               </a:rPr>
-              <a:t>How did Disney Plus grow its movie contents since its launch?</a:t>
+              <a:t>What about the influence of the network?</a:t>
             </a:r>
           </a:p>
         </p:txBody>
       </p:sp>
+      <p:cxnSp>
+        <p:nvCxnSpPr>
+          <p:cNvPr id="23" name="Straight Connector 22">
+            <a:extLst>
+              <a:ext uri="{FF2B5EF4-FFF2-40B4-BE49-F238E27FC236}">
+                <a16:creationId xmlns:a16="http://schemas.microsoft.com/office/drawing/2014/main" id="{C6C21149-7D17-44C2-AFB6-4D931DC55FB1}"/>
+              </a:ext>
+              <a:ext uri="{C183D7F6-B498-43B3-948B-1728B52AA6E4}">
+                <adec:decorative xmlns:adec="http://schemas.microsoft.com/office/drawing/2017/decorative" val="1"/>
+              </a:ext>
+            </a:extLst>
+          </p:cNvPr>
+          <p:cNvCxnSpPr>
+            <a:cxnSpLocks noGrp="1" noRot="1" noChangeAspect="1" noMove="1" noResize="1" noEditPoints="1" noAdjustHandles="1" noChangeArrowheads="1" noChangeShapeType="1"/>
+          </p:cNvCxnSpPr>
+          <p:nvPr>
+            <p:extLst>
+              <p:ext uri="{386F3935-93C4-4BCD-93E2-E3B085C9AB24}">
+                <p16:designElem xmlns:p16="http://schemas.microsoft.com/office/powerpoint/2015/main" val="1"/>
+              </p:ext>
+            </p:extLst>
+          </p:nvPr>
+        </p:nvCxnSpPr>
+        <p:spPr>
+          <a:xfrm>
+            <a:off x="0" y="1676579"/>
+            <a:ext cx="8129873" cy="6020"/>
+          </a:xfrm>
+          <a:prstGeom prst="line">
+            <a:avLst/>
+          </a:prstGeom>
+          <a:ln w="25400">
+            <a:solidFill>
+              <a:schemeClr val="bg1"/>
+            </a:solidFill>
+          </a:ln>
+        </p:spPr>
+        <p:style>
+          <a:lnRef idx="1">
+            <a:schemeClr val="accent1"/>
+          </a:lnRef>
+          <a:fillRef idx="0">
+            <a:schemeClr val="accent1"/>
+          </a:fillRef>
+          <a:effectRef idx="0">
+            <a:schemeClr val="accent1"/>
+          </a:effectRef>
+          <a:fontRef idx="minor">
+            <a:schemeClr val="tx1"/>
+          </a:fontRef>
+        </p:style>
+      </p:cxnSp>
       <p:sp>
         <p:nvSpPr>
-          <p:cNvPr id="26" name="Content Placeholder 25">
+          <p:cNvPr id="25" name="Freeform 6">
             <a:extLst>
               <a:ext uri="{FF2B5EF4-FFF2-40B4-BE49-F238E27FC236}">
-                <a16:creationId xmlns:a16="http://schemas.microsoft.com/office/drawing/2014/main" id="{E12FEED7-279A-407F-82ED-BF88D8956AFB}"/>
+                <a16:creationId xmlns:a16="http://schemas.microsoft.com/office/drawing/2014/main" id="{C2E5FCF0-567A-448C-A6E3-920BFC702C2F}"/>
+              </a:ext>
+              <a:ext uri="{C183D7F6-B498-43B3-948B-1728B52AA6E4}">
+                <adec:decorative xmlns:adec="http://schemas.microsoft.com/office/drawing/2017/decorative" val="1"/>
               </a:ext>
             </a:extLst>
           </p:cNvPr>
           <p:cNvSpPr>
-            <a:spLocks noGrp="1"/>
+            <a:spLocks noGrp="1" noRot="1" noChangeAspect="1" noMove="1" noResize="1" noEditPoints="1" noAdjustHandles="1" noChangeArrowheads="1" noChangeShapeType="1" noTextEdit="1"/>
           </p:cNvSpPr>
+          <p:nvPr>
+            <p:extLst>
+              <p:ext uri="{386F3935-93C4-4BCD-93E2-E3B085C9AB24}">
+                <p16:designElem xmlns:p16="http://schemas.microsoft.com/office/powerpoint/2015/main" val="1"/>
+              </p:ext>
+            </p:extLst>
+          </p:nvPr>
+        </p:nvSpPr>
+        <p:spPr bwMode="auto">
+          <a:xfrm>
+            <a:off x="11784011" y="938535"/>
+            <a:ext cx="407988" cy="819150"/>
+          </a:xfrm>
+          <a:custGeom>
+            <a:avLst/>
+            <a:gdLst/>
+            <a:ahLst/>
+            <a:cxnLst/>
+            <a:rect l="0" t="0" r="r" b="b"/>
+            <a:pathLst>
+              <a:path w="1799" h="3612">
+                <a:moveTo>
+                  <a:pt x="1799" y="0"/>
+                </a:moveTo>
+                <a:lnTo>
+                  <a:pt x="1799" y="3612"/>
+                </a:lnTo>
+                <a:lnTo>
+                  <a:pt x="1686" y="3609"/>
+                </a:lnTo>
+                <a:lnTo>
+                  <a:pt x="1574" y="3598"/>
+                </a:lnTo>
+                <a:lnTo>
+                  <a:pt x="1464" y="3581"/>
+                </a:lnTo>
+                <a:lnTo>
+                  <a:pt x="1357" y="3557"/>
+                </a:lnTo>
+                <a:lnTo>
+                  <a:pt x="1251" y="3527"/>
+                </a:lnTo>
+                <a:lnTo>
+                  <a:pt x="1150" y="3490"/>
+                </a:lnTo>
+                <a:lnTo>
+                  <a:pt x="1050" y="3448"/>
+                </a:lnTo>
+                <a:lnTo>
+                  <a:pt x="953" y="3401"/>
+                </a:lnTo>
+                <a:lnTo>
+                  <a:pt x="860" y="3347"/>
+                </a:lnTo>
+                <a:lnTo>
+                  <a:pt x="771" y="3289"/>
+                </a:lnTo>
+                <a:lnTo>
+                  <a:pt x="686" y="3224"/>
+                </a:lnTo>
+                <a:lnTo>
+                  <a:pt x="604" y="3156"/>
+                </a:lnTo>
+                <a:lnTo>
+                  <a:pt x="527" y="3083"/>
+                </a:lnTo>
+                <a:lnTo>
+                  <a:pt x="454" y="3005"/>
+                </a:lnTo>
+                <a:lnTo>
+                  <a:pt x="386" y="2923"/>
+                </a:lnTo>
+                <a:lnTo>
+                  <a:pt x="323" y="2838"/>
+                </a:lnTo>
+                <a:lnTo>
+                  <a:pt x="265" y="2748"/>
+                </a:lnTo>
+                <a:lnTo>
+                  <a:pt x="211" y="2655"/>
+                </a:lnTo>
+                <a:lnTo>
+                  <a:pt x="163" y="2559"/>
+                </a:lnTo>
+                <a:lnTo>
+                  <a:pt x="121" y="2459"/>
+                </a:lnTo>
+                <a:lnTo>
+                  <a:pt x="85" y="2356"/>
+                </a:lnTo>
+                <a:lnTo>
+                  <a:pt x="55" y="2251"/>
+                </a:lnTo>
+                <a:lnTo>
+                  <a:pt x="32" y="2143"/>
+                </a:lnTo>
+                <a:lnTo>
+                  <a:pt x="14" y="2033"/>
+                </a:lnTo>
+                <a:lnTo>
+                  <a:pt x="4" y="1920"/>
+                </a:lnTo>
+                <a:lnTo>
+                  <a:pt x="0" y="1806"/>
+                </a:lnTo>
+                <a:lnTo>
+                  <a:pt x="4" y="1692"/>
+                </a:lnTo>
+                <a:lnTo>
+                  <a:pt x="14" y="1580"/>
+                </a:lnTo>
+                <a:lnTo>
+                  <a:pt x="32" y="1469"/>
+                </a:lnTo>
+                <a:lnTo>
+                  <a:pt x="55" y="1362"/>
+                </a:lnTo>
+                <a:lnTo>
+                  <a:pt x="85" y="1256"/>
+                </a:lnTo>
+                <a:lnTo>
+                  <a:pt x="121" y="1154"/>
+                </a:lnTo>
+                <a:lnTo>
+                  <a:pt x="163" y="1054"/>
+                </a:lnTo>
+                <a:lnTo>
+                  <a:pt x="211" y="958"/>
+                </a:lnTo>
+                <a:lnTo>
+                  <a:pt x="265" y="864"/>
+                </a:lnTo>
+                <a:lnTo>
+                  <a:pt x="323" y="774"/>
+                </a:lnTo>
+                <a:lnTo>
+                  <a:pt x="386" y="689"/>
+                </a:lnTo>
+                <a:lnTo>
+                  <a:pt x="454" y="607"/>
+                </a:lnTo>
+                <a:lnTo>
+                  <a:pt x="527" y="529"/>
+                </a:lnTo>
+                <a:lnTo>
+                  <a:pt x="604" y="456"/>
+                </a:lnTo>
+                <a:lnTo>
+                  <a:pt x="686" y="388"/>
+                </a:lnTo>
+                <a:lnTo>
+                  <a:pt x="771" y="325"/>
+                </a:lnTo>
+                <a:lnTo>
+                  <a:pt x="860" y="266"/>
+                </a:lnTo>
+                <a:lnTo>
+                  <a:pt x="953" y="212"/>
+                </a:lnTo>
+                <a:lnTo>
+                  <a:pt x="1050" y="164"/>
+                </a:lnTo>
+                <a:lnTo>
+                  <a:pt x="1150" y="122"/>
+                </a:lnTo>
+                <a:lnTo>
+                  <a:pt x="1251" y="85"/>
+                </a:lnTo>
+                <a:lnTo>
+                  <a:pt x="1357" y="55"/>
+                </a:lnTo>
+                <a:lnTo>
+                  <a:pt x="1464" y="32"/>
+                </a:lnTo>
+                <a:lnTo>
+                  <a:pt x="1574" y="14"/>
+                </a:lnTo>
+                <a:lnTo>
+                  <a:pt x="1686" y="5"/>
+                </a:lnTo>
+                <a:lnTo>
+                  <a:pt x="1799" y="0"/>
+                </a:lnTo>
+                <a:close/>
+              </a:path>
+            </a:pathLst>
+          </a:custGeom>
+          <a:solidFill>
+            <a:schemeClr val="bg2"/>
+          </a:solidFill>
+          <a:ln w="0">
+            <a:noFill/>
+            <a:prstDash val="solid"/>
+            <a:round/>
+            <a:headEnd/>
+            <a:tailEnd/>
+          </a:ln>
+        </p:spPr>
+      </p:sp>
+      <p:pic>
+        <p:nvPicPr>
+          <p:cNvPr id="5" name="Content Placeholder 4" descr="Chart, box and whisker chart&#10;&#10;Description automatically generated">
+            <a:extLst>
+              <a:ext uri="{FF2B5EF4-FFF2-40B4-BE49-F238E27FC236}">
+                <a16:creationId xmlns:a16="http://schemas.microsoft.com/office/drawing/2014/main" id="{C556ECF6-5C3C-8549-B790-B821AB0759E5}"/>
+              </a:ext>
+            </a:extLst>
+          </p:cNvPr>
+          <p:cNvPicPr>
+            <a:picLocks noGrp="1" noChangeAspect="1"/>
+          </p:cNvPicPr>
           <p:nvPr>
             <p:ph idx="1"/>
           </p:nvPr>
-        </p:nvSpPr>
+        </p:nvPicPr>
+        <p:blipFill>
+          <a:blip r:embed="rId2"/>
+          <a:stretch>
+            <a:fillRect/>
+          </a:stretch>
+        </p:blipFill>
         <p:spPr>
           <a:xfrm>
-            <a:off x="7872618" y="2422689"/>
-            <a:ext cx="3684644" cy="3791848"/>
+            <a:off x="1" y="2295727"/>
+            <a:ext cx="2194560" cy="3672852"/>
           </a:xfrm>
         </p:spPr>
-        <p:txBody>
-          <a:bodyPr>
-            <a:normAutofit/>
-          </a:bodyPr>
-          <a:lstStyle/>
-          <a:p>
-            <a:endParaRPr lang="en-US"/>
-          </a:p>
-        </p:txBody>
-      </p:sp>
+      </p:pic>
       <p:pic>
         <p:nvPicPr>
-          <p:cNvPr id="5" name="Content Placeholder 4" descr="Chart, line chart&#10;&#10;Description automatically generated">
+          <p:cNvPr id="7" name="Picture 6" descr="Chart, box and whisker chart&#10;&#10;Description automatically generated">
             <a:extLst>
               <a:ext uri="{FF2B5EF4-FFF2-40B4-BE49-F238E27FC236}">
-                <a16:creationId xmlns:a16="http://schemas.microsoft.com/office/drawing/2014/main" id="{64CFC75E-8FA7-9E40-947A-5BED394D204D}"/>
+                <a16:creationId xmlns:a16="http://schemas.microsoft.com/office/drawing/2014/main" id="{78AF1CBB-403D-624D-BA74-08E6477CA865}"/>
               </a:ext>
             </a:extLst>
           </p:cNvPr>
@@ -9800,8 +11757,98 @@
         </p:blipFill>
         <p:spPr>
           <a:xfrm>
-            <a:off x="636915" y="872162"/>
-            <a:ext cx="6915663" cy="4806385"/>
+            <a:off x="2142663" y="2295727"/>
+            <a:ext cx="2434541" cy="3556433"/>
+          </a:xfrm>
+          <a:prstGeom prst="rect">
+            <a:avLst/>
+          </a:prstGeom>
+        </p:spPr>
+      </p:pic>
+      <p:pic>
+        <p:nvPicPr>
+          <p:cNvPr id="11" name="Picture 10" descr="Chart, box and whisker chart&#10;&#10;Description automatically generated">
+            <a:extLst>
+              <a:ext uri="{FF2B5EF4-FFF2-40B4-BE49-F238E27FC236}">
+                <a16:creationId xmlns:a16="http://schemas.microsoft.com/office/drawing/2014/main" id="{4E01D088-87DA-8F4C-A1FB-4BD3EF74AE42}"/>
+              </a:ext>
+            </a:extLst>
+          </p:cNvPr>
+          <p:cNvPicPr>
+            <a:picLocks noChangeAspect="1"/>
+          </p:cNvPicPr>
+          <p:nvPr/>
+        </p:nvPicPr>
+        <p:blipFill>
+          <a:blip r:embed="rId4"/>
+          <a:stretch>
+            <a:fillRect/>
+          </a:stretch>
+        </p:blipFill>
+        <p:spPr>
+          <a:xfrm>
+            <a:off x="4577204" y="2337867"/>
+            <a:ext cx="2674911" cy="3630712"/>
+          </a:xfrm>
+          <a:prstGeom prst="rect">
+            <a:avLst/>
+          </a:prstGeom>
+        </p:spPr>
+      </p:pic>
+      <p:pic>
+        <p:nvPicPr>
+          <p:cNvPr id="15" name="Picture 14" descr="Chart, box and whisker chart&#10;&#10;Description automatically generated">
+            <a:extLst>
+              <a:ext uri="{FF2B5EF4-FFF2-40B4-BE49-F238E27FC236}">
+                <a16:creationId xmlns:a16="http://schemas.microsoft.com/office/drawing/2014/main" id="{E5CD2769-FA9E-0144-B80F-1512E57E9308}"/>
+              </a:ext>
+            </a:extLst>
+          </p:cNvPr>
+          <p:cNvPicPr>
+            <a:picLocks noChangeAspect="1"/>
+          </p:cNvPicPr>
+          <p:nvPr/>
+        </p:nvPicPr>
+        <p:blipFill>
+          <a:blip r:embed="rId5"/>
+          <a:stretch>
+            <a:fillRect/>
+          </a:stretch>
+        </p:blipFill>
+        <p:spPr>
+          <a:xfrm>
+            <a:off x="7148131" y="2271517"/>
+            <a:ext cx="2434541" cy="3698890"/>
+          </a:xfrm>
+          <a:prstGeom prst="rect">
+            <a:avLst/>
+          </a:prstGeom>
+        </p:spPr>
+      </p:pic>
+      <p:pic>
+        <p:nvPicPr>
+          <p:cNvPr id="17" name="Picture 16" descr="Chart, box and whisker chart&#10;&#10;Description automatically generated">
+            <a:extLst>
+              <a:ext uri="{FF2B5EF4-FFF2-40B4-BE49-F238E27FC236}">
+                <a16:creationId xmlns:a16="http://schemas.microsoft.com/office/drawing/2014/main" id="{DE2B12EF-37CD-5D46-AEAB-D00271CED7F5}"/>
+              </a:ext>
+            </a:extLst>
+          </p:cNvPr>
+          <p:cNvPicPr>
+            <a:picLocks noChangeAspect="1"/>
+          </p:cNvPicPr>
+          <p:nvPr/>
+        </p:nvPicPr>
+        <p:blipFill>
+          <a:blip r:embed="rId6"/>
+          <a:stretch>
+            <a:fillRect/>
+          </a:stretch>
+        </p:blipFill>
+        <p:spPr>
+          <a:xfrm>
+            <a:off x="9418946" y="2295727"/>
+            <a:ext cx="2569059" cy="3672852"/>
           </a:xfrm>
           <a:prstGeom prst="rect">
             <a:avLst/>
@@ -9811,181 +11858,12 @@
     </p:spTree>
     <p:extLst>
       <p:ext uri="{BB962C8B-B14F-4D97-AF65-F5344CB8AC3E}">
-        <p14:creationId xmlns:p14="http://schemas.microsoft.com/office/powerpoint/2010/main" val="3701728251"/>
+        <p14:creationId xmlns:p14="http://schemas.microsoft.com/office/powerpoint/2010/main" val="3418427250"/>
       </p:ext>
     </p:extLst>
   </p:cSld>
   <p:clrMapOvr>
     <a:masterClrMapping/>
-  </p:clrMapOvr>
-</p:sld>
-</file>
-
-<file path=ppt/slides/slide8.xml><?xml version="1.0" encoding="utf-8"?>
-<p:sld xmlns:a="http://schemas.openxmlformats.org/drawingml/2006/main" xmlns:r="http://schemas.openxmlformats.org/officeDocument/2006/relationships" xmlns:p="http://schemas.openxmlformats.org/presentationml/2006/main">
-  <p:cSld>
-    <p:bg>
-      <p:bgPr>
-        <a:solidFill>
-          <a:schemeClr val="bg1"/>
-        </a:solidFill>
-        <a:effectLst/>
-      </p:bgPr>
-    </p:bg>
-    <p:spTree>
-      <p:nvGrpSpPr>
-        <p:cNvPr id="1" name=""/>
-        <p:cNvGrpSpPr/>
-        <p:nvPr/>
-      </p:nvGrpSpPr>
-      <p:grpSpPr>
-        <a:xfrm>
-          <a:off x="0" y="0"/>
-          <a:ext cx="0" cy="0"/>
-          <a:chOff x="0" y="0"/>
-          <a:chExt cx="0" cy="0"/>
-        </a:xfrm>
-      </p:grpSpPr>
-      <p:sp>
-        <p:nvSpPr>
-          <p:cNvPr id="2" name="Title 1"/>
-          <p:cNvSpPr>
-            <a:spLocks noGrp="1"/>
-          </p:cNvSpPr>
-          <p:nvPr>
-            <p:ph type="title"/>
-          </p:nvPr>
-        </p:nvSpPr>
-        <p:spPr>
-          <a:xfrm>
-            <a:off x="643467" y="643466"/>
-            <a:ext cx="3933390" cy="4937287"/>
-          </a:xfrm>
-        </p:spPr>
-        <p:txBody>
-          <a:bodyPr anchor="ctr">
-            <a:normAutofit/>
-          </a:bodyPr>
-          <a:lstStyle/>
-          <a:p>
-            <a:pPr algn="l"/>
-            <a:r>
-              <a:rPr lang="en-US" sz="4800" dirty="0">
-                <a:solidFill>
-                  <a:schemeClr val="tx1"/>
-                </a:solidFill>
-              </a:rPr>
-              <a:t>Net Steps </a:t>
-            </a:r>
-          </a:p>
-        </p:txBody>
-      </p:sp>
-      <p:sp>
-        <p:nvSpPr>
-          <p:cNvPr id="3" name="Content Placeholder 2"/>
-          <p:cNvSpPr>
-            <a:spLocks noGrp="1"/>
-          </p:cNvSpPr>
-          <p:nvPr>
-            <p:ph idx="1"/>
-          </p:nvPr>
-        </p:nvSpPr>
-        <p:spPr>
-          <a:xfrm>
-            <a:off x="4955354" y="643466"/>
-            <a:ext cx="6593180" cy="4937287"/>
-          </a:xfrm>
-        </p:spPr>
-        <p:txBody>
-          <a:bodyPr anchor="ctr">
-            <a:normAutofit/>
-          </a:bodyPr>
-          <a:lstStyle/>
-          <a:p>
-            <a:pPr marL="0" indent="0">
-              <a:buNone/>
-            </a:pPr>
-            <a:r>
-              <a:rPr lang="en-US" dirty="0"/>
-              <a:t>Integrate other metrics </a:t>
-            </a:r>
-            <a:r>
-              <a:rPr lang="en-US"/>
-              <a:t>to evaluate </a:t>
-            </a:r>
-            <a:r>
-              <a:rPr lang="en-US" dirty="0"/>
-              <a:t>the health of the network: </a:t>
-            </a:r>
-          </a:p>
-          <a:p>
-            <a:r>
-              <a:rPr lang="en-US" dirty="0"/>
-              <a:t>Average length of TV series? </a:t>
-            </a:r>
-          </a:p>
-          <a:p>
-            <a:r>
-              <a:rPr lang="en-US" dirty="0"/>
-              <a:t>Growth of Subscription numbers </a:t>
-            </a:r>
-          </a:p>
-          <a:p>
-            <a:r>
-              <a:rPr lang="en-US" dirty="0">
-                <a:sym typeface="Wingdings" pitchFamily="2" charset="2"/>
-              </a:rPr>
-              <a:t>length of TV runtime analysis of the two networks.</a:t>
-            </a:r>
-            <a:endParaRPr lang="en-US" dirty="0"/>
-          </a:p>
-          <a:p>
-            <a:pPr marL="0" indent="0">
-              <a:buNone/>
-            </a:pPr>
-            <a:r>
-              <a:rPr lang="en-US" dirty="0"/>
-              <a:t>A deeper dive into subtypes of products provided: </a:t>
-            </a:r>
-          </a:p>
-          <a:p>
-            <a:r>
-              <a:rPr lang="en-US" dirty="0"/>
-              <a:t>Movies  </a:t>
-            </a:r>
-            <a:r>
-              <a:rPr lang="en-US" dirty="0">
-                <a:sym typeface="Wingdings" pitchFamily="2" charset="2"/>
-              </a:rPr>
-              <a:t> TV movies </a:t>
-            </a:r>
-          </a:p>
-          <a:p>
-            <a:r>
-              <a:rPr lang="en-US" dirty="0">
-                <a:sym typeface="Wingdings" pitchFamily="2" charset="2"/>
-              </a:rPr>
-              <a:t>TV shows  mini series </a:t>
-            </a:r>
-            <a:endParaRPr lang="en-US" dirty="0"/>
-          </a:p>
-          <a:p>
-            <a:endParaRPr lang="en-US" dirty="0"/>
-          </a:p>
-          <a:p>
-            <a:endParaRPr dirty="0"/>
-          </a:p>
-        </p:txBody>
-      </p:sp>
-    </p:spTree>
-    <p:extLst>
-      <p:ext uri="{BB962C8B-B14F-4D97-AF65-F5344CB8AC3E}">
-        <p14:creationId xmlns:p14="http://schemas.microsoft.com/office/powerpoint/2010/main" val="3148112563"/>
-      </p:ext>
-    </p:extLst>
-  </p:cSld>
-  <p:clrMapOvr>
-    <a:overrideClrMapping bg1="dk1" tx1="lt1" bg2="dk2" tx2="lt2" accent1="accent1" accent2="accent2" accent3="accent3" accent4="accent4" accent5="accent5" accent6="accent6" hlink="hlink" folHlink="folHlink"/>
   </p:clrMapOvr>
 </p:sld>
 </file>
@@ -10027,31 +11905,72 @@
         </p:nvSpPr>
         <p:spPr>
           <a:xfrm>
-            <a:off x="643467" y="643466"/>
-            <a:ext cx="3933390" cy="4937287"/>
+            <a:off x="1064029" y="663373"/>
+            <a:ext cx="10493233" cy="2454581"/>
           </a:xfrm>
         </p:spPr>
         <p:txBody>
-          <a:bodyPr anchor="b">
+          <a:bodyPr>
             <a:normAutofit/>
           </a:bodyPr>
           <a:lstStyle/>
           <a:p>
             <a:pPr algn="l"/>
             <a:r>
-              <a:rPr lang="en-US" sz="4800" dirty="0">
+              <a:rPr lang="en-US" sz="3100" dirty="0">
                 <a:solidFill>
                   <a:schemeClr val="bg1"/>
                 </a:solidFill>
               </a:rPr>
-              <a:t>Appendix</a:t>
+              <a:t>So what is Disney </a:t>
             </a:r>
+            <a:r>
+              <a:rPr lang="en-US" sz="3100" dirty="0" err="1">
+                <a:solidFill>
+                  <a:schemeClr val="bg1"/>
+                </a:solidFill>
+              </a:rPr>
+              <a:t>Plus’</a:t>
+            </a:r>
+            <a:r>
+              <a:rPr lang="en-US" sz="3100" dirty="0">
+                <a:solidFill>
+                  <a:schemeClr val="bg1"/>
+                </a:solidFill>
+              </a:rPr>
+              <a:t> strategy going forward to sustain its market share in the streaming business?</a:t>
+            </a:r>
+            <a:br>
+              <a:rPr lang="en-US" sz="3100" dirty="0">
+                <a:solidFill>
+                  <a:schemeClr val="bg1"/>
+                </a:solidFill>
+              </a:rPr>
+            </a:br>
+            <a:br>
+              <a:rPr lang="en-US" sz="3100" dirty="0">
+                <a:solidFill>
+                  <a:schemeClr val="bg1"/>
+                </a:solidFill>
+              </a:rPr>
+            </a:br>
+            <a:endParaRPr lang="en-US" sz="3100" dirty="0">
+              <a:solidFill>
+                <a:schemeClr val="bg1"/>
+              </a:solidFill>
+            </a:endParaRPr>
           </a:p>
         </p:txBody>
       </p:sp>
       <p:sp>
         <p:nvSpPr>
-          <p:cNvPr id="3" name="Content Placeholder 2"/>
+          <p:cNvPr id="26" name="Content Placeholder 25">
+            <a:extLst>
+              <a:ext uri="{FF2B5EF4-FFF2-40B4-BE49-F238E27FC236}">
+                <a16:creationId xmlns:a16="http://schemas.microsoft.com/office/drawing/2014/main" id="{E12FEED7-279A-407F-82ED-BF88D8956AFB}"/>
+              </a:ext>
+            </a:extLst>
+          </p:cNvPr>
           <p:cNvSpPr>
             <a:spLocks noGrp="1"/>
           </p:cNvSpPr>
@@ -10061,8 +11980,8 @@
         </p:nvSpPr>
         <p:spPr>
           <a:xfrm>
-            <a:off x="4955354" y="643466"/>
-            <a:ext cx="6593180" cy="4937287"/>
+            <a:off x="1288938" y="2938077"/>
+            <a:ext cx="9434480" cy="3791848"/>
           </a:xfrm>
         </p:spPr>
         <p:txBody>
@@ -10077,29 +11996,7 @@
                   <a:schemeClr val="bg1"/>
                 </a:solidFill>
               </a:rPr>
-              <a:t>Kaggle Datasets: </a:t>
-            </a:r>
-          </a:p>
-          <a:p>
-            <a:pPr lvl="1"/>
-            <a:r>
-              <a:rPr lang="en-US" dirty="0">
-                <a:solidFill>
-                  <a:schemeClr val="bg1"/>
-                </a:solidFill>
-              </a:rPr>
-              <a:t>Disney Plus Movie and TV shows by Raphael Fontes</a:t>
-            </a:r>
-          </a:p>
-          <a:p>
-            <a:pPr lvl="1"/>
-            <a:r>
-              <a:rPr lang="en-US" dirty="0">
-                <a:solidFill>
-                  <a:schemeClr val="bg1"/>
-                </a:solidFill>
-              </a:rPr>
-              <a:t>Netflix Movie and TV shows by </a:t>
+              <a:t> Disney </a:t>
             </a:r>
             <a:r>
               <a:rPr lang="en-US" dirty="0" err="1">
@@ -10107,7 +12004,7 @@
                   <a:schemeClr val="bg1"/>
                 </a:solidFill>
               </a:rPr>
-              <a:t>Snehaan</a:t>
+              <a:t>Plus’</a:t>
             </a:r>
             <a:r>
               <a:rPr lang="en-US" dirty="0">
@@ -10115,32 +12012,16 @@
                   <a:schemeClr val="bg1"/>
                 </a:solidFill>
               </a:rPr>
-              <a:t> </a:t>
+              <a:t> top producing genres also has grown in number, while maintaining higher IMDB ratings than Netflix. </a:t>
             </a:r>
-            <a:r>
-              <a:rPr lang="en-US" dirty="0" err="1">
-                <a:solidFill>
-                  <a:schemeClr val="bg1"/>
-                </a:solidFill>
-              </a:rPr>
-              <a:t>Bhawal</a:t>
-            </a:r>
-            <a:endParaRPr lang="en-US" dirty="0">
-              <a:solidFill>
-                <a:schemeClr val="bg1"/>
-              </a:solidFill>
-            </a:endParaRPr>
-          </a:p>
-          <a:p>
-            <a:pPr lvl="1"/>
-            <a:endParaRPr dirty="0"/>
+            <a:endParaRPr lang="en-US" dirty="0"/>
           </a:p>
         </p:txBody>
       </p:sp>
     </p:spTree>
     <p:extLst>
       <p:ext uri="{BB962C8B-B14F-4D97-AF65-F5344CB8AC3E}">
-        <p14:creationId xmlns:p14="http://schemas.microsoft.com/office/powerpoint/2010/main" val="1365792527"/>
+        <p14:creationId xmlns:p14="http://schemas.microsoft.com/office/powerpoint/2010/main" val="3701728251"/>
       </p:ext>
     </p:extLst>
   </p:cSld>

</xml_diff>

<commit_message>
PPT updates before presentation
</commit_message>
<xml_diff>
--- a/Analysis of Disney Plus Competitiveness over Netflix.pptx
+++ b/Analysis of Disney Plus Competitiveness over Netflix.pptx
@@ -5,22 +5,23 @@
     <p:sldMasterId id="2147483648" r:id="rId1"/>
   </p:sldMasterIdLst>
   <p:notesMasterIdLst>
-    <p:notesMasterId r:id="rId15"/>
+    <p:notesMasterId r:id="rId16"/>
   </p:notesMasterIdLst>
   <p:sldIdLst>
     <p:sldId id="258" r:id="rId2"/>
     <p:sldId id="259" r:id="rId3"/>
     <p:sldId id="266" r:id="rId4"/>
     <p:sldId id="260" r:id="rId5"/>
-    <p:sldId id="270" r:id="rId6"/>
-    <p:sldId id="261" r:id="rId7"/>
-    <p:sldId id="267" r:id="rId8"/>
-    <p:sldId id="268" r:id="rId9"/>
-    <p:sldId id="263" r:id="rId10"/>
-    <p:sldId id="271" r:id="rId11"/>
-    <p:sldId id="269" r:id="rId12"/>
-    <p:sldId id="262" r:id="rId13"/>
-    <p:sldId id="264" r:id="rId14"/>
+    <p:sldId id="272" r:id="rId6"/>
+    <p:sldId id="270" r:id="rId7"/>
+    <p:sldId id="261" r:id="rId8"/>
+    <p:sldId id="267" r:id="rId9"/>
+    <p:sldId id="268" r:id="rId10"/>
+    <p:sldId id="263" r:id="rId11"/>
+    <p:sldId id="271" r:id="rId12"/>
+    <p:sldId id="269" r:id="rId13"/>
+    <p:sldId id="262" r:id="rId14"/>
+    <p:sldId id="264" r:id="rId15"/>
   </p:sldIdLst>
   <p:sldSz cx="12192000" cy="6858000"/>
   <p:notesSz cx="6858000" cy="9144000"/>
@@ -127,2288 +128,6 @@
 </p:presentation>
 </file>
 
-<file path=ppt/diagrams/colors1.xml><?xml version="1.0" encoding="utf-8"?>
-<dgm:colorsDef xmlns:dgm="http://schemas.openxmlformats.org/drawingml/2006/diagram" xmlns:a="http://schemas.openxmlformats.org/drawingml/2006/main" uniqueId="urn:microsoft.com/office/officeart/2005/8/colors/accent0_3">
-  <dgm:title val=""/>
-  <dgm:desc val=""/>
-  <dgm:catLst>
-    <dgm:cat type="mainScheme" pri="10300"/>
-  </dgm:catLst>
-  <dgm:styleLbl name="node0">
-    <dgm:fillClrLst meth="repeat">
-      <a:schemeClr val="dk2"/>
-    </dgm:fillClrLst>
-    <dgm:linClrLst meth="repeat">
-      <a:schemeClr val="lt2"/>
-    </dgm:linClrLst>
-    <dgm:effectClrLst/>
-    <dgm:txLinClrLst/>
-    <dgm:txFillClrLst/>
-    <dgm:txEffectClrLst/>
-  </dgm:styleLbl>
-  <dgm:styleLbl name="alignNode1">
-    <dgm:fillClrLst meth="repeat">
-      <a:schemeClr val="dk2"/>
-    </dgm:fillClrLst>
-    <dgm:linClrLst meth="repeat">
-      <a:schemeClr val="dk2"/>
-    </dgm:linClrLst>
-    <dgm:effectClrLst/>
-    <dgm:txLinClrLst/>
-    <dgm:txFillClrLst/>
-    <dgm:txEffectClrLst/>
-  </dgm:styleLbl>
-  <dgm:styleLbl name="node1">
-    <dgm:fillClrLst meth="repeat">
-      <a:schemeClr val="dk2"/>
-    </dgm:fillClrLst>
-    <dgm:linClrLst meth="repeat">
-      <a:schemeClr val="lt2"/>
-    </dgm:linClrLst>
-    <dgm:effectClrLst/>
-    <dgm:txLinClrLst/>
-    <dgm:txFillClrLst/>
-    <dgm:txEffectClrLst/>
-  </dgm:styleLbl>
-  <dgm:styleLbl name="lnNode1">
-    <dgm:fillClrLst meth="repeat">
-      <a:schemeClr val="dk2"/>
-    </dgm:fillClrLst>
-    <dgm:linClrLst meth="repeat">
-      <a:schemeClr val="lt2"/>
-    </dgm:linClrLst>
-    <dgm:effectClrLst/>
-    <dgm:txLinClrLst/>
-    <dgm:txFillClrLst/>
-    <dgm:txEffectClrLst/>
-  </dgm:styleLbl>
-  <dgm:styleLbl name="vennNode1">
-    <dgm:fillClrLst meth="repeat">
-      <a:schemeClr val="dk2">
-        <a:alpha val="50000"/>
-      </a:schemeClr>
-    </dgm:fillClrLst>
-    <dgm:linClrLst meth="repeat">
-      <a:schemeClr val="lt2"/>
-    </dgm:linClrLst>
-    <dgm:effectClrLst/>
-    <dgm:txLinClrLst/>
-    <dgm:txFillClrLst/>
-    <dgm:txEffectClrLst/>
-  </dgm:styleLbl>
-  <dgm:styleLbl name="node2">
-    <dgm:fillClrLst meth="repeat">
-      <a:schemeClr val="dk2"/>
-    </dgm:fillClrLst>
-    <dgm:linClrLst meth="repeat">
-      <a:schemeClr val="lt2"/>
-    </dgm:linClrLst>
-    <dgm:effectClrLst/>
-    <dgm:txLinClrLst/>
-    <dgm:txFillClrLst/>
-    <dgm:txEffectClrLst/>
-  </dgm:styleLbl>
-  <dgm:styleLbl name="node3">
-    <dgm:fillClrLst meth="repeat">
-      <a:schemeClr val="dk2"/>
-    </dgm:fillClrLst>
-    <dgm:linClrLst meth="repeat">
-      <a:schemeClr val="lt2"/>
-    </dgm:linClrLst>
-    <dgm:effectClrLst/>
-    <dgm:txLinClrLst/>
-    <dgm:txFillClrLst/>
-    <dgm:txEffectClrLst/>
-  </dgm:styleLbl>
-  <dgm:styleLbl name="node4">
-    <dgm:fillClrLst meth="repeat">
-      <a:schemeClr val="dk2"/>
-    </dgm:fillClrLst>
-    <dgm:linClrLst meth="repeat">
-      <a:schemeClr val="lt2"/>
-    </dgm:linClrLst>
-    <dgm:effectClrLst/>
-    <dgm:txLinClrLst/>
-    <dgm:txFillClrLst/>
-    <dgm:txEffectClrLst/>
-  </dgm:styleLbl>
-  <dgm:styleLbl name="fgImgPlace1">
-    <dgm:fillClrLst meth="repeat">
-      <a:schemeClr val="dk2">
-        <a:tint val="50000"/>
-      </a:schemeClr>
-    </dgm:fillClrLst>
-    <dgm:linClrLst meth="repeat">
-      <a:schemeClr val="lt2"/>
-    </dgm:linClrLst>
-    <dgm:effectClrLst/>
-    <dgm:txLinClrLst/>
-    <dgm:txFillClrLst meth="repeat">
-      <a:schemeClr val="lt2"/>
-    </dgm:txFillClrLst>
-    <dgm:txEffectClrLst/>
-  </dgm:styleLbl>
-  <dgm:styleLbl name="alignImgPlace1">
-    <dgm:fillClrLst meth="repeat">
-      <a:schemeClr val="dk2">
-        <a:tint val="50000"/>
-      </a:schemeClr>
-    </dgm:fillClrLst>
-    <dgm:linClrLst meth="repeat">
-      <a:schemeClr val="dk2">
-        <a:shade val="80000"/>
-      </a:schemeClr>
-    </dgm:linClrLst>
-    <dgm:effectClrLst/>
-    <dgm:txLinClrLst/>
-    <dgm:txFillClrLst meth="repeat">
-      <a:schemeClr val="lt2"/>
-    </dgm:txFillClrLst>
-    <dgm:txEffectClrLst/>
-  </dgm:styleLbl>
-  <dgm:styleLbl name="bgImgPlace1">
-    <dgm:fillClrLst meth="repeat">
-      <a:schemeClr val="dk2">
-        <a:tint val="50000"/>
-      </a:schemeClr>
-    </dgm:fillClrLst>
-    <dgm:linClrLst meth="repeat">
-      <a:schemeClr val="dk2">
-        <a:shade val="80000"/>
-      </a:schemeClr>
-    </dgm:linClrLst>
-    <dgm:effectClrLst/>
-    <dgm:txLinClrLst/>
-    <dgm:txFillClrLst meth="repeat">
-      <a:schemeClr val="lt2"/>
-    </dgm:txFillClrLst>
-    <dgm:txEffectClrLst/>
-  </dgm:styleLbl>
-  <dgm:styleLbl name="sibTrans2D1">
-    <dgm:fillClrLst meth="repeat">
-      <a:schemeClr val="dk2">
-        <a:tint val="60000"/>
-      </a:schemeClr>
-    </dgm:fillClrLst>
-    <dgm:linClrLst meth="repeat">
-      <a:schemeClr val="dk2">
-        <a:tint val="60000"/>
-      </a:schemeClr>
-    </dgm:linClrLst>
-    <dgm:effectClrLst/>
-    <dgm:txLinClrLst/>
-    <dgm:txFillClrLst/>
-    <dgm:txEffectClrLst/>
-  </dgm:styleLbl>
-  <dgm:styleLbl name="fgSibTrans2D1">
-    <dgm:fillClrLst meth="repeat">
-      <a:schemeClr val="dk2">
-        <a:tint val="60000"/>
-      </a:schemeClr>
-    </dgm:fillClrLst>
-    <dgm:linClrLst meth="repeat">
-      <a:schemeClr val="dk2">
-        <a:tint val="60000"/>
-      </a:schemeClr>
-    </dgm:linClrLst>
-    <dgm:effectClrLst/>
-    <dgm:txLinClrLst/>
-    <dgm:txFillClrLst/>
-    <dgm:txEffectClrLst/>
-  </dgm:styleLbl>
-  <dgm:styleLbl name="bgSibTrans2D1">
-    <dgm:fillClrLst meth="repeat">
-      <a:schemeClr val="dk2">
-        <a:tint val="60000"/>
-      </a:schemeClr>
-    </dgm:fillClrLst>
-    <dgm:linClrLst meth="repeat">
-      <a:schemeClr val="dk2">
-        <a:tint val="60000"/>
-      </a:schemeClr>
-    </dgm:linClrLst>
-    <dgm:effectClrLst/>
-    <dgm:txLinClrLst/>
-    <dgm:txFillClrLst/>
-    <dgm:txEffectClrLst/>
-  </dgm:styleLbl>
-  <dgm:styleLbl name="sibTrans1D1">
-    <dgm:fillClrLst meth="repeat">
-      <a:schemeClr val="dk2"/>
-    </dgm:fillClrLst>
-    <dgm:linClrLst meth="repeat">
-      <a:schemeClr val="dk2"/>
-    </dgm:linClrLst>
-    <dgm:effectClrLst/>
-    <dgm:txLinClrLst/>
-    <dgm:txFillClrLst meth="repeat">
-      <a:schemeClr val="lt2"/>
-    </dgm:txFillClrLst>
-    <dgm:txEffectClrLst/>
-  </dgm:styleLbl>
-  <dgm:styleLbl name="callout">
-    <dgm:fillClrLst meth="repeat">
-      <a:schemeClr val="dk2"/>
-    </dgm:fillClrLst>
-    <dgm:linClrLst meth="repeat">
-      <a:schemeClr val="dk2">
-        <a:tint val="50000"/>
-      </a:schemeClr>
-    </dgm:linClrLst>
-    <dgm:effectClrLst/>
-    <dgm:txLinClrLst/>
-    <dgm:txFillClrLst meth="repeat">
-      <a:schemeClr val="lt2"/>
-    </dgm:txFillClrLst>
-    <dgm:txEffectClrLst/>
-  </dgm:styleLbl>
-  <dgm:styleLbl name="asst0">
-    <dgm:fillClrLst meth="repeat">
-      <a:schemeClr val="dk2"/>
-    </dgm:fillClrLst>
-    <dgm:linClrLst meth="repeat">
-      <a:schemeClr val="lt2"/>
-    </dgm:linClrLst>
-    <dgm:effectClrLst/>
-    <dgm:txLinClrLst/>
-    <dgm:txFillClrLst/>
-    <dgm:txEffectClrLst/>
-  </dgm:styleLbl>
-  <dgm:styleLbl name="asst1">
-    <dgm:fillClrLst meth="repeat">
-      <a:schemeClr val="dk2"/>
-    </dgm:fillClrLst>
-    <dgm:linClrLst meth="repeat">
-      <a:schemeClr val="lt2"/>
-    </dgm:linClrLst>
-    <dgm:effectClrLst/>
-    <dgm:txLinClrLst/>
-    <dgm:txFillClrLst/>
-    <dgm:txEffectClrLst/>
-  </dgm:styleLbl>
-  <dgm:styleLbl name="asst2">
-    <dgm:fillClrLst meth="repeat">
-      <a:schemeClr val="dk2"/>
-    </dgm:fillClrLst>
-    <dgm:linClrLst meth="repeat">
-      <a:schemeClr val="lt2"/>
-    </dgm:linClrLst>
-    <dgm:effectClrLst/>
-    <dgm:txLinClrLst/>
-    <dgm:txFillClrLst/>
-    <dgm:txEffectClrLst/>
-  </dgm:styleLbl>
-  <dgm:styleLbl name="asst3">
-    <dgm:fillClrLst meth="repeat">
-      <a:schemeClr val="dk2"/>
-    </dgm:fillClrLst>
-    <dgm:linClrLst meth="repeat">
-      <a:schemeClr val="lt2"/>
-    </dgm:linClrLst>
-    <dgm:effectClrLst/>
-    <dgm:txLinClrLst/>
-    <dgm:txFillClrLst/>
-    <dgm:txEffectClrLst/>
-  </dgm:styleLbl>
-  <dgm:styleLbl name="asst4">
-    <dgm:fillClrLst meth="repeat">
-      <a:schemeClr val="dk2"/>
-    </dgm:fillClrLst>
-    <dgm:linClrLst meth="repeat">
-      <a:schemeClr val="lt2"/>
-    </dgm:linClrLst>
-    <dgm:effectClrLst/>
-    <dgm:txLinClrLst/>
-    <dgm:txFillClrLst/>
-    <dgm:txEffectClrLst/>
-  </dgm:styleLbl>
-  <dgm:styleLbl name="parChTrans2D1">
-    <dgm:fillClrLst meth="repeat">
-      <a:schemeClr val="dk2">
-        <a:tint val="60000"/>
-      </a:schemeClr>
-    </dgm:fillClrLst>
-    <dgm:linClrLst meth="repeat">
-      <a:schemeClr val="dk2">
-        <a:tint val="60000"/>
-      </a:schemeClr>
-    </dgm:linClrLst>
-    <dgm:effectClrLst/>
-    <dgm:txLinClrLst/>
-    <dgm:txFillClrLst meth="repeat">
-      <a:schemeClr val="lt2"/>
-    </dgm:txFillClrLst>
-    <dgm:txEffectClrLst/>
-  </dgm:styleLbl>
-  <dgm:styleLbl name="parChTrans2D2">
-    <dgm:fillClrLst meth="repeat">
-      <a:schemeClr val="dk2"/>
-    </dgm:fillClrLst>
-    <dgm:linClrLst meth="repeat">
-      <a:schemeClr val="dk2"/>
-    </dgm:linClrLst>
-    <dgm:effectClrLst/>
-    <dgm:txLinClrLst/>
-    <dgm:txFillClrLst meth="repeat">
-      <a:schemeClr val="lt2"/>
-    </dgm:txFillClrLst>
-    <dgm:txEffectClrLst/>
-  </dgm:styleLbl>
-  <dgm:styleLbl name="parChTrans2D3">
-    <dgm:fillClrLst meth="repeat">
-      <a:schemeClr val="dk2"/>
-    </dgm:fillClrLst>
-    <dgm:linClrLst meth="repeat">
-      <a:schemeClr val="dk2"/>
-    </dgm:linClrLst>
-    <dgm:effectClrLst/>
-    <dgm:txLinClrLst/>
-    <dgm:txFillClrLst meth="repeat">
-      <a:schemeClr val="lt2"/>
-    </dgm:txFillClrLst>
-    <dgm:txEffectClrLst/>
-  </dgm:styleLbl>
-  <dgm:styleLbl name="parChTrans2D4">
-    <dgm:fillClrLst meth="repeat">
-      <a:schemeClr val="dk2"/>
-    </dgm:fillClrLst>
-    <dgm:linClrLst meth="repeat">
-      <a:schemeClr val="dk2"/>
-    </dgm:linClrLst>
-    <dgm:effectClrLst/>
-    <dgm:txLinClrLst/>
-    <dgm:txFillClrLst meth="repeat">
-      <a:schemeClr val="lt2"/>
-    </dgm:txFillClrLst>
-    <dgm:txEffectClrLst/>
-  </dgm:styleLbl>
-  <dgm:styleLbl name="parChTrans1D1">
-    <dgm:fillClrLst meth="repeat">
-      <a:schemeClr val="dk2"/>
-    </dgm:fillClrLst>
-    <dgm:linClrLst meth="repeat">
-      <a:schemeClr val="dk2">
-        <a:shade val="60000"/>
-      </a:schemeClr>
-    </dgm:linClrLst>
-    <dgm:effectClrLst/>
-    <dgm:txLinClrLst/>
-    <dgm:txFillClrLst meth="repeat">
-      <a:schemeClr val="tx1"/>
-    </dgm:txFillClrLst>
-    <dgm:txEffectClrLst/>
-  </dgm:styleLbl>
-  <dgm:styleLbl name="parChTrans1D2">
-    <dgm:fillClrLst meth="repeat">
-      <a:schemeClr val="dk2"/>
-    </dgm:fillClrLst>
-    <dgm:linClrLst meth="repeat">
-      <a:schemeClr val="dk2">
-        <a:shade val="60000"/>
-      </a:schemeClr>
-    </dgm:linClrLst>
-    <dgm:effectClrLst/>
-    <dgm:txLinClrLst/>
-    <dgm:txFillClrLst meth="repeat">
-      <a:schemeClr val="tx1"/>
-    </dgm:txFillClrLst>
-    <dgm:txEffectClrLst/>
-  </dgm:styleLbl>
-  <dgm:styleLbl name="parChTrans1D3">
-    <dgm:fillClrLst meth="repeat">
-      <a:schemeClr val="dk2"/>
-    </dgm:fillClrLst>
-    <dgm:linClrLst meth="repeat">
-      <a:schemeClr val="dk2">
-        <a:shade val="80000"/>
-      </a:schemeClr>
-    </dgm:linClrLst>
-    <dgm:effectClrLst/>
-    <dgm:txLinClrLst/>
-    <dgm:txFillClrLst meth="repeat">
-      <a:schemeClr val="tx1"/>
-    </dgm:txFillClrLst>
-    <dgm:txEffectClrLst/>
-  </dgm:styleLbl>
-  <dgm:styleLbl name="parChTrans1D4">
-    <dgm:fillClrLst meth="repeat">
-      <a:schemeClr val="dk2"/>
-    </dgm:fillClrLst>
-    <dgm:linClrLst meth="repeat">
-      <a:schemeClr val="dk2">
-        <a:shade val="80000"/>
-      </a:schemeClr>
-    </dgm:linClrLst>
-    <dgm:effectClrLst/>
-    <dgm:txLinClrLst/>
-    <dgm:txFillClrLst meth="repeat">
-      <a:schemeClr val="tx1"/>
-    </dgm:txFillClrLst>
-    <dgm:txEffectClrLst/>
-  </dgm:styleLbl>
-  <dgm:styleLbl name="fgAcc1">
-    <dgm:fillClrLst meth="repeat">
-      <a:schemeClr val="lt2">
-        <a:alpha val="90000"/>
-      </a:schemeClr>
-    </dgm:fillClrLst>
-    <dgm:linClrLst meth="repeat">
-      <a:schemeClr val="dk2"/>
-    </dgm:linClrLst>
-    <dgm:effectClrLst/>
-    <dgm:txLinClrLst/>
-    <dgm:txFillClrLst meth="repeat">
-      <a:schemeClr val="dk1"/>
-    </dgm:txFillClrLst>
-    <dgm:txEffectClrLst/>
-  </dgm:styleLbl>
-  <dgm:styleLbl name="conFgAcc1">
-    <dgm:fillClrLst meth="repeat">
-      <a:schemeClr val="lt2">
-        <a:alpha val="90000"/>
-      </a:schemeClr>
-    </dgm:fillClrLst>
-    <dgm:linClrLst meth="repeat">
-      <a:schemeClr val="dk2"/>
-    </dgm:linClrLst>
-    <dgm:effectClrLst/>
-    <dgm:txLinClrLst/>
-    <dgm:txFillClrLst meth="repeat">
-      <a:schemeClr val="dk1"/>
-    </dgm:txFillClrLst>
-    <dgm:txEffectClrLst/>
-  </dgm:styleLbl>
-  <dgm:styleLbl name="alignAcc1">
-    <dgm:fillClrLst meth="repeat">
-      <a:schemeClr val="lt2">
-        <a:alpha val="90000"/>
-      </a:schemeClr>
-    </dgm:fillClrLst>
-    <dgm:linClrLst meth="repeat">
-      <a:schemeClr val="dk2"/>
-    </dgm:linClrLst>
-    <dgm:effectClrLst/>
-    <dgm:txLinClrLst/>
-    <dgm:txFillClrLst meth="repeat">
-      <a:schemeClr val="dk1"/>
-    </dgm:txFillClrLst>
-    <dgm:txEffectClrLst/>
-  </dgm:styleLbl>
-  <dgm:styleLbl name="trAlignAcc1">
-    <dgm:fillClrLst meth="repeat">
-      <a:schemeClr val="lt2">
-        <a:alpha val="40000"/>
-      </a:schemeClr>
-    </dgm:fillClrLst>
-    <dgm:linClrLst meth="repeat">
-      <a:schemeClr val="dk2"/>
-    </dgm:linClrLst>
-    <dgm:effectClrLst/>
-    <dgm:txLinClrLst/>
-    <dgm:txFillClrLst meth="repeat">
-      <a:schemeClr val="dk1"/>
-    </dgm:txFillClrLst>
-    <dgm:txEffectClrLst/>
-  </dgm:styleLbl>
-  <dgm:styleLbl name="bgAcc1">
-    <dgm:fillClrLst meth="repeat">
-      <a:schemeClr val="lt2">
-        <a:alpha val="90000"/>
-      </a:schemeClr>
-    </dgm:fillClrLst>
-    <dgm:linClrLst meth="repeat">
-      <a:schemeClr val="dk2"/>
-    </dgm:linClrLst>
-    <dgm:effectClrLst/>
-    <dgm:txLinClrLst/>
-    <dgm:txFillClrLst meth="repeat">
-      <a:schemeClr val="dk1"/>
-    </dgm:txFillClrLst>
-    <dgm:txEffectClrLst/>
-  </dgm:styleLbl>
-  <dgm:styleLbl name="solidFgAcc1">
-    <dgm:fillClrLst meth="repeat">
-      <a:schemeClr val="lt2"/>
-    </dgm:fillClrLst>
-    <dgm:linClrLst meth="repeat">
-      <a:schemeClr val="dk2"/>
-    </dgm:linClrLst>
-    <dgm:effectClrLst/>
-    <dgm:txLinClrLst/>
-    <dgm:txFillClrLst meth="repeat">
-      <a:schemeClr val="dk1"/>
-    </dgm:txFillClrLst>
-    <dgm:txEffectClrLst/>
-  </dgm:styleLbl>
-  <dgm:styleLbl name="solidAlignAcc1">
-    <dgm:fillClrLst meth="repeat">
-      <a:schemeClr val="lt2"/>
-    </dgm:fillClrLst>
-    <dgm:linClrLst meth="repeat">
-      <a:schemeClr val="dk2"/>
-    </dgm:linClrLst>
-    <dgm:effectClrLst/>
-    <dgm:txLinClrLst/>
-    <dgm:txFillClrLst meth="repeat">
-      <a:schemeClr val="dk1"/>
-    </dgm:txFillClrLst>
-    <dgm:txEffectClrLst/>
-  </dgm:styleLbl>
-  <dgm:styleLbl name="solidBgAcc1">
-    <dgm:fillClrLst meth="repeat">
-      <a:schemeClr val="lt2"/>
-    </dgm:fillClrLst>
-    <dgm:linClrLst meth="repeat">
-      <a:schemeClr val="dk2"/>
-    </dgm:linClrLst>
-    <dgm:effectClrLst/>
-    <dgm:txLinClrLst/>
-    <dgm:txFillClrLst meth="repeat">
-      <a:schemeClr val="dk1"/>
-    </dgm:txFillClrLst>
-    <dgm:txEffectClrLst/>
-  </dgm:styleLbl>
-  <dgm:styleLbl name="fgAccFollowNode1">
-    <dgm:fillClrLst meth="repeat">
-      <a:schemeClr val="dk2">
-        <a:alpha val="90000"/>
-        <a:tint val="40000"/>
-      </a:schemeClr>
-    </dgm:fillClrLst>
-    <dgm:linClrLst meth="repeat">
-      <a:schemeClr val="dk2">
-        <a:alpha val="90000"/>
-        <a:tint val="40000"/>
-      </a:schemeClr>
-    </dgm:linClrLst>
-    <dgm:effectClrLst/>
-    <dgm:txLinClrLst/>
-    <dgm:txFillClrLst meth="repeat">
-      <a:schemeClr val="dk1"/>
-    </dgm:txFillClrLst>
-    <dgm:txEffectClrLst/>
-  </dgm:styleLbl>
-  <dgm:styleLbl name="alignAccFollowNode1">
-    <dgm:fillClrLst meth="repeat">
-      <a:schemeClr val="dk2">
-        <a:alpha val="90000"/>
-        <a:tint val="40000"/>
-      </a:schemeClr>
-    </dgm:fillClrLst>
-    <dgm:linClrLst meth="repeat">
-      <a:schemeClr val="dk2">
-        <a:alpha val="90000"/>
-        <a:tint val="40000"/>
-      </a:schemeClr>
-    </dgm:linClrLst>
-    <dgm:effectClrLst/>
-    <dgm:txLinClrLst/>
-    <dgm:txFillClrLst meth="repeat">
-      <a:schemeClr val="dk1"/>
-    </dgm:txFillClrLst>
-    <dgm:txEffectClrLst/>
-  </dgm:styleLbl>
-  <dgm:styleLbl name="bgAccFollowNode1">
-    <dgm:fillClrLst meth="repeat">
-      <a:schemeClr val="dk2">
-        <a:alpha val="90000"/>
-        <a:tint val="40000"/>
-      </a:schemeClr>
-    </dgm:fillClrLst>
-    <dgm:linClrLst meth="repeat">
-      <a:schemeClr val="dk2">
-        <a:alpha val="90000"/>
-        <a:tint val="40000"/>
-      </a:schemeClr>
-    </dgm:linClrLst>
-    <dgm:effectClrLst/>
-    <dgm:txLinClrLst/>
-    <dgm:txFillClrLst meth="repeat">
-      <a:schemeClr val="dk1"/>
-    </dgm:txFillClrLst>
-    <dgm:txEffectClrLst/>
-  </dgm:styleLbl>
-  <dgm:styleLbl name="fgAcc0">
-    <dgm:fillClrLst meth="repeat">
-      <a:schemeClr val="lt2">
-        <a:alpha val="90000"/>
-      </a:schemeClr>
-    </dgm:fillClrLst>
-    <dgm:linClrLst meth="repeat">
-      <a:schemeClr val="dk2"/>
-    </dgm:linClrLst>
-    <dgm:effectClrLst/>
-    <dgm:txLinClrLst/>
-    <dgm:txFillClrLst meth="repeat">
-      <a:schemeClr val="dk1"/>
-    </dgm:txFillClrLst>
-    <dgm:txEffectClrLst/>
-  </dgm:styleLbl>
-  <dgm:styleLbl name="fgAcc2">
-    <dgm:fillClrLst meth="repeat">
-      <a:schemeClr val="lt2">
-        <a:alpha val="90000"/>
-      </a:schemeClr>
-    </dgm:fillClrLst>
-    <dgm:linClrLst meth="repeat">
-      <a:schemeClr val="dk2"/>
-    </dgm:linClrLst>
-    <dgm:effectClrLst/>
-    <dgm:txLinClrLst/>
-    <dgm:txFillClrLst meth="repeat">
-      <a:schemeClr val="dk1"/>
-    </dgm:txFillClrLst>
-    <dgm:txEffectClrLst/>
-  </dgm:styleLbl>
-  <dgm:styleLbl name="fgAcc3">
-    <dgm:fillClrLst meth="repeat">
-      <a:schemeClr val="lt2">
-        <a:alpha val="90000"/>
-      </a:schemeClr>
-    </dgm:fillClrLst>
-    <dgm:linClrLst meth="repeat">
-      <a:schemeClr val="dk2"/>
-    </dgm:linClrLst>
-    <dgm:effectClrLst/>
-    <dgm:txLinClrLst/>
-    <dgm:txFillClrLst meth="repeat">
-      <a:schemeClr val="dk1"/>
-    </dgm:txFillClrLst>
-    <dgm:txEffectClrLst/>
-  </dgm:styleLbl>
-  <dgm:styleLbl name="fgAcc4">
-    <dgm:fillClrLst meth="repeat">
-      <a:schemeClr val="lt2">
-        <a:alpha val="90000"/>
-      </a:schemeClr>
-    </dgm:fillClrLst>
-    <dgm:linClrLst meth="repeat">
-      <a:schemeClr val="dk2"/>
-    </dgm:linClrLst>
-    <dgm:effectClrLst/>
-    <dgm:txLinClrLst/>
-    <dgm:txFillClrLst meth="repeat">
-      <a:schemeClr val="dk1"/>
-    </dgm:txFillClrLst>
-    <dgm:txEffectClrLst/>
-  </dgm:styleLbl>
-  <dgm:styleLbl name="bgShp">
-    <dgm:fillClrLst meth="repeat">
-      <a:schemeClr val="dk2">
-        <a:tint val="40000"/>
-      </a:schemeClr>
-    </dgm:fillClrLst>
-    <dgm:linClrLst meth="repeat">
-      <a:schemeClr val="dk2"/>
-    </dgm:linClrLst>
-    <dgm:effectClrLst/>
-    <dgm:txLinClrLst/>
-    <dgm:txFillClrLst meth="repeat">
-      <a:schemeClr val="dk1"/>
-    </dgm:txFillClrLst>
-    <dgm:txEffectClrLst/>
-  </dgm:styleLbl>
-  <dgm:styleLbl name="dkBgShp">
-    <dgm:fillClrLst meth="repeat">
-      <a:schemeClr val="dk2">
-        <a:shade val="80000"/>
-      </a:schemeClr>
-    </dgm:fillClrLst>
-    <dgm:linClrLst meth="repeat">
-      <a:schemeClr val="dk2"/>
-    </dgm:linClrLst>
-    <dgm:effectClrLst/>
-    <dgm:txLinClrLst/>
-    <dgm:txFillClrLst meth="repeat">
-      <a:schemeClr val="lt1"/>
-    </dgm:txFillClrLst>
-    <dgm:txEffectClrLst/>
-  </dgm:styleLbl>
-  <dgm:styleLbl name="trBgShp">
-    <dgm:fillClrLst meth="repeat">
-      <a:schemeClr val="dk2">
-        <a:tint val="50000"/>
-        <a:alpha val="40000"/>
-      </a:schemeClr>
-    </dgm:fillClrLst>
-    <dgm:linClrLst meth="repeat">
-      <a:schemeClr val="dk2"/>
-    </dgm:linClrLst>
-    <dgm:effectClrLst/>
-    <dgm:txLinClrLst/>
-    <dgm:txFillClrLst meth="repeat">
-      <a:schemeClr val="lt1"/>
-    </dgm:txFillClrLst>
-    <dgm:txEffectClrLst/>
-  </dgm:styleLbl>
-  <dgm:styleLbl name="fgShp">
-    <dgm:fillClrLst meth="repeat">
-      <a:schemeClr val="dk2">
-        <a:tint val="60000"/>
-      </a:schemeClr>
-    </dgm:fillClrLst>
-    <dgm:linClrLst meth="repeat">
-      <a:schemeClr val="lt2"/>
-    </dgm:linClrLst>
-    <dgm:effectClrLst/>
-    <dgm:txLinClrLst/>
-    <dgm:txFillClrLst meth="repeat">
-      <a:schemeClr val="dk1"/>
-    </dgm:txFillClrLst>
-    <dgm:txEffectClrLst/>
-  </dgm:styleLbl>
-  <dgm:styleLbl name="revTx">
-    <dgm:fillClrLst meth="repeat">
-      <a:schemeClr val="lt2">
-        <a:alpha val="0"/>
-      </a:schemeClr>
-    </dgm:fillClrLst>
-    <dgm:linClrLst meth="repeat">
-      <a:schemeClr val="dk1">
-        <a:alpha val="0"/>
-      </a:schemeClr>
-    </dgm:linClrLst>
-    <dgm:effectClrLst/>
-    <dgm:txLinClrLst/>
-    <dgm:txFillClrLst meth="repeat">
-      <a:schemeClr val="tx1"/>
-    </dgm:txFillClrLst>
-    <dgm:txEffectClrLst/>
-  </dgm:styleLbl>
-</dgm:colorsDef>
-</file>
-
-<file path=ppt/diagrams/data1.xml><?xml version="1.0" encoding="utf-8"?>
-<dgm:dataModel xmlns:dgm="http://schemas.openxmlformats.org/drawingml/2006/diagram" xmlns:a="http://schemas.openxmlformats.org/drawingml/2006/main">
-  <dgm:ptLst>
-    <dgm:pt modelId="{612B34E2-6747-4F50-B9DC-7191CCB2DE71}" type="doc">
-      <dgm:prSet loTypeId="urn:microsoft.com/office/officeart/2005/8/layout/default" loCatId="list" qsTypeId="urn:microsoft.com/office/officeart/2005/8/quickstyle/simple4" qsCatId="simple" csTypeId="urn:microsoft.com/office/officeart/2005/8/colors/accent0_3" csCatId="mainScheme"/>
-      <dgm:spPr/>
-      <dgm:t>
-        <a:bodyPr/>
-        <a:lstStyle/>
-        <a:p>
-          <a:endParaRPr lang="en-US"/>
-        </a:p>
-      </dgm:t>
-    </dgm:pt>
-    <dgm:pt modelId="{E7FF9385-475A-4785-A303-06912D588568}">
-      <dgm:prSet/>
-      <dgm:spPr/>
-      <dgm:t>
-        <a:bodyPr/>
-        <a:lstStyle/>
-        <a:p>
-          <a:r>
-            <a:rPr lang="en-US" dirty="0"/>
-            <a:t>Disney entered the streaming market in October 2019.</a:t>
-          </a:r>
-        </a:p>
-      </dgm:t>
-    </dgm:pt>
-    <dgm:pt modelId="{177CEAB8-3956-4F59-AF17-CACDFEDAB492}" type="parTrans" cxnId="{564778D3-D1C3-4D6A-AF13-22BBD322CE3A}">
-      <dgm:prSet/>
-      <dgm:spPr/>
-      <dgm:t>
-        <a:bodyPr/>
-        <a:lstStyle/>
-        <a:p>
-          <a:endParaRPr lang="en-US"/>
-        </a:p>
-      </dgm:t>
-    </dgm:pt>
-    <dgm:pt modelId="{638F1A10-B1C7-42CB-A1E5-94BCDB9A2699}" type="sibTrans" cxnId="{564778D3-D1C3-4D6A-AF13-22BBD322CE3A}">
-      <dgm:prSet/>
-      <dgm:spPr/>
-      <dgm:t>
-        <a:bodyPr/>
-        <a:lstStyle/>
-        <a:p>
-          <a:endParaRPr lang="en-US"/>
-        </a:p>
-      </dgm:t>
-    </dgm:pt>
-    <dgm:pt modelId="{9F870ECE-DDBB-4D02-BEB2-AC826ECD3D7A}">
-      <dgm:prSet/>
-      <dgm:spPr/>
-      <dgm:t>
-        <a:bodyPr/>
-        <a:lstStyle/>
-        <a:p>
-          <a:r>
-            <a:rPr lang="en-US"/>
-            <a:t>With a vast number of original productions, how does Disney Plus’ content compare with NetFlix?</a:t>
-          </a:r>
-        </a:p>
-      </dgm:t>
-    </dgm:pt>
-    <dgm:pt modelId="{B93B1B82-4497-4476-92E9-E9B6D8F17A65}" type="parTrans" cxnId="{7D243974-DC4B-4B70-946A-4B0E6DEA3DC4}">
-      <dgm:prSet/>
-      <dgm:spPr/>
-      <dgm:t>
-        <a:bodyPr/>
-        <a:lstStyle/>
-        <a:p>
-          <a:endParaRPr lang="en-US"/>
-        </a:p>
-      </dgm:t>
-    </dgm:pt>
-    <dgm:pt modelId="{34AF107B-0A2C-419A-8678-8FE1493B7EE0}" type="sibTrans" cxnId="{7D243974-DC4B-4B70-946A-4B0E6DEA3DC4}">
-      <dgm:prSet/>
-      <dgm:spPr/>
-      <dgm:t>
-        <a:bodyPr/>
-        <a:lstStyle/>
-        <a:p>
-          <a:endParaRPr lang="en-US"/>
-        </a:p>
-      </dgm:t>
-    </dgm:pt>
-    <dgm:pt modelId="{5C2723CC-9733-1A4B-BC91-09E260C0130C}" type="pres">
-      <dgm:prSet presAssocID="{612B34E2-6747-4F50-B9DC-7191CCB2DE71}" presName="diagram" presStyleCnt="0">
-        <dgm:presLayoutVars>
-          <dgm:dir/>
-          <dgm:resizeHandles val="exact"/>
-        </dgm:presLayoutVars>
-      </dgm:prSet>
-      <dgm:spPr/>
-    </dgm:pt>
-    <dgm:pt modelId="{7208BBB8-335B-A44F-899C-8301568B0963}" type="pres">
-      <dgm:prSet presAssocID="{E7FF9385-475A-4785-A303-06912D588568}" presName="node" presStyleLbl="node1" presStyleIdx="0" presStyleCnt="2">
-        <dgm:presLayoutVars>
-          <dgm:bulletEnabled val="1"/>
-        </dgm:presLayoutVars>
-      </dgm:prSet>
-      <dgm:spPr/>
-    </dgm:pt>
-    <dgm:pt modelId="{FBDCCD49-6664-C24C-9D1C-29B7C9985FE9}" type="pres">
-      <dgm:prSet presAssocID="{638F1A10-B1C7-42CB-A1E5-94BCDB9A2699}" presName="sibTrans" presStyleCnt="0"/>
-      <dgm:spPr/>
-    </dgm:pt>
-    <dgm:pt modelId="{EE64CCE3-71AB-CC41-B754-83C1556C7CC7}" type="pres">
-      <dgm:prSet presAssocID="{9F870ECE-DDBB-4D02-BEB2-AC826ECD3D7A}" presName="node" presStyleLbl="node1" presStyleIdx="1" presStyleCnt="2">
-        <dgm:presLayoutVars>
-          <dgm:bulletEnabled val="1"/>
-        </dgm:presLayoutVars>
-      </dgm:prSet>
-      <dgm:spPr/>
-    </dgm:pt>
-  </dgm:ptLst>
-  <dgm:cxnLst>
-    <dgm:cxn modelId="{0F192239-E20A-D746-8706-1513DA81000C}" type="presOf" srcId="{9F870ECE-DDBB-4D02-BEB2-AC826ECD3D7A}" destId="{EE64CCE3-71AB-CC41-B754-83C1556C7CC7}" srcOrd="0" destOrd="0" presId="urn:microsoft.com/office/officeart/2005/8/layout/default"/>
-    <dgm:cxn modelId="{7D243974-DC4B-4B70-946A-4B0E6DEA3DC4}" srcId="{612B34E2-6747-4F50-B9DC-7191CCB2DE71}" destId="{9F870ECE-DDBB-4D02-BEB2-AC826ECD3D7A}" srcOrd="1" destOrd="0" parTransId="{B93B1B82-4497-4476-92E9-E9B6D8F17A65}" sibTransId="{34AF107B-0A2C-419A-8678-8FE1493B7EE0}"/>
-    <dgm:cxn modelId="{F2E172B8-A7EC-0446-AC83-87C52228B8D3}" type="presOf" srcId="{E7FF9385-475A-4785-A303-06912D588568}" destId="{7208BBB8-335B-A44F-899C-8301568B0963}" srcOrd="0" destOrd="0" presId="urn:microsoft.com/office/officeart/2005/8/layout/default"/>
-    <dgm:cxn modelId="{4B12A2D0-9DFB-3541-91BC-1DDE4276491B}" type="presOf" srcId="{612B34E2-6747-4F50-B9DC-7191CCB2DE71}" destId="{5C2723CC-9733-1A4B-BC91-09E260C0130C}" srcOrd="0" destOrd="0" presId="urn:microsoft.com/office/officeart/2005/8/layout/default"/>
-    <dgm:cxn modelId="{564778D3-D1C3-4D6A-AF13-22BBD322CE3A}" srcId="{612B34E2-6747-4F50-B9DC-7191CCB2DE71}" destId="{E7FF9385-475A-4785-A303-06912D588568}" srcOrd="0" destOrd="0" parTransId="{177CEAB8-3956-4F59-AF17-CACDFEDAB492}" sibTransId="{638F1A10-B1C7-42CB-A1E5-94BCDB9A2699}"/>
-    <dgm:cxn modelId="{6C1E77F3-81DE-1B46-A873-29FB7155162E}" type="presParOf" srcId="{5C2723CC-9733-1A4B-BC91-09E260C0130C}" destId="{7208BBB8-335B-A44F-899C-8301568B0963}" srcOrd="0" destOrd="0" presId="urn:microsoft.com/office/officeart/2005/8/layout/default"/>
-    <dgm:cxn modelId="{15CFE97D-3963-954D-A341-29F3DD18A378}" type="presParOf" srcId="{5C2723CC-9733-1A4B-BC91-09E260C0130C}" destId="{FBDCCD49-6664-C24C-9D1C-29B7C9985FE9}" srcOrd="1" destOrd="0" presId="urn:microsoft.com/office/officeart/2005/8/layout/default"/>
-    <dgm:cxn modelId="{1BFE7559-4167-EF40-A50B-706E7791EE21}" type="presParOf" srcId="{5C2723CC-9733-1A4B-BC91-09E260C0130C}" destId="{EE64CCE3-71AB-CC41-B754-83C1556C7CC7}" srcOrd="2" destOrd="0" presId="urn:microsoft.com/office/officeart/2005/8/layout/default"/>
-  </dgm:cxnLst>
-  <dgm:bg/>
-  <dgm:whole/>
-  <dgm:extLst>
-    <a:ext uri="http://schemas.microsoft.com/office/drawing/2008/diagram">
-      <dsp:dataModelExt xmlns:dsp="http://schemas.microsoft.com/office/drawing/2008/diagram" relId="rId7" minVer="http://schemas.openxmlformats.org/drawingml/2006/diagram"/>
-    </a:ext>
-  </dgm:extLst>
-</dgm:dataModel>
-</file>
-
-<file path=ppt/diagrams/drawing1.xml><?xml version="1.0" encoding="utf-8"?>
-<dsp:drawing xmlns:dgm="http://schemas.openxmlformats.org/drawingml/2006/diagram" xmlns:dsp="http://schemas.microsoft.com/office/drawing/2008/diagram" xmlns:a="http://schemas.openxmlformats.org/drawingml/2006/main">
-  <dsp:spTree>
-    <dsp:nvGrpSpPr>
-      <dsp:cNvPr id="0" name=""/>
-      <dsp:cNvGrpSpPr/>
-    </dsp:nvGrpSpPr>
-    <dsp:grpSpPr/>
-    <dsp:sp modelId="{7208BBB8-335B-A44F-899C-8301568B0963}">
-      <dsp:nvSpPr>
-        <dsp:cNvPr id="0" name=""/>
-        <dsp:cNvSpPr/>
-      </dsp:nvSpPr>
-      <dsp:spPr>
-        <a:xfrm>
-          <a:off x="819" y="585310"/>
-          <a:ext cx="3195354" cy="1917212"/>
-        </a:xfrm>
-        <a:prstGeom prst="rect">
-          <a:avLst/>
-        </a:prstGeom>
-        <a:gradFill rotWithShape="0">
-          <a:gsLst>
-            <a:gs pos="0">
-              <a:schemeClr val="dk2">
-                <a:hueOff val="0"/>
-                <a:satOff val="0"/>
-                <a:lumOff val="0"/>
-                <a:alphaOff val="0"/>
-                <a:tint val="100000"/>
-                <a:satMod val="103000"/>
-                <a:lumMod val="102000"/>
-              </a:schemeClr>
-            </a:gs>
-            <a:gs pos="50000">
-              <a:schemeClr val="dk2">
-                <a:hueOff val="0"/>
-                <a:satOff val="0"/>
-                <a:lumOff val="0"/>
-                <a:alphaOff val="0"/>
-                <a:shade val="100000"/>
-                <a:satMod val="110000"/>
-                <a:lumMod val="100000"/>
-              </a:schemeClr>
-            </a:gs>
-            <a:gs pos="100000">
-              <a:schemeClr val="dk2">
-                <a:hueOff val="0"/>
-                <a:satOff val="0"/>
-                <a:lumOff val="0"/>
-                <a:alphaOff val="0"/>
-                <a:shade val="70000"/>
-                <a:satMod val="120000"/>
-                <a:lumMod val="99000"/>
-              </a:schemeClr>
-            </a:gs>
-          </a:gsLst>
-          <a:path path="circle">
-            <a:fillToRect l="100000" t="100000" r="100000" b="100000"/>
-          </a:path>
-        </a:gradFill>
-        <a:ln>
-          <a:noFill/>
-        </a:ln>
-        <a:effectLst/>
-      </dsp:spPr>
-      <dsp:style>
-        <a:lnRef idx="0">
-          <a:scrgbClr r="0" g="0" b="0"/>
-        </a:lnRef>
-        <a:fillRef idx="3">
-          <a:scrgbClr r="0" g="0" b="0"/>
-        </a:fillRef>
-        <a:effectRef idx="2">
-          <a:scrgbClr r="0" g="0" b="0"/>
-        </a:effectRef>
-        <a:fontRef idx="minor">
-          <a:schemeClr val="lt1"/>
-        </a:fontRef>
-      </dsp:style>
-      <dsp:txBody>
-        <a:bodyPr spcFirstLastPara="0" vert="horz" wrap="square" lIns="91440" tIns="91440" rIns="91440" bIns="91440" numCol="1" spcCol="1270" anchor="ctr" anchorCtr="0">
-          <a:noAutofit/>
-        </a:bodyPr>
-        <a:lstStyle/>
-        <a:p>
-          <a:pPr marL="0" lvl="0" indent="0" algn="ctr" defTabSz="1066800">
-            <a:lnSpc>
-              <a:spcPct val="90000"/>
-            </a:lnSpc>
-            <a:spcBef>
-              <a:spcPct val="0"/>
-            </a:spcBef>
-            <a:spcAft>
-              <a:spcPct val="35000"/>
-            </a:spcAft>
-            <a:buNone/>
-          </a:pPr>
-          <a:r>
-            <a:rPr lang="en-US" sz="2400" kern="1200" dirty="0"/>
-            <a:t>Disney entered the streaming market in October 2019.</a:t>
-          </a:r>
-        </a:p>
-      </dsp:txBody>
-      <dsp:txXfrm>
-        <a:off x="819" y="585310"/>
-        <a:ext cx="3195354" cy="1917212"/>
-      </dsp:txXfrm>
-    </dsp:sp>
-    <dsp:sp modelId="{EE64CCE3-71AB-CC41-B754-83C1556C7CC7}">
-      <dsp:nvSpPr>
-        <dsp:cNvPr id="0" name=""/>
-        <dsp:cNvSpPr/>
-      </dsp:nvSpPr>
-      <dsp:spPr>
-        <a:xfrm>
-          <a:off x="3515709" y="585310"/>
-          <a:ext cx="3195354" cy="1917212"/>
-        </a:xfrm>
-        <a:prstGeom prst="rect">
-          <a:avLst/>
-        </a:prstGeom>
-        <a:gradFill rotWithShape="0">
-          <a:gsLst>
-            <a:gs pos="0">
-              <a:schemeClr val="dk2">
-                <a:hueOff val="0"/>
-                <a:satOff val="0"/>
-                <a:lumOff val="0"/>
-                <a:alphaOff val="0"/>
-                <a:tint val="100000"/>
-                <a:satMod val="103000"/>
-                <a:lumMod val="102000"/>
-              </a:schemeClr>
-            </a:gs>
-            <a:gs pos="50000">
-              <a:schemeClr val="dk2">
-                <a:hueOff val="0"/>
-                <a:satOff val="0"/>
-                <a:lumOff val="0"/>
-                <a:alphaOff val="0"/>
-                <a:shade val="100000"/>
-                <a:satMod val="110000"/>
-                <a:lumMod val="100000"/>
-              </a:schemeClr>
-            </a:gs>
-            <a:gs pos="100000">
-              <a:schemeClr val="dk2">
-                <a:hueOff val="0"/>
-                <a:satOff val="0"/>
-                <a:lumOff val="0"/>
-                <a:alphaOff val="0"/>
-                <a:shade val="70000"/>
-                <a:satMod val="120000"/>
-                <a:lumMod val="99000"/>
-              </a:schemeClr>
-            </a:gs>
-          </a:gsLst>
-          <a:path path="circle">
-            <a:fillToRect l="100000" t="100000" r="100000" b="100000"/>
-          </a:path>
-        </a:gradFill>
-        <a:ln>
-          <a:noFill/>
-        </a:ln>
-        <a:effectLst/>
-      </dsp:spPr>
-      <dsp:style>
-        <a:lnRef idx="0">
-          <a:scrgbClr r="0" g="0" b="0"/>
-        </a:lnRef>
-        <a:fillRef idx="3">
-          <a:scrgbClr r="0" g="0" b="0"/>
-        </a:fillRef>
-        <a:effectRef idx="2">
-          <a:scrgbClr r="0" g="0" b="0"/>
-        </a:effectRef>
-        <a:fontRef idx="minor">
-          <a:schemeClr val="lt1"/>
-        </a:fontRef>
-      </dsp:style>
-      <dsp:txBody>
-        <a:bodyPr spcFirstLastPara="0" vert="horz" wrap="square" lIns="91440" tIns="91440" rIns="91440" bIns="91440" numCol="1" spcCol="1270" anchor="ctr" anchorCtr="0">
-          <a:noAutofit/>
-        </a:bodyPr>
-        <a:lstStyle/>
-        <a:p>
-          <a:pPr marL="0" lvl="0" indent="0" algn="ctr" defTabSz="1066800">
-            <a:lnSpc>
-              <a:spcPct val="90000"/>
-            </a:lnSpc>
-            <a:spcBef>
-              <a:spcPct val="0"/>
-            </a:spcBef>
-            <a:spcAft>
-              <a:spcPct val="35000"/>
-            </a:spcAft>
-            <a:buNone/>
-          </a:pPr>
-          <a:r>
-            <a:rPr lang="en-US" sz="2400" kern="1200"/>
-            <a:t>With a vast number of original productions, how does Disney Plus’ content compare with NetFlix?</a:t>
-          </a:r>
-        </a:p>
-      </dsp:txBody>
-      <dsp:txXfrm>
-        <a:off x="3515709" y="585310"/>
-        <a:ext cx="3195354" cy="1917212"/>
-      </dsp:txXfrm>
-    </dsp:sp>
-  </dsp:spTree>
-</dsp:drawing>
-</file>
-
-<file path=ppt/diagrams/layout1.xml><?xml version="1.0" encoding="utf-8"?>
-<dgm:layoutDef xmlns:dgm="http://schemas.openxmlformats.org/drawingml/2006/diagram" xmlns:a="http://schemas.openxmlformats.org/drawingml/2006/main" uniqueId="urn:microsoft.com/office/officeart/2005/8/layout/default">
-  <dgm:title val=""/>
-  <dgm:desc val=""/>
-  <dgm:catLst>
-    <dgm:cat type="list" pri="400"/>
-  </dgm:catLst>
-  <dgm:sampData>
-    <dgm:dataModel>
-      <dgm:ptLst>
-        <dgm:pt modelId="0" type="doc"/>
-        <dgm:pt modelId="1">
-          <dgm:prSet phldr="1"/>
-        </dgm:pt>
-        <dgm:pt modelId="2">
-          <dgm:prSet phldr="1"/>
-        </dgm:pt>
-        <dgm:pt modelId="3">
-          <dgm:prSet phldr="1"/>
-        </dgm:pt>
-        <dgm:pt modelId="4">
-          <dgm:prSet phldr="1"/>
-        </dgm:pt>
-        <dgm:pt modelId="5">
-          <dgm:prSet phldr="1"/>
-        </dgm:pt>
-      </dgm:ptLst>
-      <dgm:cxnLst>
-        <dgm:cxn modelId="6" srcId="0" destId="1" srcOrd="0" destOrd="0"/>
-        <dgm:cxn modelId="7" srcId="0" destId="2" srcOrd="1" destOrd="0"/>
-        <dgm:cxn modelId="8" srcId="0" destId="3" srcOrd="2" destOrd="0"/>
-        <dgm:cxn modelId="9" srcId="0" destId="4" srcOrd="3" destOrd="0"/>
-        <dgm:cxn modelId="10" srcId="0" destId="5" srcOrd="4" destOrd="0"/>
-      </dgm:cxnLst>
-      <dgm:bg/>
-      <dgm:whole/>
-    </dgm:dataModel>
-  </dgm:sampData>
-  <dgm:styleData>
-    <dgm:dataModel>
-      <dgm:ptLst>
-        <dgm:pt modelId="0" type="doc"/>
-        <dgm:pt modelId="1"/>
-        <dgm:pt modelId="2"/>
-      </dgm:ptLst>
-      <dgm:cxnLst>
-        <dgm:cxn modelId="3" srcId="0" destId="1" srcOrd="0" destOrd="0"/>
-        <dgm:cxn modelId="4" srcId="0" destId="2" srcOrd="1" destOrd="0"/>
-      </dgm:cxnLst>
-      <dgm:bg/>
-      <dgm:whole/>
-    </dgm:dataModel>
-  </dgm:styleData>
-  <dgm:clrData>
-    <dgm:dataModel>
-      <dgm:ptLst>
-        <dgm:pt modelId="0" type="doc"/>
-        <dgm:pt modelId="1"/>
-        <dgm:pt modelId="2"/>
-        <dgm:pt modelId="3"/>
-        <dgm:pt modelId="4"/>
-        <dgm:pt modelId="5"/>
-        <dgm:pt modelId="6"/>
-      </dgm:ptLst>
-      <dgm:cxnLst>
-        <dgm:cxn modelId="7" srcId="0" destId="1" srcOrd="0" destOrd="0"/>
-        <dgm:cxn modelId="8" srcId="0" destId="2" srcOrd="1" destOrd="0"/>
-        <dgm:cxn modelId="9" srcId="0" destId="3" srcOrd="2" destOrd="0"/>
-        <dgm:cxn modelId="10" srcId="0" destId="4" srcOrd="3" destOrd="0"/>
-        <dgm:cxn modelId="11" srcId="0" destId="5" srcOrd="4" destOrd="0"/>
-        <dgm:cxn modelId="12" srcId="0" destId="6" srcOrd="5" destOrd="0"/>
-      </dgm:cxnLst>
-      <dgm:bg/>
-      <dgm:whole/>
-    </dgm:dataModel>
-  </dgm:clrData>
-  <dgm:layoutNode name="diagram">
-    <dgm:varLst>
-      <dgm:dir/>
-      <dgm:resizeHandles val="exact"/>
-    </dgm:varLst>
-    <dgm:choose name="Name0">
-      <dgm:if name="Name1" func="var" arg="dir" op="equ" val="norm">
-        <dgm:alg type="snake">
-          <dgm:param type="grDir" val="tL"/>
-          <dgm:param type="flowDir" val="row"/>
-          <dgm:param type="contDir" val="sameDir"/>
-          <dgm:param type="off" val="ctr"/>
-        </dgm:alg>
-      </dgm:if>
-      <dgm:else name="Name2">
-        <dgm:alg type="snake">
-          <dgm:param type="grDir" val="tR"/>
-          <dgm:param type="flowDir" val="row"/>
-          <dgm:param type="contDir" val="sameDir"/>
-          <dgm:param type="off" val="ctr"/>
-        </dgm:alg>
-      </dgm:else>
-    </dgm:choose>
-    <dgm:shape xmlns:r="http://schemas.openxmlformats.org/officeDocument/2006/relationships" r:blip="">
-      <dgm:adjLst/>
-    </dgm:shape>
-    <dgm:presOf/>
-    <dgm:constrLst>
-      <dgm:constr type="w" for="ch" forName="node" refType="w"/>
-      <dgm:constr type="h" for="ch" forName="node" refType="w" refFor="ch" refForName="node" fact="0.6"/>
-      <dgm:constr type="w" for="ch" forName="sibTrans" refType="w" refFor="ch" refForName="node" fact="0.1"/>
-      <dgm:constr type="sp" refType="w" refFor="ch" refForName="sibTrans"/>
-      <dgm:constr type="primFontSz" for="ch" forName="node" op="equ" val="65"/>
-    </dgm:constrLst>
-    <dgm:ruleLst/>
-    <dgm:forEach name="Name3" axis="ch" ptType="node">
-      <dgm:layoutNode name="node">
-        <dgm:varLst>
-          <dgm:bulletEnabled val="1"/>
-        </dgm:varLst>
-        <dgm:alg type="tx"/>
-        <dgm:shape xmlns:r="http://schemas.openxmlformats.org/officeDocument/2006/relationships" type="rect" r:blip="">
-          <dgm:adjLst/>
-        </dgm:shape>
-        <dgm:presOf axis="desOrSelf" ptType="node"/>
-        <dgm:constrLst>
-          <dgm:constr type="lMarg" refType="primFontSz" fact="0.3"/>
-          <dgm:constr type="rMarg" refType="primFontSz" fact="0.3"/>
-          <dgm:constr type="tMarg" refType="primFontSz" fact="0.3"/>
-          <dgm:constr type="bMarg" refType="primFontSz" fact="0.3"/>
-        </dgm:constrLst>
-        <dgm:ruleLst>
-          <dgm:rule type="primFontSz" val="5" fact="NaN" max="NaN"/>
-        </dgm:ruleLst>
-      </dgm:layoutNode>
-      <dgm:forEach name="Name4" axis="followSib" ptType="sibTrans" cnt="1">
-        <dgm:layoutNode name="sibTrans">
-          <dgm:alg type="sp"/>
-          <dgm:shape xmlns:r="http://schemas.openxmlformats.org/officeDocument/2006/relationships" r:blip="">
-            <dgm:adjLst/>
-          </dgm:shape>
-          <dgm:presOf/>
-          <dgm:constrLst/>
-          <dgm:ruleLst/>
-        </dgm:layoutNode>
-      </dgm:forEach>
-    </dgm:forEach>
-  </dgm:layoutNode>
-</dgm:layoutDef>
-</file>
-
-<file path=ppt/diagrams/quickStyle1.xml><?xml version="1.0" encoding="utf-8"?>
-<dgm:styleDef xmlns:dgm="http://schemas.openxmlformats.org/drawingml/2006/diagram" xmlns:a="http://schemas.openxmlformats.org/drawingml/2006/main" uniqueId="urn:microsoft.com/office/officeart/2005/8/quickstyle/simple4">
-  <dgm:title val=""/>
-  <dgm:desc val=""/>
-  <dgm:catLst>
-    <dgm:cat type="simple" pri="10400"/>
-  </dgm:catLst>
-  <dgm:scene3d>
-    <a:camera prst="orthographicFront"/>
-    <a:lightRig rig="threePt" dir="t"/>
-  </dgm:scene3d>
-  <dgm:styleLbl name="node0">
-    <dgm:scene3d>
-      <a:camera prst="orthographicFront"/>
-      <a:lightRig rig="threePt" dir="t"/>
-    </dgm:scene3d>
-    <dgm:sp3d/>
-    <dgm:txPr/>
-    <dgm:style>
-      <a:lnRef idx="0">
-        <a:scrgbClr r="0" g="0" b="0"/>
-      </a:lnRef>
-      <a:fillRef idx="3">
-        <a:scrgbClr r="0" g="0" b="0"/>
-      </a:fillRef>
-      <a:effectRef idx="2">
-        <a:scrgbClr r="0" g="0" b="0"/>
-      </a:effectRef>
-      <a:fontRef idx="minor">
-        <a:schemeClr val="lt1"/>
-      </a:fontRef>
-    </dgm:style>
-  </dgm:styleLbl>
-  <dgm:styleLbl name="lnNode1">
-    <dgm:scene3d>
-      <a:camera prst="orthographicFront"/>
-      <a:lightRig rig="threePt" dir="t"/>
-    </dgm:scene3d>
-    <dgm:sp3d/>
-    <dgm:txPr/>
-    <dgm:style>
-      <a:lnRef idx="1">
-        <a:scrgbClr r="0" g="0" b="0"/>
-      </a:lnRef>
-      <a:fillRef idx="3">
-        <a:scrgbClr r="0" g="0" b="0"/>
-      </a:fillRef>
-      <a:effectRef idx="2">
-        <a:scrgbClr r="0" g="0" b="0"/>
-      </a:effectRef>
-      <a:fontRef idx="minor">
-        <a:schemeClr val="lt1"/>
-      </a:fontRef>
-    </dgm:style>
-  </dgm:styleLbl>
-  <dgm:styleLbl name="vennNode1">
-    <dgm:scene3d>
-      <a:camera prst="orthographicFront"/>
-      <a:lightRig rig="threePt" dir="t"/>
-    </dgm:scene3d>
-    <dgm:sp3d/>
-    <dgm:txPr/>
-    <dgm:style>
-      <a:lnRef idx="0">
-        <a:scrgbClr r="0" g="0" b="0"/>
-      </a:lnRef>
-      <a:fillRef idx="3">
-        <a:scrgbClr r="0" g="0" b="0"/>
-      </a:fillRef>
-      <a:effectRef idx="0">
-        <a:scrgbClr r="0" g="0" b="0"/>
-      </a:effectRef>
-      <a:fontRef idx="minor">
-        <a:schemeClr val="tx1"/>
-      </a:fontRef>
-    </dgm:style>
-  </dgm:styleLbl>
-  <dgm:styleLbl name="alignNode1">
-    <dgm:scene3d>
-      <a:camera prst="orthographicFront"/>
-      <a:lightRig rig="threePt" dir="t"/>
-    </dgm:scene3d>
-    <dgm:sp3d/>
-    <dgm:txPr/>
-    <dgm:style>
-      <a:lnRef idx="1">
-        <a:scrgbClr r="0" g="0" b="0"/>
-      </a:lnRef>
-      <a:fillRef idx="3">
-        <a:scrgbClr r="0" g="0" b="0"/>
-      </a:fillRef>
-      <a:effectRef idx="2">
-        <a:scrgbClr r="0" g="0" b="0"/>
-      </a:effectRef>
-      <a:fontRef idx="minor">
-        <a:schemeClr val="lt1"/>
-      </a:fontRef>
-    </dgm:style>
-  </dgm:styleLbl>
-  <dgm:styleLbl name="node1">
-    <dgm:scene3d>
-      <a:camera prst="orthographicFront"/>
-      <a:lightRig rig="threePt" dir="t"/>
-    </dgm:scene3d>
-    <dgm:sp3d/>
-    <dgm:txPr/>
-    <dgm:style>
-      <a:lnRef idx="0">
-        <a:scrgbClr r="0" g="0" b="0"/>
-      </a:lnRef>
-      <a:fillRef idx="3">
-        <a:scrgbClr r="0" g="0" b="0"/>
-      </a:fillRef>
-      <a:effectRef idx="2">
-        <a:scrgbClr r="0" g="0" b="0"/>
-      </a:effectRef>
-      <a:fontRef idx="minor">
-        <a:schemeClr val="lt1"/>
-      </a:fontRef>
-    </dgm:style>
-  </dgm:styleLbl>
-  <dgm:styleLbl name="node2">
-    <dgm:scene3d>
-      <a:camera prst="orthographicFront"/>
-      <a:lightRig rig="threePt" dir="t"/>
-    </dgm:scene3d>
-    <dgm:sp3d/>
-    <dgm:txPr/>
-    <dgm:style>
-      <a:lnRef idx="0">
-        <a:scrgbClr r="0" g="0" b="0"/>
-      </a:lnRef>
-      <a:fillRef idx="3">
-        <a:scrgbClr r="0" g="0" b="0"/>
-      </a:fillRef>
-      <a:effectRef idx="2">
-        <a:scrgbClr r="0" g="0" b="0"/>
-      </a:effectRef>
-      <a:fontRef idx="minor">
-        <a:schemeClr val="lt1"/>
-      </a:fontRef>
-    </dgm:style>
-  </dgm:styleLbl>
-  <dgm:styleLbl name="node3">
-    <dgm:scene3d>
-      <a:camera prst="orthographicFront"/>
-      <a:lightRig rig="threePt" dir="t"/>
-    </dgm:scene3d>
-    <dgm:sp3d/>
-    <dgm:txPr/>
-    <dgm:style>
-      <a:lnRef idx="0">
-        <a:scrgbClr r="0" g="0" b="0"/>
-      </a:lnRef>
-      <a:fillRef idx="3">
-        <a:scrgbClr r="0" g="0" b="0"/>
-      </a:fillRef>
-      <a:effectRef idx="2">
-        <a:scrgbClr r="0" g="0" b="0"/>
-      </a:effectRef>
-      <a:fontRef idx="minor">
-        <a:schemeClr val="lt1"/>
-      </a:fontRef>
-    </dgm:style>
-  </dgm:styleLbl>
-  <dgm:styleLbl name="node4">
-    <dgm:scene3d>
-      <a:camera prst="orthographicFront"/>
-      <a:lightRig rig="threePt" dir="t"/>
-    </dgm:scene3d>
-    <dgm:sp3d/>
-    <dgm:txPr/>
-    <dgm:style>
-      <a:lnRef idx="0">
-        <a:scrgbClr r="0" g="0" b="0"/>
-      </a:lnRef>
-      <a:fillRef idx="3">
-        <a:scrgbClr r="0" g="0" b="0"/>
-      </a:fillRef>
-      <a:effectRef idx="2">
-        <a:scrgbClr r="0" g="0" b="0"/>
-      </a:effectRef>
-      <a:fontRef idx="minor">
-        <a:schemeClr val="lt1"/>
-      </a:fontRef>
-    </dgm:style>
-  </dgm:styleLbl>
-  <dgm:styleLbl name="fgImgPlace1">
-    <dgm:scene3d>
-      <a:camera prst="orthographicFront"/>
-      <a:lightRig rig="threePt" dir="t"/>
-    </dgm:scene3d>
-    <dgm:sp3d/>
-    <dgm:txPr/>
-    <dgm:style>
-      <a:lnRef idx="0">
-        <a:scrgbClr r="0" g="0" b="0"/>
-      </a:lnRef>
-      <a:fillRef idx="1">
-        <a:scrgbClr r="0" g="0" b="0"/>
-      </a:fillRef>
-      <a:effectRef idx="2">
-        <a:scrgbClr r="0" g="0" b="0"/>
-      </a:effectRef>
-      <a:fontRef idx="minor"/>
-    </dgm:style>
-  </dgm:styleLbl>
-  <dgm:styleLbl name="alignImgPlace1">
-    <dgm:scene3d>
-      <a:camera prst="orthographicFront"/>
-      <a:lightRig rig="threePt" dir="t"/>
-    </dgm:scene3d>
-    <dgm:sp3d/>
-    <dgm:txPr/>
-    <dgm:style>
-      <a:lnRef idx="0">
-        <a:scrgbClr r="0" g="0" b="0"/>
-      </a:lnRef>
-      <a:fillRef idx="1">
-        <a:scrgbClr r="0" g="0" b="0"/>
-      </a:fillRef>
-      <a:effectRef idx="2">
-        <a:scrgbClr r="0" g="0" b="0"/>
-      </a:effectRef>
-      <a:fontRef idx="minor"/>
-    </dgm:style>
-  </dgm:styleLbl>
-  <dgm:styleLbl name="bgImgPlace1">
-    <dgm:scene3d>
-      <a:camera prst="orthographicFront"/>
-      <a:lightRig rig="threePt" dir="t"/>
-    </dgm:scene3d>
-    <dgm:sp3d/>
-    <dgm:txPr/>
-    <dgm:style>
-      <a:lnRef idx="0">
-        <a:scrgbClr r="0" g="0" b="0"/>
-      </a:lnRef>
-      <a:fillRef idx="1">
-        <a:scrgbClr r="0" g="0" b="0"/>
-      </a:fillRef>
-      <a:effectRef idx="2">
-        <a:scrgbClr r="0" g="0" b="0"/>
-      </a:effectRef>
-      <a:fontRef idx="minor"/>
-    </dgm:style>
-  </dgm:styleLbl>
-  <dgm:styleLbl name="sibTrans2D1">
-    <dgm:scene3d>
-      <a:camera prst="orthographicFront"/>
-      <a:lightRig rig="threePt" dir="t"/>
-    </dgm:scene3d>
-    <dgm:sp3d/>
-    <dgm:txPr/>
-    <dgm:style>
-      <a:lnRef idx="0">
-        <a:scrgbClr r="0" g="0" b="0"/>
-      </a:lnRef>
-      <a:fillRef idx="3">
-        <a:scrgbClr r="0" g="0" b="0"/>
-      </a:fillRef>
-      <a:effectRef idx="2">
-        <a:scrgbClr r="0" g="0" b="0"/>
-      </a:effectRef>
-      <a:fontRef idx="minor">
-        <a:schemeClr val="lt1"/>
-      </a:fontRef>
-    </dgm:style>
-  </dgm:styleLbl>
-  <dgm:styleLbl name="fgSibTrans2D1">
-    <dgm:scene3d>
-      <a:camera prst="orthographicFront"/>
-      <a:lightRig rig="threePt" dir="t"/>
-    </dgm:scene3d>
-    <dgm:sp3d/>
-    <dgm:txPr/>
-    <dgm:style>
-      <a:lnRef idx="0">
-        <a:scrgbClr r="0" g="0" b="0"/>
-      </a:lnRef>
-      <a:fillRef idx="3">
-        <a:scrgbClr r="0" g="0" b="0"/>
-      </a:fillRef>
-      <a:effectRef idx="2">
-        <a:scrgbClr r="0" g="0" b="0"/>
-      </a:effectRef>
-      <a:fontRef idx="minor">
-        <a:schemeClr val="lt1"/>
-      </a:fontRef>
-    </dgm:style>
-  </dgm:styleLbl>
-  <dgm:styleLbl name="bgSibTrans2D1">
-    <dgm:scene3d>
-      <a:camera prst="orthographicFront"/>
-      <a:lightRig rig="threePt" dir="t"/>
-    </dgm:scene3d>
-    <dgm:sp3d/>
-    <dgm:txPr/>
-    <dgm:style>
-      <a:lnRef idx="0">
-        <a:scrgbClr r="0" g="0" b="0"/>
-      </a:lnRef>
-      <a:fillRef idx="3">
-        <a:scrgbClr r="0" g="0" b="0"/>
-      </a:fillRef>
-      <a:effectRef idx="2">
-        <a:scrgbClr r="0" g="0" b="0"/>
-      </a:effectRef>
-      <a:fontRef idx="minor">
-        <a:schemeClr val="lt1"/>
-      </a:fontRef>
-    </dgm:style>
-  </dgm:styleLbl>
-  <dgm:styleLbl name="sibTrans1D1">
-    <dgm:scene3d>
-      <a:camera prst="orthographicFront"/>
-      <a:lightRig rig="threePt" dir="t"/>
-    </dgm:scene3d>
-    <dgm:sp3d/>
-    <dgm:txPr/>
-    <dgm:style>
-      <a:lnRef idx="1">
-        <a:scrgbClr r="0" g="0" b="0"/>
-      </a:lnRef>
-      <a:fillRef idx="0">
-        <a:scrgbClr r="0" g="0" b="0"/>
-      </a:fillRef>
-      <a:effectRef idx="0">
-        <a:scrgbClr r="0" g="0" b="0"/>
-      </a:effectRef>
-      <a:fontRef idx="minor"/>
-    </dgm:style>
-  </dgm:styleLbl>
-  <dgm:styleLbl name="callout">
-    <dgm:scene3d>
-      <a:camera prst="orthographicFront"/>
-      <a:lightRig rig="threePt" dir="t"/>
-    </dgm:scene3d>
-    <dgm:sp3d/>
-    <dgm:txPr/>
-    <dgm:style>
-      <a:lnRef idx="2">
-        <a:scrgbClr r="0" g="0" b="0"/>
-      </a:lnRef>
-      <a:fillRef idx="1">
-        <a:scrgbClr r="0" g="0" b="0"/>
-      </a:fillRef>
-      <a:effectRef idx="1">
-        <a:scrgbClr r="0" g="0" b="0"/>
-      </a:effectRef>
-      <a:fontRef idx="minor"/>
-    </dgm:style>
-  </dgm:styleLbl>
-  <dgm:styleLbl name="asst0">
-    <dgm:scene3d>
-      <a:camera prst="orthographicFront"/>
-      <a:lightRig rig="threePt" dir="t"/>
-    </dgm:scene3d>
-    <dgm:sp3d/>
-    <dgm:txPr/>
-    <dgm:style>
-      <a:lnRef idx="0">
-        <a:scrgbClr r="0" g="0" b="0"/>
-      </a:lnRef>
-      <a:fillRef idx="3">
-        <a:scrgbClr r="0" g="0" b="0"/>
-      </a:fillRef>
-      <a:effectRef idx="2">
-        <a:scrgbClr r="0" g="0" b="0"/>
-      </a:effectRef>
-      <a:fontRef idx="minor">
-        <a:schemeClr val="lt1"/>
-      </a:fontRef>
-    </dgm:style>
-  </dgm:styleLbl>
-  <dgm:styleLbl name="asst1">
-    <dgm:scene3d>
-      <a:camera prst="orthographicFront"/>
-      <a:lightRig rig="threePt" dir="t"/>
-    </dgm:scene3d>
-    <dgm:sp3d/>
-    <dgm:txPr/>
-    <dgm:style>
-      <a:lnRef idx="0">
-        <a:scrgbClr r="0" g="0" b="0"/>
-      </a:lnRef>
-      <a:fillRef idx="3">
-        <a:scrgbClr r="0" g="0" b="0"/>
-      </a:fillRef>
-      <a:effectRef idx="2">
-        <a:scrgbClr r="0" g="0" b="0"/>
-      </a:effectRef>
-      <a:fontRef idx="minor">
-        <a:schemeClr val="lt1"/>
-      </a:fontRef>
-    </dgm:style>
-  </dgm:styleLbl>
-  <dgm:styleLbl name="asst2">
-    <dgm:scene3d>
-      <a:camera prst="orthographicFront"/>
-      <a:lightRig rig="threePt" dir="t"/>
-    </dgm:scene3d>
-    <dgm:sp3d/>
-    <dgm:txPr/>
-    <dgm:style>
-      <a:lnRef idx="0">
-        <a:scrgbClr r="0" g="0" b="0"/>
-      </a:lnRef>
-      <a:fillRef idx="3">
-        <a:scrgbClr r="0" g="0" b="0"/>
-      </a:fillRef>
-      <a:effectRef idx="2">
-        <a:scrgbClr r="0" g="0" b="0"/>
-      </a:effectRef>
-      <a:fontRef idx="minor">
-        <a:schemeClr val="lt1"/>
-      </a:fontRef>
-    </dgm:style>
-  </dgm:styleLbl>
-  <dgm:styleLbl name="asst3">
-    <dgm:scene3d>
-      <a:camera prst="orthographicFront"/>
-      <a:lightRig rig="threePt" dir="t"/>
-    </dgm:scene3d>
-    <dgm:sp3d/>
-    <dgm:txPr/>
-    <dgm:style>
-      <a:lnRef idx="0">
-        <a:scrgbClr r="0" g="0" b="0"/>
-      </a:lnRef>
-      <a:fillRef idx="3">
-        <a:scrgbClr r="0" g="0" b="0"/>
-      </a:fillRef>
-      <a:effectRef idx="2">
-        <a:scrgbClr r="0" g="0" b="0"/>
-      </a:effectRef>
-      <a:fontRef idx="minor">
-        <a:schemeClr val="lt1"/>
-      </a:fontRef>
-    </dgm:style>
-  </dgm:styleLbl>
-  <dgm:styleLbl name="asst4">
-    <dgm:scene3d>
-      <a:camera prst="orthographicFront"/>
-      <a:lightRig rig="threePt" dir="t"/>
-    </dgm:scene3d>
-    <dgm:sp3d/>
-    <dgm:txPr/>
-    <dgm:style>
-      <a:lnRef idx="0">
-        <a:scrgbClr r="0" g="0" b="0"/>
-      </a:lnRef>
-      <a:fillRef idx="3">
-        <a:scrgbClr r="0" g="0" b="0"/>
-      </a:fillRef>
-      <a:effectRef idx="2">
-        <a:scrgbClr r="0" g="0" b="0"/>
-      </a:effectRef>
-      <a:fontRef idx="minor">
-        <a:schemeClr val="lt1"/>
-      </a:fontRef>
-    </dgm:style>
-  </dgm:styleLbl>
-  <dgm:styleLbl name="parChTrans2D1">
-    <dgm:scene3d>
-      <a:camera prst="orthographicFront"/>
-      <a:lightRig rig="threePt" dir="t"/>
-    </dgm:scene3d>
-    <dgm:sp3d/>
-    <dgm:txPr/>
-    <dgm:style>
-      <a:lnRef idx="0">
-        <a:scrgbClr r="0" g="0" b="0"/>
-      </a:lnRef>
-      <a:fillRef idx="3">
-        <a:scrgbClr r="0" g="0" b="0"/>
-      </a:fillRef>
-      <a:effectRef idx="2">
-        <a:scrgbClr r="0" g="0" b="0"/>
-      </a:effectRef>
-      <a:fontRef idx="minor">
-        <a:schemeClr val="lt1"/>
-      </a:fontRef>
-    </dgm:style>
-  </dgm:styleLbl>
-  <dgm:styleLbl name="parChTrans2D2">
-    <dgm:scene3d>
-      <a:camera prst="orthographicFront"/>
-      <a:lightRig rig="threePt" dir="t"/>
-    </dgm:scene3d>
-    <dgm:sp3d/>
-    <dgm:txPr/>
-    <dgm:style>
-      <a:lnRef idx="0">
-        <a:scrgbClr r="0" g="0" b="0"/>
-      </a:lnRef>
-      <a:fillRef idx="3">
-        <a:scrgbClr r="0" g="0" b="0"/>
-      </a:fillRef>
-      <a:effectRef idx="2">
-        <a:scrgbClr r="0" g="0" b="0"/>
-      </a:effectRef>
-      <a:fontRef idx="minor">
-        <a:schemeClr val="lt1"/>
-      </a:fontRef>
-    </dgm:style>
-  </dgm:styleLbl>
-  <dgm:styleLbl name="parChTrans2D3">
-    <dgm:scene3d>
-      <a:camera prst="orthographicFront"/>
-      <a:lightRig rig="threePt" dir="t"/>
-    </dgm:scene3d>
-    <dgm:sp3d/>
-    <dgm:txPr/>
-    <dgm:style>
-      <a:lnRef idx="1">
-        <a:scrgbClr r="0" g="0" b="0"/>
-      </a:lnRef>
-      <a:fillRef idx="3">
-        <a:scrgbClr r="0" g="0" b="0"/>
-      </a:fillRef>
-      <a:effectRef idx="2">
-        <a:scrgbClr r="0" g="0" b="0"/>
-      </a:effectRef>
-      <a:fontRef idx="minor">
-        <a:schemeClr val="lt1"/>
-      </a:fontRef>
-    </dgm:style>
-  </dgm:styleLbl>
-  <dgm:styleLbl name="parChTrans2D4">
-    <dgm:scene3d>
-      <a:camera prst="orthographicFront"/>
-      <a:lightRig rig="threePt" dir="t"/>
-    </dgm:scene3d>
-    <dgm:sp3d/>
-    <dgm:txPr/>
-    <dgm:style>
-      <a:lnRef idx="1">
-        <a:scrgbClr r="0" g="0" b="0"/>
-      </a:lnRef>
-      <a:fillRef idx="3">
-        <a:scrgbClr r="0" g="0" b="0"/>
-      </a:fillRef>
-      <a:effectRef idx="2">
-        <a:scrgbClr r="0" g="0" b="0"/>
-      </a:effectRef>
-      <a:fontRef idx="minor">
-        <a:schemeClr val="lt1"/>
-      </a:fontRef>
-    </dgm:style>
-  </dgm:styleLbl>
-  <dgm:styleLbl name="parChTrans1D1">
-    <dgm:scene3d>
-      <a:camera prst="orthographicFront"/>
-      <a:lightRig rig="threePt" dir="t"/>
-    </dgm:scene3d>
-    <dgm:sp3d/>
-    <dgm:txPr/>
-    <dgm:style>
-      <a:lnRef idx="1">
-        <a:scrgbClr r="0" g="0" b="0"/>
-      </a:lnRef>
-      <a:fillRef idx="0">
-        <a:scrgbClr r="0" g="0" b="0"/>
-      </a:fillRef>
-      <a:effectRef idx="0">
-        <a:scrgbClr r="0" g="0" b="0"/>
-      </a:effectRef>
-      <a:fontRef idx="minor"/>
-    </dgm:style>
-  </dgm:styleLbl>
-  <dgm:styleLbl name="parChTrans1D2">
-    <dgm:scene3d>
-      <a:camera prst="orthographicFront"/>
-      <a:lightRig rig="threePt" dir="t"/>
-    </dgm:scene3d>
-    <dgm:sp3d/>
-    <dgm:txPr/>
-    <dgm:style>
-      <a:lnRef idx="1">
-        <a:scrgbClr r="0" g="0" b="0"/>
-      </a:lnRef>
-      <a:fillRef idx="0">
-        <a:scrgbClr r="0" g="0" b="0"/>
-      </a:fillRef>
-      <a:effectRef idx="0">
-        <a:scrgbClr r="0" g="0" b="0"/>
-      </a:effectRef>
-      <a:fontRef idx="minor"/>
-    </dgm:style>
-  </dgm:styleLbl>
-  <dgm:styleLbl name="parChTrans1D3">
-    <dgm:scene3d>
-      <a:camera prst="orthographicFront"/>
-      <a:lightRig rig="threePt" dir="t"/>
-    </dgm:scene3d>
-    <dgm:sp3d/>
-    <dgm:txPr/>
-    <dgm:style>
-      <a:lnRef idx="1">
-        <a:scrgbClr r="0" g="0" b="0"/>
-      </a:lnRef>
-      <a:fillRef idx="0">
-        <a:scrgbClr r="0" g="0" b="0"/>
-      </a:fillRef>
-      <a:effectRef idx="0">
-        <a:scrgbClr r="0" g="0" b="0"/>
-      </a:effectRef>
-      <a:fontRef idx="minor"/>
-    </dgm:style>
-  </dgm:styleLbl>
-  <dgm:styleLbl name="parChTrans1D4">
-    <dgm:scene3d>
-      <a:camera prst="orthographicFront"/>
-      <a:lightRig rig="threePt" dir="t"/>
-    </dgm:scene3d>
-    <dgm:sp3d/>
-    <dgm:txPr/>
-    <dgm:style>
-      <a:lnRef idx="1">
-        <a:scrgbClr r="0" g="0" b="0"/>
-      </a:lnRef>
-      <a:fillRef idx="0">
-        <a:scrgbClr r="0" g="0" b="0"/>
-      </a:fillRef>
-      <a:effectRef idx="0">
-        <a:scrgbClr r="0" g="0" b="0"/>
-      </a:effectRef>
-      <a:fontRef idx="minor"/>
-    </dgm:style>
-  </dgm:styleLbl>
-  <dgm:styleLbl name="fgAcc1">
-    <dgm:scene3d>
-      <a:camera prst="orthographicFront"/>
-      <a:lightRig rig="threePt" dir="t"/>
-    </dgm:scene3d>
-    <dgm:sp3d/>
-    <dgm:txPr/>
-    <dgm:style>
-      <a:lnRef idx="1">
-        <a:scrgbClr r="0" g="0" b="0"/>
-      </a:lnRef>
-      <a:fillRef idx="1">
-        <a:scrgbClr r="0" g="0" b="0"/>
-      </a:fillRef>
-      <a:effectRef idx="0">
-        <a:scrgbClr r="0" g="0" b="0"/>
-      </a:effectRef>
-      <a:fontRef idx="minor"/>
-    </dgm:style>
-  </dgm:styleLbl>
-  <dgm:styleLbl name="conFgAcc1">
-    <dgm:scene3d>
-      <a:camera prst="orthographicFront"/>
-      <a:lightRig rig="threePt" dir="t"/>
-    </dgm:scene3d>
-    <dgm:sp3d/>
-    <dgm:txPr/>
-    <dgm:style>
-      <a:lnRef idx="1">
-        <a:scrgbClr r="0" g="0" b="0"/>
-      </a:lnRef>
-      <a:fillRef idx="1">
-        <a:scrgbClr r="0" g="0" b="0"/>
-      </a:fillRef>
-      <a:effectRef idx="0">
-        <a:scrgbClr r="0" g="0" b="0"/>
-      </a:effectRef>
-      <a:fontRef idx="minor"/>
-    </dgm:style>
-  </dgm:styleLbl>
-  <dgm:styleLbl name="alignAcc1">
-    <dgm:scene3d>
-      <a:camera prst="orthographicFront"/>
-      <a:lightRig rig="threePt" dir="t"/>
-    </dgm:scene3d>
-    <dgm:sp3d/>
-    <dgm:txPr/>
-    <dgm:style>
-      <a:lnRef idx="1">
-        <a:scrgbClr r="0" g="0" b="0"/>
-      </a:lnRef>
-      <a:fillRef idx="1">
-        <a:scrgbClr r="0" g="0" b="0"/>
-      </a:fillRef>
-      <a:effectRef idx="0">
-        <a:scrgbClr r="0" g="0" b="0"/>
-      </a:effectRef>
-      <a:fontRef idx="minor"/>
-    </dgm:style>
-  </dgm:styleLbl>
-  <dgm:styleLbl name="trAlignAcc1">
-    <dgm:scene3d>
-      <a:camera prst="orthographicFront"/>
-      <a:lightRig rig="threePt" dir="t"/>
-    </dgm:scene3d>
-    <dgm:sp3d/>
-    <dgm:txPr/>
-    <dgm:style>
-      <a:lnRef idx="1">
-        <a:scrgbClr r="0" g="0" b="0"/>
-      </a:lnRef>
-      <a:fillRef idx="1">
-        <a:scrgbClr r="0" g="0" b="0"/>
-      </a:fillRef>
-      <a:effectRef idx="0">
-        <a:scrgbClr r="0" g="0" b="0"/>
-      </a:effectRef>
-      <a:fontRef idx="minor"/>
-    </dgm:style>
-  </dgm:styleLbl>
-  <dgm:styleLbl name="bgAcc1">
-    <dgm:scene3d>
-      <a:camera prst="orthographicFront"/>
-      <a:lightRig rig="threePt" dir="t"/>
-    </dgm:scene3d>
-    <dgm:sp3d/>
-    <dgm:txPr/>
-    <dgm:style>
-      <a:lnRef idx="1">
-        <a:scrgbClr r="0" g="0" b="0"/>
-      </a:lnRef>
-      <a:fillRef idx="1">
-        <a:scrgbClr r="0" g="0" b="0"/>
-      </a:fillRef>
-      <a:effectRef idx="0">
-        <a:scrgbClr r="0" g="0" b="0"/>
-      </a:effectRef>
-      <a:fontRef idx="minor"/>
-    </dgm:style>
-  </dgm:styleLbl>
-  <dgm:styleLbl name="solidFgAcc1">
-    <dgm:scene3d>
-      <a:camera prst="orthographicFront"/>
-      <a:lightRig rig="threePt" dir="t"/>
-    </dgm:scene3d>
-    <dgm:sp3d/>
-    <dgm:txPr/>
-    <dgm:style>
-      <a:lnRef idx="1">
-        <a:scrgbClr r="0" g="0" b="0"/>
-      </a:lnRef>
-      <a:fillRef idx="1">
-        <a:scrgbClr r="0" g="0" b="0"/>
-      </a:fillRef>
-      <a:effectRef idx="0">
-        <a:scrgbClr r="0" g="0" b="0"/>
-      </a:effectRef>
-      <a:fontRef idx="minor"/>
-    </dgm:style>
-  </dgm:styleLbl>
-  <dgm:styleLbl name="solidAlignAcc1">
-    <dgm:scene3d>
-      <a:camera prst="orthographicFront"/>
-      <a:lightRig rig="threePt" dir="t"/>
-    </dgm:scene3d>
-    <dgm:sp3d/>
-    <dgm:txPr/>
-    <dgm:style>
-      <a:lnRef idx="1">
-        <a:scrgbClr r="0" g="0" b="0"/>
-      </a:lnRef>
-      <a:fillRef idx="1">
-        <a:scrgbClr r="0" g="0" b="0"/>
-      </a:fillRef>
-      <a:effectRef idx="0">
-        <a:scrgbClr r="0" g="0" b="0"/>
-      </a:effectRef>
-      <a:fontRef idx="minor"/>
-    </dgm:style>
-  </dgm:styleLbl>
-  <dgm:styleLbl name="solidBgAcc1">
-    <dgm:scene3d>
-      <a:camera prst="orthographicFront"/>
-      <a:lightRig rig="threePt" dir="t"/>
-    </dgm:scene3d>
-    <dgm:sp3d/>
-    <dgm:txPr/>
-    <dgm:style>
-      <a:lnRef idx="1">
-        <a:scrgbClr r="0" g="0" b="0"/>
-      </a:lnRef>
-      <a:fillRef idx="1">
-        <a:scrgbClr r="0" g="0" b="0"/>
-      </a:fillRef>
-      <a:effectRef idx="0">
-        <a:scrgbClr r="0" g="0" b="0"/>
-      </a:effectRef>
-      <a:fontRef idx="minor"/>
-    </dgm:style>
-  </dgm:styleLbl>
-  <dgm:styleLbl name="fgAccFollowNode1">
-    <dgm:scene3d>
-      <a:camera prst="orthographicFront"/>
-      <a:lightRig rig="threePt" dir="t"/>
-    </dgm:scene3d>
-    <dgm:sp3d/>
-    <dgm:txPr/>
-    <dgm:style>
-      <a:lnRef idx="1">
-        <a:scrgbClr r="0" g="0" b="0"/>
-      </a:lnRef>
-      <a:fillRef idx="1">
-        <a:scrgbClr r="0" g="0" b="0"/>
-      </a:fillRef>
-      <a:effectRef idx="0">
-        <a:scrgbClr r="0" g="0" b="0"/>
-      </a:effectRef>
-      <a:fontRef idx="minor"/>
-    </dgm:style>
-  </dgm:styleLbl>
-  <dgm:styleLbl name="alignAccFollowNode1">
-    <dgm:scene3d>
-      <a:camera prst="orthographicFront"/>
-      <a:lightRig rig="threePt" dir="t"/>
-    </dgm:scene3d>
-    <dgm:sp3d/>
-    <dgm:txPr/>
-    <dgm:style>
-      <a:lnRef idx="1">
-        <a:scrgbClr r="0" g="0" b="0"/>
-      </a:lnRef>
-      <a:fillRef idx="1">
-        <a:scrgbClr r="0" g="0" b="0"/>
-      </a:fillRef>
-      <a:effectRef idx="0">
-        <a:scrgbClr r="0" g="0" b="0"/>
-      </a:effectRef>
-      <a:fontRef idx="minor"/>
-    </dgm:style>
-  </dgm:styleLbl>
-  <dgm:styleLbl name="bgAccFollowNode1">
-    <dgm:scene3d>
-      <a:camera prst="orthographicFront"/>
-      <a:lightRig rig="threePt" dir="t"/>
-    </dgm:scene3d>
-    <dgm:sp3d/>
-    <dgm:txPr/>
-    <dgm:style>
-      <a:lnRef idx="1">
-        <a:scrgbClr r="0" g="0" b="0"/>
-      </a:lnRef>
-      <a:fillRef idx="1">
-        <a:scrgbClr r="0" g="0" b="0"/>
-      </a:fillRef>
-      <a:effectRef idx="0">
-        <a:scrgbClr r="0" g="0" b="0"/>
-      </a:effectRef>
-      <a:fontRef idx="minor"/>
-    </dgm:style>
-  </dgm:styleLbl>
-  <dgm:styleLbl name="fgAcc0">
-    <dgm:scene3d>
-      <a:camera prst="orthographicFront"/>
-      <a:lightRig rig="threePt" dir="t"/>
-    </dgm:scene3d>
-    <dgm:sp3d/>
-    <dgm:txPr/>
-    <dgm:style>
-      <a:lnRef idx="1">
-        <a:scrgbClr r="0" g="0" b="0"/>
-      </a:lnRef>
-      <a:fillRef idx="1">
-        <a:scrgbClr r="0" g="0" b="0"/>
-      </a:fillRef>
-      <a:effectRef idx="0">
-        <a:scrgbClr r="0" g="0" b="0"/>
-      </a:effectRef>
-      <a:fontRef idx="minor"/>
-    </dgm:style>
-  </dgm:styleLbl>
-  <dgm:styleLbl name="fgAcc2">
-    <dgm:scene3d>
-      <a:camera prst="orthographicFront"/>
-      <a:lightRig rig="threePt" dir="t"/>
-    </dgm:scene3d>
-    <dgm:sp3d/>
-    <dgm:txPr/>
-    <dgm:style>
-      <a:lnRef idx="1">
-        <a:scrgbClr r="0" g="0" b="0"/>
-      </a:lnRef>
-      <a:fillRef idx="1">
-        <a:scrgbClr r="0" g="0" b="0"/>
-      </a:fillRef>
-      <a:effectRef idx="0">
-        <a:scrgbClr r="0" g="0" b="0"/>
-      </a:effectRef>
-      <a:fontRef idx="minor"/>
-    </dgm:style>
-  </dgm:styleLbl>
-  <dgm:styleLbl name="fgAcc3">
-    <dgm:scene3d>
-      <a:camera prst="orthographicFront"/>
-      <a:lightRig rig="threePt" dir="t"/>
-    </dgm:scene3d>
-    <dgm:sp3d/>
-    <dgm:txPr/>
-    <dgm:style>
-      <a:lnRef idx="1">
-        <a:scrgbClr r="0" g="0" b="0"/>
-      </a:lnRef>
-      <a:fillRef idx="1">
-        <a:scrgbClr r="0" g="0" b="0"/>
-      </a:fillRef>
-      <a:effectRef idx="0">
-        <a:scrgbClr r="0" g="0" b="0"/>
-      </a:effectRef>
-      <a:fontRef idx="minor"/>
-    </dgm:style>
-  </dgm:styleLbl>
-  <dgm:styleLbl name="fgAcc4">
-    <dgm:scene3d>
-      <a:camera prst="orthographicFront"/>
-      <a:lightRig rig="threePt" dir="t"/>
-    </dgm:scene3d>
-    <dgm:sp3d/>
-    <dgm:txPr/>
-    <dgm:style>
-      <a:lnRef idx="1">
-        <a:scrgbClr r="0" g="0" b="0"/>
-      </a:lnRef>
-      <a:fillRef idx="1">
-        <a:scrgbClr r="0" g="0" b="0"/>
-      </a:fillRef>
-      <a:effectRef idx="0">
-        <a:scrgbClr r="0" g="0" b="0"/>
-      </a:effectRef>
-      <a:fontRef idx="minor"/>
-    </dgm:style>
-  </dgm:styleLbl>
-  <dgm:styleLbl name="bgShp">
-    <dgm:scene3d>
-      <a:camera prst="orthographicFront"/>
-      <a:lightRig rig="threePt" dir="t"/>
-    </dgm:scene3d>
-    <dgm:sp3d/>
-    <dgm:txPr/>
-    <dgm:style>
-      <a:lnRef idx="0">
-        <a:scrgbClr r="0" g="0" b="0"/>
-      </a:lnRef>
-      <a:fillRef idx="1">
-        <a:scrgbClr r="0" g="0" b="0"/>
-      </a:fillRef>
-      <a:effectRef idx="2">
-        <a:scrgbClr r="0" g="0" b="0"/>
-      </a:effectRef>
-      <a:fontRef idx="minor"/>
-    </dgm:style>
-  </dgm:styleLbl>
-  <dgm:styleLbl name="dkBgShp">
-    <dgm:scene3d>
-      <a:camera prst="orthographicFront"/>
-      <a:lightRig rig="threePt" dir="t"/>
-    </dgm:scene3d>
-    <dgm:sp3d/>
-    <dgm:txPr/>
-    <dgm:style>
-      <a:lnRef idx="0">
-        <a:scrgbClr r="0" g="0" b="0"/>
-      </a:lnRef>
-      <a:fillRef idx="1">
-        <a:scrgbClr r="0" g="0" b="0"/>
-      </a:fillRef>
-      <a:effectRef idx="2">
-        <a:scrgbClr r="0" g="0" b="0"/>
-      </a:effectRef>
-      <a:fontRef idx="minor"/>
-    </dgm:style>
-  </dgm:styleLbl>
-  <dgm:styleLbl name="trBgShp">
-    <dgm:scene3d>
-      <a:camera prst="orthographicFront"/>
-      <a:lightRig rig="threePt" dir="t"/>
-    </dgm:scene3d>
-    <dgm:sp3d/>
-    <dgm:txPr/>
-    <dgm:style>
-      <a:lnRef idx="0">
-        <a:scrgbClr r="0" g="0" b="0"/>
-      </a:lnRef>
-      <a:fillRef idx="1">
-        <a:scrgbClr r="0" g="0" b="0"/>
-      </a:fillRef>
-      <a:effectRef idx="0">
-        <a:scrgbClr r="0" g="0" b="0"/>
-      </a:effectRef>
-      <a:fontRef idx="minor"/>
-    </dgm:style>
-  </dgm:styleLbl>
-  <dgm:styleLbl name="fgShp">
-    <dgm:scene3d>
-      <a:camera prst="orthographicFront"/>
-      <a:lightRig rig="threePt" dir="t"/>
-    </dgm:scene3d>
-    <dgm:sp3d/>
-    <dgm:txPr/>
-    <dgm:style>
-      <a:lnRef idx="0">
-        <a:scrgbClr r="0" g="0" b="0"/>
-      </a:lnRef>
-      <a:fillRef idx="3">
-        <a:scrgbClr r="0" g="0" b="0"/>
-      </a:fillRef>
-      <a:effectRef idx="2">
-        <a:scrgbClr r="0" g="0" b="0"/>
-      </a:effectRef>
-      <a:fontRef idx="minor"/>
-    </dgm:style>
-  </dgm:styleLbl>
-  <dgm:styleLbl name="revTx">
-    <dgm:scene3d>
-      <a:camera prst="orthographicFront"/>
-      <a:lightRig rig="threePt" dir="t"/>
-    </dgm:scene3d>
-    <dgm:sp3d/>
-    <dgm:txPr/>
-    <dgm:style>
-      <a:lnRef idx="0">
-        <a:scrgbClr r="0" g="0" b="0"/>
-      </a:lnRef>
-      <a:fillRef idx="0">
-        <a:scrgbClr r="0" g="0" b="0"/>
-      </a:fillRef>
-      <a:effectRef idx="0">
-        <a:scrgbClr r="0" g="0" b="0"/>
-      </a:effectRef>
-      <a:fontRef idx="minor"/>
-    </dgm:style>
-  </dgm:styleLbl>
-</dgm:styleDef>
-</file>
-
 <file path=ppt/ink/ink1.xml><?xml version="1.0" encoding="utf-8"?>
 <inkml:ink xmlns:inkml="http://www.w3.org/2003/InkML">
   <inkml:definitions>
@@ -2521,7 +240,7 @@
           <a:p>
             <a:fld id="{A5C20BB3-3CCB-4FE5-991B-82F6BCB48AF3}" type="datetimeFigureOut">
               <a:rPr lang="en-US" smtClean="0"/>
-              <a:t>10/18/21</a:t>
+              <a:t>10/19/21</a:t>
             </a:fld>
             <a:endParaRPr lang="en-US"/>
           </a:p>
@@ -2832,7 +551,46 @@
           <a:bodyPr/>
           <a:lstStyle/>
           <a:p>
+            <a:r>
+              <a:rPr lang="en-US" dirty="0"/>
+              <a:t>Covid hit hard on the movie theatre business but brought a lot of opportunity to internet steaming. </a:t>
+            </a:r>
+          </a:p>
+          <a:p>
             <a:endParaRPr lang="en-US" dirty="0"/>
+          </a:p>
+          <a:p>
+            <a:r>
+              <a:rPr lang="en-US" dirty="0"/>
+              <a:t>favorite brand</a:t>
+            </a:r>
+          </a:p>
+          <a:p>
+            <a:endParaRPr lang="en-US" dirty="0"/>
+          </a:p>
+          <a:p>
+            <a:r>
+              <a:rPr lang="en-US" dirty="0"/>
+              <a:t>decision making business strategy </a:t>
+            </a:r>
+          </a:p>
+          <a:p>
+            <a:endParaRPr lang="en-US" dirty="0"/>
+          </a:p>
+          <a:p>
+            <a:r>
+              <a:rPr lang="en-US" dirty="0"/>
+              <a:t>disrupt the market </a:t>
+            </a:r>
+          </a:p>
+          <a:p>
+            <a:endParaRPr lang="en-US" dirty="0"/>
+          </a:p>
+          <a:p>
+            <a:r>
+              <a:rPr lang="en-US" dirty="0"/>
+              <a:t>shake the foundation of Netflix</a:t>
+            </a:r>
           </a:p>
         </p:txBody>
       </p:sp>
@@ -2863,6 +621,272 @@
     <p:extLst>
       <p:ext uri="{BB962C8B-B14F-4D97-AF65-F5344CB8AC3E}">
         <p14:creationId xmlns:p14="http://schemas.microsoft.com/office/powerpoint/2010/main" val="4191194849"/>
+      </p:ext>
+    </p:extLst>
+  </p:cSld>
+  <p:clrMapOvr>
+    <a:masterClrMapping/>
+  </p:clrMapOvr>
+</p:notes>
+</file>
+
+<file path=ppt/notesSlides/notesSlide10.xml><?xml version="1.0" encoding="utf-8"?>
+<p:notes xmlns:a="http://schemas.openxmlformats.org/drawingml/2006/main" xmlns:r="http://schemas.openxmlformats.org/officeDocument/2006/relationships" xmlns:p="http://schemas.openxmlformats.org/presentationml/2006/main">
+  <p:cSld>
+    <p:spTree>
+      <p:nvGrpSpPr>
+        <p:cNvPr id="1" name=""/>
+        <p:cNvGrpSpPr/>
+        <p:nvPr/>
+      </p:nvGrpSpPr>
+      <p:grpSpPr>
+        <a:xfrm>
+          <a:off x="0" y="0"/>
+          <a:ext cx="0" cy="0"/>
+          <a:chOff x="0" y="0"/>
+          <a:chExt cx="0" cy="0"/>
+        </a:xfrm>
+      </p:grpSpPr>
+      <p:sp>
+        <p:nvSpPr>
+          <p:cNvPr id="2" name="Slide Image Placeholder 1"/>
+          <p:cNvSpPr>
+            <a:spLocks noGrp="1" noRot="1" noChangeAspect="1"/>
+          </p:cNvSpPr>
+          <p:nvPr>
+            <p:ph type="sldImg"/>
+          </p:nvPr>
+        </p:nvSpPr>
+        <p:spPr/>
+      </p:sp>
+      <p:sp>
+        <p:nvSpPr>
+          <p:cNvPr id="3" name="Notes Placeholder 2"/>
+          <p:cNvSpPr>
+            <a:spLocks noGrp="1"/>
+          </p:cNvSpPr>
+          <p:nvPr>
+            <p:ph type="body" idx="1"/>
+          </p:nvPr>
+        </p:nvSpPr>
+        <p:spPr/>
+        <p:txBody>
+          <a:bodyPr/>
+          <a:lstStyle/>
+          <a:p>
+            <a:r>
+              <a:rPr lang="en-US" dirty="0"/>
+              <a:t>to increase the appeal of </a:t>
+            </a:r>
+            <a:r>
+              <a:rPr lang="en-US" dirty="0" err="1"/>
+              <a:t>disney</a:t>
+            </a:r>
+            <a:r>
+              <a:rPr lang="en-US" dirty="0"/>
+              <a:t> contents</a:t>
+            </a:r>
+          </a:p>
+        </p:txBody>
+      </p:sp>
+      <p:sp>
+        <p:nvSpPr>
+          <p:cNvPr id="4" name="Slide Number Placeholder 3"/>
+          <p:cNvSpPr>
+            <a:spLocks noGrp="1"/>
+          </p:cNvSpPr>
+          <p:nvPr>
+            <p:ph type="sldNum" sz="quarter" idx="5"/>
+          </p:nvPr>
+        </p:nvSpPr>
+        <p:spPr/>
+        <p:txBody>
+          <a:bodyPr/>
+          <a:lstStyle/>
+          <a:p>
+            <a:fld id="{E0746DE6-3336-457D-A091-FA20AC1C536E}" type="slidenum">
+              <a:rPr lang="en-US" smtClean="0"/>
+              <a:t>12</a:t>
+            </a:fld>
+            <a:endParaRPr lang="en-US"/>
+          </a:p>
+        </p:txBody>
+      </p:sp>
+    </p:spTree>
+    <p:extLst>
+      <p:ext uri="{BB962C8B-B14F-4D97-AF65-F5344CB8AC3E}">
+        <p14:creationId xmlns:p14="http://schemas.microsoft.com/office/powerpoint/2010/main" val="3909411343"/>
+      </p:ext>
+    </p:extLst>
+  </p:cSld>
+  <p:clrMapOvr>
+    <a:masterClrMapping/>
+  </p:clrMapOvr>
+</p:notes>
+</file>
+
+<file path=ppt/notesSlides/notesSlide11.xml><?xml version="1.0" encoding="utf-8"?>
+<p:notes xmlns:a="http://schemas.openxmlformats.org/drawingml/2006/main" xmlns:r="http://schemas.openxmlformats.org/officeDocument/2006/relationships" xmlns:p="http://schemas.openxmlformats.org/presentationml/2006/main">
+  <p:cSld>
+    <p:spTree>
+      <p:nvGrpSpPr>
+        <p:cNvPr id="1" name=""/>
+        <p:cNvGrpSpPr/>
+        <p:nvPr/>
+      </p:nvGrpSpPr>
+      <p:grpSpPr>
+        <a:xfrm>
+          <a:off x="0" y="0"/>
+          <a:ext cx="0" cy="0"/>
+          <a:chOff x="0" y="0"/>
+          <a:chExt cx="0" cy="0"/>
+        </a:xfrm>
+      </p:grpSpPr>
+      <p:sp>
+        <p:nvSpPr>
+          <p:cNvPr id="2" name="Slide Image Placeholder 1"/>
+          <p:cNvSpPr>
+            <a:spLocks noGrp="1" noRot="1" noChangeAspect="1"/>
+          </p:cNvSpPr>
+          <p:nvPr>
+            <p:ph type="sldImg"/>
+          </p:nvPr>
+        </p:nvSpPr>
+        <p:spPr/>
+      </p:sp>
+      <p:sp>
+        <p:nvSpPr>
+          <p:cNvPr id="3" name="Notes Placeholder 2"/>
+          <p:cNvSpPr>
+            <a:spLocks noGrp="1"/>
+          </p:cNvSpPr>
+          <p:nvPr>
+            <p:ph type="body" idx="1"/>
+          </p:nvPr>
+        </p:nvSpPr>
+        <p:spPr/>
+        <p:txBody>
+          <a:bodyPr/>
+          <a:lstStyle/>
+          <a:p>
+            <a:r>
+              <a:rPr lang="en-US" dirty="0"/>
+              <a:t>A main chunk of the streaming business is the TV. This is not addressed in my research. </a:t>
+            </a:r>
+          </a:p>
+        </p:txBody>
+      </p:sp>
+      <p:sp>
+        <p:nvSpPr>
+          <p:cNvPr id="4" name="Slide Number Placeholder 3"/>
+          <p:cNvSpPr>
+            <a:spLocks noGrp="1"/>
+          </p:cNvSpPr>
+          <p:nvPr>
+            <p:ph type="sldNum" sz="quarter" idx="5"/>
+          </p:nvPr>
+        </p:nvSpPr>
+        <p:spPr/>
+        <p:txBody>
+          <a:bodyPr/>
+          <a:lstStyle/>
+          <a:p>
+            <a:fld id="{E0746DE6-3336-457D-A091-FA20AC1C536E}" type="slidenum">
+              <a:rPr lang="en-US" smtClean="0"/>
+              <a:t>13</a:t>
+            </a:fld>
+            <a:endParaRPr lang="en-US"/>
+          </a:p>
+        </p:txBody>
+      </p:sp>
+    </p:spTree>
+    <p:extLst>
+      <p:ext uri="{BB962C8B-B14F-4D97-AF65-F5344CB8AC3E}">
+        <p14:creationId xmlns:p14="http://schemas.microsoft.com/office/powerpoint/2010/main" val="1719158366"/>
+      </p:ext>
+    </p:extLst>
+  </p:cSld>
+  <p:clrMapOvr>
+    <a:masterClrMapping/>
+  </p:clrMapOvr>
+</p:notes>
+</file>
+
+<file path=ppt/notesSlides/notesSlide12.xml><?xml version="1.0" encoding="utf-8"?>
+<p:notes xmlns:a="http://schemas.openxmlformats.org/drawingml/2006/main" xmlns:r="http://schemas.openxmlformats.org/officeDocument/2006/relationships" xmlns:p="http://schemas.openxmlformats.org/presentationml/2006/main">
+  <p:cSld>
+    <p:spTree>
+      <p:nvGrpSpPr>
+        <p:cNvPr id="1" name=""/>
+        <p:cNvGrpSpPr/>
+        <p:nvPr/>
+      </p:nvGrpSpPr>
+      <p:grpSpPr>
+        <a:xfrm>
+          <a:off x="0" y="0"/>
+          <a:ext cx="0" cy="0"/>
+          <a:chOff x="0" y="0"/>
+          <a:chExt cx="0" cy="0"/>
+        </a:xfrm>
+      </p:grpSpPr>
+      <p:sp>
+        <p:nvSpPr>
+          <p:cNvPr id="2" name="Slide Image Placeholder 1"/>
+          <p:cNvSpPr>
+            <a:spLocks noGrp="1" noRot="1" noChangeAspect="1"/>
+          </p:cNvSpPr>
+          <p:nvPr>
+            <p:ph type="sldImg"/>
+          </p:nvPr>
+        </p:nvSpPr>
+        <p:spPr/>
+      </p:sp>
+      <p:sp>
+        <p:nvSpPr>
+          <p:cNvPr id="3" name="Notes Placeholder 2"/>
+          <p:cNvSpPr>
+            <a:spLocks noGrp="1"/>
+          </p:cNvSpPr>
+          <p:nvPr>
+            <p:ph type="body" idx="1"/>
+          </p:nvPr>
+        </p:nvSpPr>
+        <p:spPr/>
+        <p:txBody>
+          <a:bodyPr/>
+          <a:lstStyle/>
+          <a:p>
+            <a:endParaRPr lang="en-US"/>
+          </a:p>
+        </p:txBody>
+      </p:sp>
+      <p:sp>
+        <p:nvSpPr>
+          <p:cNvPr id="4" name="Slide Number Placeholder 3"/>
+          <p:cNvSpPr>
+            <a:spLocks noGrp="1"/>
+          </p:cNvSpPr>
+          <p:nvPr>
+            <p:ph type="sldNum" sz="quarter" idx="5"/>
+          </p:nvPr>
+        </p:nvSpPr>
+        <p:spPr/>
+        <p:txBody>
+          <a:bodyPr/>
+          <a:lstStyle/>
+          <a:p>
+            <a:fld id="{E0746DE6-3336-457D-A091-FA20AC1C536E}" type="slidenum">
+              <a:rPr lang="en-US" smtClean="0"/>
+              <a:t>14</a:t>
+            </a:fld>
+            <a:endParaRPr lang="en-US"/>
+          </a:p>
+        </p:txBody>
+      </p:sp>
+    </p:spTree>
+    <p:extLst>
+      <p:ext uri="{BB962C8B-B14F-4D97-AF65-F5344CB8AC3E}">
+        <p14:creationId xmlns:p14="http://schemas.microsoft.com/office/powerpoint/2010/main" val="1989800599"/>
       </p:ext>
     </p:extLst>
   </p:cSld>
@@ -2918,42 +942,7 @@
           <a:p>
             <a:r>
               <a:rPr lang="en-US" dirty="0"/>
-              <a:t>-There are very few shared titles between the two networks: </a:t>
-            </a:r>
-          </a:p>
-          <a:p>
-            <a:r>
-              <a:rPr lang="en-US" dirty="0"/>
-              <a:t>101 Dalmatians</a:t>
-            </a:r>
-          </a:p>
-          <a:p>
-            <a:r>
-              <a:rPr lang="en-US" dirty="0"/>
-              <a:t>Cars 3</a:t>
-            </a:r>
-          </a:p>
-          <a:p>
-            <a:r>
-              <a:rPr lang="en-US" dirty="0"/>
-              <a:t>Little </a:t>
-            </a:r>
-            <a:r>
-              <a:rPr lang="en-US" dirty="0" err="1"/>
-              <a:t>Einsteins</a:t>
-            </a:r>
-            <a:endParaRPr lang="en-US" dirty="0"/>
-          </a:p>
-          <a:p>
-            <a:r>
-              <a:rPr lang="en-US" dirty="0"/>
-              <a:t>Finding Dory</a:t>
-            </a:r>
-          </a:p>
-          <a:p>
-            <a:r>
-              <a:rPr lang="en-US" dirty="0"/>
-              <a:t>Frozen</a:t>
+              <a:t>overview</a:t>
             </a:r>
           </a:p>
         </p:txBody>
@@ -2975,7 +964,7 @@
           <a:p>
             <a:fld id="{E0746DE6-3336-457D-A091-FA20AC1C536E}" type="slidenum">
               <a:rPr lang="en-US" smtClean="0"/>
-              <a:t>3</a:t>
+              <a:t>2</a:t>
             </a:fld>
             <a:endParaRPr lang="en-US"/>
           </a:p>
@@ -2984,7 +973,7 @@
     </p:spTree>
     <p:extLst>
       <p:ext uri="{BB962C8B-B14F-4D97-AF65-F5344CB8AC3E}">
-        <p14:creationId xmlns:p14="http://schemas.microsoft.com/office/powerpoint/2010/main" val="32934835"/>
+        <p14:creationId xmlns:p14="http://schemas.microsoft.com/office/powerpoint/2010/main" val="2723497583"/>
       </p:ext>
     </p:extLst>
   </p:cSld>
@@ -3038,7 +1027,16 @@
           <a:bodyPr/>
           <a:lstStyle/>
           <a:p>
-            <a:endParaRPr lang="en-US" dirty="0"/>
+            <a:r>
+              <a:rPr lang="en-US" dirty="0"/>
+              <a:t>Talk about how the networks are different</a:t>
+            </a:r>
+          </a:p>
+          <a:p>
+            <a:r>
+              <a:rPr lang="en-US" dirty="0"/>
+              <a:t>There are very few shared titles between the two networks: 5 classic animations</a:t>
+            </a:r>
           </a:p>
         </p:txBody>
       </p:sp>
@@ -3059,7 +1057,7 @@
           <a:p>
             <a:fld id="{E0746DE6-3336-457D-A091-FA20AC1C536E}" type="slidenum">
               <a:rPr lang="en-US" smtClean="0"/>
-              <a:t>4</a:t>
+              <a:t>3</a:t>
             </a:fld>
             <a:endParaRPr lang="en-US"/>
           </a:p>
@@ -3068,7 +1066,7 @@
     </p:spTree>
     <p:extLst>
       <p:ext uri="{BB962C8B-B14F-4D97-AF65-F5344CB8AC3E}">
-        <p14:creationId xmlns:p14="http://schemas.microsoft.com/office/powerpoint/2010/main" val="2099555281"/>
+        <p14:creationId xmlns:p14="http://schemas.microsoft.com/office/powerpoint/2010/main" val="32934835"/>
       </p:ext>
     </p:extLst>
   </p:cSld>
@@ -3143,7 +1141,7 @@
           <a:p>
             <a:fld id="{E0746DE6-3336-457D-A091-FA20AC1C536E}" type="slidenum">
               <a:rPr lang="en-US" smtClean="0"/>
-              <a:t>9</a:t>
+              <a:t>4</a:t>
             </a:fld>
             <a:endParaRPr lang="en-US"/>
           </a:p>
@@ -3152,7 +1150,7 @@
     </p:spTree>
     <p:extLst>
       <p:ext uri="{BB962C8B-B14F-4D97-AF65-F5344CB8AC3E}">
-        <p14:creationId xmlns:p14="http://schemas.microsoft.com/office/powerpoint/2010/main" val="2573084290"/>
+        <p14:creationId xmlns:p14="http://schemas.microsoft.com/office/powerpoint/2010/main" val="2099555281"/>
       </p:ext>
     </p:extLst>
   </p:cSld>
@@ -3206,7 +1204,58 @@
           <a:bodyPr/>
           <a:lstStyle/>
           <a:p>
-            <a:endParaRPr lang="en-US"/>
+            <a:r>
+              <a:rPr lang="en-US" dirty="0"/>
+              <a:t>Netflix is more like a movie database, where different production companies </a:t>
+            </a:r>
+            <a:r>
+              <a:rPr lang="en-US" dirty="0" err="1"/>
+              <a:t>deposite</a:t>
+            </a:r>
+            <a:r>
+              <a:rPr lang="en-US" dirty="0"/>
+              <a:t> their movies for viewers to see. </a:t>
+            </a:r>
+          </a:p>
+          <a:p>
+            <a:r>
+              <a:rPr lang="en-US" dirty="0"/>
+              <a:t>Disney plus contains movies that are original to the network and also its affiliates, </a:t>
+            </a:r>
+            <a:r>
+              <a:rPr lang="en-US" dirty="0" err="1"/>
+              <a:t>hulu</a:t>
+            </a:r>
+            <a:r>
+              <a:rPr lang="en-US" dirty="0"/>
+              <a:t>, </a:t>
+            </a:r>
+            <a:r>
+              <a:rPr lang="en-US" dirty="0" err="1"/>
+              <a:t>espn</a:t>
+            </a:r>
+            <a:r>
+              <a:rPr lang="en-US" dirty="0"/>
+              <a:t>, marvel, national geographics. </a:t>
+            </a:r>
+          </a:p>
+          <a:p>
+            <a:endParaRPr lang="en-US" dirty="0"/>
+          </a:p>
+          <a:p>
+            <a:r>
+              <a:rPr lang="en-US" dirty="0"/>
+              <a:t>Metric of influence is the number of IMDB votes each network receives. </a:t>
+            </a:r>
+          </a:p>
+          <a:p>
+            <a:r>
+              <a:rPr lang="en-US" dirty="0"/>
+              <a:t>- - The votes are volunteer, I think it’s a good indicator of how far a movie title is able to reach to different demographics and parts of the world. </a:t>
+            </a:r>
+          </a:p>
+          <a:p>
+            <a:endParaRPr lang="en-US" dirty="0"/>
           </a:p>
         </p:txBody>
       </p:sp>
@@ -3227,7 +1276,7 @@
           <a:p>
             <a:fld id="{E0746DE6-3336-457D-A091-FA20AC1C536E}" type="slidenum">
               <a:rPr lang="en-US" smtClean="0"/>
-              <a:t>13</a:t>
+              <a:t>5</a:t>
             </a:fld>
             <a:endParaRPr lang="en-US"/>
           </a:p>
@@ -3236,7 +1285,396 @@
     </p:spTree>
     <p:extLst>
       <p:ext uri="{BB962C8B-B14F-4D97-AF65-F5344CB8AC3E}">
-        <p14:creationId xmlns:p14="http://schemas.microsoft.com/office/powerpoint/2010/main" val="1989800599"/>
+        <p14:creationId xmlns:p14="http://schemas.microsoft.com/office/powerpoint/2010/main" val="1775761544"/>
+      </p:ext>
+    </p:extLst>
+  </p:cSld>
+  <p:clrMapOvr>
+    <a:masterClrMapping/>
+  </p:clrMapOvr>
+</p:notes>
+</file>
+
+<file path=ppt/notesSlides/notesSlide6.xml><?xml version="1.0" encoding="utf-8"?>
+<p:notes xmlns:a="http://schemas.openxmlformats.org/drawingml/2006/main" xmlns:r="http://schemas.openxmlformats.org/officeDocument/2006/relationships" xmlns:p="http://schemas.openxmlformats.org/presentationml/2006/main">
+  <p:cSld>
+    <p:spTree>
+      <p:nvGrpSpPr>
+        <p:cNvPr id="1" name=""/>
+        <p:cNvGrpSpPr/>
+        <p:nvPr/>
+      </p:nvGrpSpPr>
+      <p:grpSpPr>
+        <a:xfrm>
+          <a:off x="0" y="0"/>
+          <a:ext cx="0" cy="0"/>
+          <a:chOff x="0" y="0"/>
+          <a:chExt cx="0" cy="0"/>
+        </a:xfrm>
+      </p:grpSpPr>
+      <p:sp>
+        <p:nvSpPr>
+          <p:cNvPr id="2" name="Slide Image Placeholder 1"/>
+          <p:cNvSpPr>
+            <a:spLocks noGrp="1" noRot="1" noChangeAspect="1"/>
+          </p:cNvSpPr>
+          <p:nvPr>
+            <p:ph type="sldImg"/>
+          </p:nvPr>
+        </p:nvSpPr>
+        <p:spPr/>
+      </p:sp>
+      <p:sp>
+        <p:nvSpPr>
+          <p:cNvPr id="3" name="Notes Placeholder 2"/>
+          <p:cNvSpPr>
+            <a:spLocks noGrp="1"/>
+          </p:cNvSpPr>
+          <p:nvPr>
+            <p:ph type="body" idx="1"/>
+          </p:nvPr>
+        </p:nvSpPr>
+        <p:spPr/>
+        <p:txBody>
+          <a:bodyPr/>
+          <a:lstStyle/>
+          <a:p>
+            <a:r>
+              <a:rPr lang="en-US" dirty="0"/>
+              <a:t>The 5 top most produced genres are family, Comedy, Adventure, </a:t>
+            </a:r>
+            <a:r>
+              <a:rPr lang="en-US" dirty="0" err="1"/>
+              <a:t>Animationg</a:t>
+            </a:r>
+            <a:r>
+              <a:rPr lang="en-US" dirty="0"/>
+              <a:t> and Fantasy. </a:t>
+            </a:r>
+          </a:p>
+        </p:txBody>
+      </p:sp>
+      <p:sp>
+        <p:nvSpPr>
+          <p:cNvPr id="4" name="Slide Number Placeholder 3"/>
+          <p:cNvSpPr>
+            <a:spLocks noGrp="1"/>
+          </p:cNvSpPr>
+          <p:nvPr>
+            <p:ph type="sldNum" sz="quarter" idx="5"/>
+          </p:nvPr>
+        </p:nvSpPr>
+        <p:spPr/>
+        <p:txBody>
+          <a:bodyPr/>
+          <a:lstStyle/>
+          <a:p>
+            <a:fld id="{E0746DE6-3336-457D-A091-FA20AC1C536E}" type="slidenum">
+              <a:rPr lang="en-US" smtClean="0"/>
+              <a:t>6</a:t>
+            </a:fld>
+            <a:endParaRPr lang="en-US"/>
+          </a:p>
+        </p:txBody>
+      </p:sp>
+    </p:spTree>
+    <p:extLst>
+      <p:ext uri="{BB962C8B-B14F-4D97-AF65-F5344CB8AC3E}">
+        <p14:creationId xmlns:p14="http://schemas.microsoft.com/office/powerpoint/2010/main" val="1553918651"/>
+      </p:ext>
+    </p:extLst>
+  </p:cSld>
+  <p:clrMapOvr>
+    <a:masterClrMapping/>
+  </p:clrMapOvr>
+</p:notes>
+</file>
+
+<file path=ppt/notesSlides/notesSlide7.xml><?xml version="1.0" encoding="utf-8"?>
+<p:notes xmlns:a="http://schemas.openxmlformats.org/drawingml/2006/main" xmlns:r="http://schemas.openxmlformats.org/officeDocument/2006/relationships" xmlns:p="http://schemas.openxmlformats.org/presentationml/2006/main">
+  <p:cSld>
+    <p:spTree>
+      <p:nvGrpSpPr>
+        <p:cNvPr id="1" name=""/>
+        <p:cNvGrpSpPr/>
+        <p:nvPr/>
+      </p:nvGrpSpPr>
+      <p:grpSpPr>
+        <a:xfrm>
+          <a:off x="0" y="0"/>
+          <a:ext cx="0" cy="0"/>
+          <a:chOff x="0" y="0"/>
+          <a:chExt cx="0" cy="0"/>
+        </a:xfrm>
+      </p:grpSpPr>
+      <p:sp>
+        <p:nvSpPr>
+          <p:cNvPr id="2" name="Slide Image Placeholder 1"/>
+          <p:cNvSpPr>
+            <a:spLocks noGrp="1" noRot="1" noChangeAspect="1"/>
+          </p:cNvSpPr>
+          <p:nvPr>
+            <p:ph type="sldImg"/>
+          </p:nvPr>
+        </p:nvSpPr>
+        <p:spPr/>
+      </p:sp>
+      <p:sp>
+        <p:nvSpPr>
+          <p:cNvPr id="3" name="Notes Placeholder 2"/>
+          <p:cNvSpPr>
+            <a:spLocks noGrp="1"/>
+          </p:cNvSpPr>
+          <p:nvPr>
+            <p:ph type="body" idx="1"/>
+          </p:nvPr>
+        </p:nvSpPr>
+        <p:spPr/>
+        <p:txBody>
+          <a:bodyPr/>
+          <a:lstStyle/>
+          <a:p>
+            <a:r>
+              <a:rPr lang="en-US" dirty="0"/>
+              <a:t>blue is </a:t>
+            </a:r>
+            <a:r>
+              <a:rPr lang="en-US" dirty="0" err="1"/>
+              <a:t>disney</a:t>
+            </a:r>
+            <a:r>
+              <a:rPr lang="en-US" dirty="0"/>
+              <a:t>, yellow is </a:t>
+            </a:r>
+            <a:r>
+              <a:rPr lang="en-US" dirty="0" err="1"/>
+              <a:t>netflix</a:t>
+            </a:r>
+            <a:endParaRPr lang="en-US" dirty="0"/>
+          </a:p>
+          <a:p>
+            <a:endParaRPr lang="en-US" dirty="0"/>
+          </a:p>
+          <a:p>
+            <a:r>
+              <a:rPr lang="en-US" dirty="0"/>
+              <a:t>The colored box is where the middle 75% of view ratings are</a:t>
+            </a:r>
+          </a:p>
+          <a:p>
+            <a:endParaRPr lang="en-US" dirty="0"/>
+          </a:p>
+          <a:p>
+            <a:r>
+              <a:rPr lang="en-US" dirty="0"/>
+              <a:t>In comedy and </a:t>
+            </a:r>
+            <a:r>
+              <a:rPr lang="en-US" dirty="0" err="1"/>
+              <a:t>fantacy</a:t>
+            </a:r>
+            <a:r>
+              <a:rPr lang="en-US" dirty="0"/>
+              <a:t> the difference to be more apparent</a:t>
+            </a:r>
+          </a:p>
+        </p:txBody>
+      </p:sp>
+      <p:sp>
+        <p:nvSpPr>
+          <p:cNvPr id="4" name="Slide Number Placeholder 3"/>
+          <p:cNvSpPr>
+            <a:spLocks noGrp="1"/>
+          </p:cNvSpPr>
+          <p:nvPr>
+            <p:ph type="sldNum" sz="quarter" idx="5"/>
+          </p:nvPr>
+        </p:nvSpPr>
+        <p:spPr/>
+        <p:txBody>
+          <a:bodyPr/>
+          <a:lstStyle/>
+          <a:p>
+            <a:fld id="{E0746DE6-3336-457D-A091-FA20AC1C536E}" type="slidenum">
+              <a:rPr lang="en-US" smtClean="0"/>
+              <a:t>7</a:t>
+            </a:fld>
+            <a:endParaRPr lang="en-US"/>
+          </a:p>
+        </p:txBody>
+      </p:sp>
+    </p:spTree>
+    <p:extLst>
+      <p:ext uri="{BB962C8B-B14F-4D97-AF65-F5344CB8AC3E}">
+        <p14:creationId xmlns:p14="http://schemas.microsoft.com/office/powerpoint/2010/main" val="1616522739"/>
+      </p:ext>
+    </p:extLst>
+  </p:cSld>
+  <p:clrMapOvr>
+    <a:masterClrMapping/>
+  </p:clrMapOvr>
+</p:notes>
+</file>
+
+<file path=ppt/notesSlides/notesSlide8.xml><?xml version="1.0" encoding="utf-8"?>
+<p:notes xmlns:a="http://schemas.openxmlformats.org/drawingml/2006/main" xmlns:r="http://schemas.openxmlformats.org/officeDocument/2006/relationships" xmlns:p="http://schemas.openxmlformats.org/presentationml/2006/main">
+  <p:cSld>
+    <p:spTree>
+      <p:nvGrpSpPr>
+        <p:cNvPr id="1" name=""/>
+        <p:cNvGrpSpPr/>
+        <p:nvPr/>
+      </p:nvGrpSpPr>
+      <p:grpSpPr>
+        <a:xfrm>
+          <a:off x="0" y="0"/>
+          <a:ext cx="0" cy="0"/>
+          <a:chOff x="0" y="0"/>
+          <a:chExt cx="0" cy="0"/>
+        </a:xfrm>
+      </p:grpSpPr>
+      <p:sp>
+        <p:nvSpPr>
+          <p:cNvPr id="2" name="Slide Image Placeholder 1"/>
+          <p:cNvSpPr>
+            <a:spLocks noGrp="1" noRot="1" noChangeAspect="1"/>
+          </p:cNvSpPr>
+          <p:nvPr>
+            <p:ph type="sldImg"/>
+          </p:nvPr>
+        </p:nvSpPr>
+        <p:spPr/>
+      </p:sp>
+      <p:sp>
+        <p:nvSpPr>
+          <p:cNvPr id="3" name="Notes Placeholder 2"/>
+          <p:cNvSpPr>
+            <a:spLocks noGrp="1"/>
+          </p:cNvSpPr>
+          <p:nvPr>
+            <p:ph type="body" idx="1"/>
+          </p:nvPr>
+        </p:nvSpPr>
+        <p:spPr/>
+        <p:txBody>
+          <a:bodyPr/>
+          <a:lstStyle/>
+          <a:p>
+            <a:endParaRPr lang="en-US" dirty="0"/>
+          </a:p>
+        </p:txBody>
+      </p:sp>
+      <p:sp>
+        <p:nvSpPr>
+          <p:cNvPr id="4" name="Slide Number Placeholder 3"/>
+          <p:cNvSpPr>
+            <a:spLocks noGrp="1"/>
+          </p:cNvSpPr>
+          <p:nvPr>
+            <p:ph type="sldNum" sz="quarter" idx="5"/>
+          </p:nvPr>
+        </p:nvSpPr>
+        <p:spPr/>
+        <p:txBody>
+          <a:bodyPr/>
+          <a:lstStyle/>
+          <a:p>
+            <a:fld id="{E0746DE6-3336-457D-A091-FA20AC1C536E}" type="slidenum">
+              <a:rPr lang="en-US" smtClean="0"/>
+              <a:t>9</a:t>
+            </a:fld>
+            <a:endParaRPr lang="en-US"/>
+          </a:p>
+        </p:txBody>
+      </p:sp>
+    </p:spTree>
+    <p:extLst>
+      <p:ext uri="{BB962C8B-B14F-4D97-AF65-F5344CB8AC3E}">
+        <p14:creationId xmlns:p14="http://schemas.microsoft.com/office/powerpoint/2010/main" val="2859370027"/>
+      </p:ext>
+    </p:extLst>
+  </p:cSld>
+  <p:clrMapOvr>
+    <a:masterClrMapping/>
+  </p:clrMapOvr>
+</p:notes>
+</file>
+
+<file path=ppt/notesSlides/notesSlide9.xml><?xml version="1.0" encoding="utf-8"?>
+<p:notes xmlns:a="http://schemas.openxmlformats.org/drawingml/2006/main" xmlns:r="http://schemas.openxmlformats.org/officeDocument/2006/relationships" xmlns:p="http://schemas.openxmlformats.org/presentationml/2006/main">
+  <p:cSld>
+    <p:spTree>
+      <p:nvGrpSpPr>
+        <p:cNvPr id="1" name=""/>
+        <p:cNvGrpSpPr/>
+        <p:nvPr/>
+      </p:nvGrpSpPr>
+      <p:grpSpPr>
+        <a:xfrm>
+          <a:off x="0" y="0"/>
+          <a:ext cx="0" cy="0"/>
+          <a:chOff x="0" y="0"/>
+          <a:chExt cx="0" cy="0"/>
+        </a:xfrm>
+      </p:grpSpPr>
+      <p:sp>
+        <p:nvSpPr>
+          <p:cNvPr id="2" name="Slide Image Placeholder 1"/>
+          <p:cNvSpPr>
+            <a:spLocks noGrp="1" noRot="1" noChangeAspect="1"/>
+          </p:cNvSpPr>
+          <p:nvPr>
+            <p:ph type="sldImg"/>
+          </p:nvPr>
+        </p:nvSpPr>
+        <p:spPr/>
+      </p:sp>
+      <p:sp>
+        <p:nvSpPr>
+          <p:cNvPr id="3" name="Notes Placeholder 2"/>
+          <p:cNvSpPr>
+            <a:spLocks noGrp="1"/>
+          </p:cNvSpPr>
+          <p:nvPr>
+            <p:ph type="body" idx="1"/>
+          </p:nvPr>
+        </p:nvSpPr>
+        <p:spPr/>
+        <p:txBody>
+          <a:bodyPr/>
+          <a:lstStyle/>
+          <a:p>
+            <a:endParaRPr lang="en-US" dirty="0"/>
+          </a:p>
+        </p:txBody>
+      </p:sp>
+      <p:sp>
+        <p:nvSpPr>
+          <p:cNvPr id="4" name="Slide Number Placeholder 3"/>
+          <p:cNvSpPr>
+            <a:spLocks noGrp="1"/>
+          </p:cNvSpPr>
+          <p:nvPr>
+            <p:ph type="sldNum" sz="quarter" idx="5"/>
+          </p:nvPr>
+        </p:nvSpPr>
+        <p:spPr/>
+        <p:txBody>
+          <a:bodyPr/>
+          <a:lstStyle/>
+          <a:p>
+            <a:fld id="{E0746DE6-3336-457D-A091-FA20AC1C536E}" type="slidenum">
+              <a:rPr lang="en-US" smtClean="0"/>
+              <a:t>10</a:t>
+            </a:fld>
+            <a:endParaRPr lang="en-US"/>
+          </a:p>
+        </p:txBody>
+      </p:sp>
+    </p:spTree>
+    <p:extLst>
+      <p:ext uri="{BB962C8B-B14F-4D97-AF65-F5344CB8AC3E}">
+        <p14:creationId xmlns:p14="http://schemas.microsoft.com/office/powerpoint/2010/main" val="2573084290"/>
       </p:ext>
     </p:extLst>
   </p:cSld>
@@ -3614,7 +2052,7 @@
             <a:fld id="{3C633830-2244-49AE-BC4A-47F415C177C6}" type="datetimeFigureOut">
               <a:rPr lang="en-US" dirty="0"/>
               <a:pPr/>
-              <a:t>10/18/21</a:t>
+              <a:t>10/19/21</a:t>
             </a:fld>
             <a:endParaRPr lang="en-US" dirty="0"/>
           </a:p>
@@ -3862,7 +2300,7 @@
           <a:p>
             <a:fld id="{3C633830-2244-49AE-BC4A-47F415C177C6}" type="datetimeFigureOut">
               <a:rPr lang="en-US" dirty="0"/>
-              <a:t>10/18/21</a:t>
+              <a:t>10/19/21</a:t>
             </a:fld>
             <a:endParaRPr lang="en-US" dirty="0"/>
           </a:p>
@@ -4248,7 +2686,7 @@
           <a:p>
             <a:fld id="{3C633830-2244-49AE-BC4A-47F415C177C6}" type="datetimeFigureOut">
               <a:rPr lang="en-US" dirty="0"/>
-              <a:t>10/18/21</a:t>
+              <a:t>10/19/21</a:t>
             </a:fld>
             <a:endParaRPr lang="en-US" dirty="0"/>
           </a:p>
@@ -4477,7 +2915,7 @@
           <a:p>
             <a:fld id="{3C633830-2244-49AE-BC4A-47F415C177C6}" type="datetimeFigureOut">
               <a:rPr lang="en-US" dirty="0"/>
-              <a:t>10/18/21</a:t>
+              <a:t>10/19/21</a:t>
             </a:fld>
             <a:endParaRPr lang="en-US" dirty="0"/>
           </a:p>
@@ -4969,7 +3407,7 @@
             <a:fld id="{3C633830-2244-49AE-BC4A-47F415C177C6}" type="datetimeFigureOut">
               <a:rPr lang="en-US" dirty="0"/>
               <a:pPr/>
-              <a:t>10/18/21</a:t>
+              <a:t>10/19/21</a:t>
             </a:fld>
             <a:endParaRPr lang="en-US" dirty="0"/>
           </a:p>
@@ -5280,7 +3718,7 @@
           <a:p>
             <a:fld id="{3C633830-2244-49AE-BC4A-47F415C177C6}" type="datetimeFigureOut">
               <a:rPr lang="en-US" dirty="0"/>
-              <a:t>10/18/21</a:t>
+              <a:t>10/19/21</a:t>
             </a:fld>
             <a:endParaRPr lang="en-US" dirty="0"/>
           </a:p>
@@ -5671,7 +4109,7 @@
           <a:p>
             <a:fld id="{3C633830-2244-49AE-BC4A-47F415C177C6}" type="datetimeFigureOut">
               <a:rPr lang="en-US" dirty="0"/>
-              <a:t>10/18/21</a:t>
+              <a:t>10/19/21</a:t>
             </a:fld>
             <a:endParaRPr lang="en-US" dirty="0"/>
           </a:p>
@@ -5789,7 +4227,7 @@
           <a:p>
             <a:fld id="{3C633830-2244-49AE-BC4A-47F415C177C6}" type="datetimeFigureOut">
               <a:rPr lang="en-US" dirty="0"/>
-              <a:t>10/18/21</a:t>
+              <a:t>10/19/21</a:t>
             </a:fld>
             <a:endParaRPr lang="en-US" dirty="0"/>
           </a:p>
@@ -5884,7 +4322,7 @@
           <a:p>
             <a:fld id="{3C633830-2244-49AE-BC4A-47F415C177C6}" type="datetimeFigureOut">
               <a:rPr lang="en-US" dirty="0"/>
-              <a:t>10/18/21</a:t>
+              <a:t>10/19/21</a:t>
             </a:fld>
             <a:endParaRPr lang="en-US" dirty="0"/>
           </a:p>
@@ -6184,7 +4622,7 @@
           <a:p>
             <a:fld id="{3C633830-2244-49AE-BC4A-47F415C177C6}" type="datetimeFigureOut">
               <a:rPr lang="en-US" dirty="0"/>
-              <a:t>10/18/21</a:t>
+              <a:t>10/19/21</a:t>
             </a:fld>
             <a:endParaRPr lang="en-US" dirty="0"/>
           </a:p>
@@ -6449,7 +4887,7 @@
           <a:p>
             <a:fld id="{3C633830-2244-49AE-BC4A-47F415C177C6}" type="datetimeFigureOut">
               <a:rPr lang="en-US" dirty="0"/>
-              <a:t>10/18/21</a:t>
+              <a:t>10/19/21</a:t>
             </a:fld>
             <a:endParaRPr lang="en-US" dirty="0"/>
           </a:p>
@@ -6868,7 +5306,7 @@
             <a:fld id="{3C633830-2244-49AE-BC4A-47F415C177C6}" type="datetimeFigureOut">
               <a:rPr lang="en-US" dirty="0"/>
               <a:pPr/>
-              <a:t>10/18/21</a:t>
+              <a:t>10/19/21</a:t>
             </a:fld>
             <a:endParaRPr lang="en-US" dirty="0"/>
           </a:p>
@@ -7906,6 +6344,177 @@
 <file path=ppt/slides/slide10.xml><?xml version="1.0" encoding="utf-8"?>
 <p:sld xmlns:a="http://schemas.openxmlformats.org/drawingml/2006/main" xmlns:r="http://schemas.openxmlformats.org/officeDocument/2006/relationships" xmlns:p="http://schemas.openxmlformats.org/presentationml/2006/main">
   <p:cSld>
+    <p:bg>
+      <p:bgPr>
+        <a:solidFill>
+          <a:schemeClr val="tx1"/>
+        </a:solidFill>
+        <a:effectLst/>
+      </p:bgPr>
+    </p:bg>
+    <p:spTree>
+      <p:nvGrpSpPr>
+        <p:cNvPr id="1" name=""/>
+        <p:cNvGrpSpPr/>
+        <p:nvPr/>
+      </p:nvGrpSpPr>
+      <p:grpSpPr>
+        <a:xfrm>
+          <a:off x="0" y="0"/>
+          <a:ext cx="0" cy="0"/>
+          <a:chOff x="0" y="0"/>
+          <a:chExt cx="0" cy="0"/>
+        </a:xfrm>
+      </p:grpSpPr>
+      <p:sp>
+        <p:nvSpPr>
+          <p:cNvPr id="2" name="Title 1"/>
+          <p:cNvSpPr>
+            <a:spLocks noGrp="1"/>
+          </p:cNvSpPr>
+          <p:nvPr>
+            <p:ph type="title"/>
+          </p:nvPr>
+        </p:nvSpPr>
+        <p:spPr>
+          <a:xfrm>
+            <a:off x="1064029" y="663373"/>
+            <a:ext cx="10493233" cy="2454581"/>
+          </a:xfrm>
+        </p:spPr>
+        <p:txBody>
+          <a:bodyPr>
+            <a:normAutofit/>
+          </a:bodyPr>
+          <a:lstStyle/>
+          <a:p>
+            <a:pPr algn="l"/>
+            <a:r>
+              <a:rPr lang="en-US" sz="3100" dirty="0">
+                <a:solidFill>
+                  <a:schemeClr val="bg1"/>
+                </a:solidFill>
+              </a:rPr>
+              <a:t>So what is Disney </a:t>
+            </a:r>
+            <a:r>
+              <a:rPr lang="en-US" sz="3100" dirty="0" err="1">
+                <a:solidFill>
+                  <a:schemeClr val="bg1"/>
+                </a:solidFill>
+              </a:rPr>
+              <a:t>Plus’</a:t>
+            </a:r>
+            <a:r>
+              <a:rPr lang="en-US" sz="3100" dirty="0">
+                <a:solidFill>
+                  <a:schemeClr val="bg1"/>
+                </a:solidFill>
+              </a:rPr>
+              <a:t> strategy going forward to sustain its market share in the streaming business?</a:t>
+            </a:r>
+            <a:br>
+              <a:rPr lang="en-US" sz="3100" dirty="0">
+                <a:solidFill>
+                  <a:schemeClr val="bg1"/>
+                </a:solidFill>
+              </a:rPr>
+            </a:br>
+            <a:br>
+              <a:rPr lang="en-US" sz="3100" dirty="0">
+                <a:solidFill>
+                  <a:schemeClr val="bg1"/>
+                </a:solidFill>
+              </a:rPr>
+            </a:br>
+            <a:endParaRPr lang="en-US" sz="3100" dirty="0">
+              <a:solidFill>
+                <a:schemeClr val="bg1"/>
+              </a:solidFill>
+            </a:endParaRPr>
+          </a:p>
+        </p:txBody>
+      </p:sp>
+      <p:sp>
+        <p:nvSpPr>
+          <p:cNvPr id="26" name="Content Placeholder 25">
+            <a:extLst>
+              <a:ext uri="{FF2B5EF4-FFF2-40B4-BE49-F238E27FC236}">
+                <a16:creationId xmlns:a16="http://schemas.microsoft.com/office/drawing/2014/main" id="{E12FEED7-279A-407F-82ED-BF88D8956AFB}"/>
+              </a:ext>
+            </a:extLst>
+          </p:cNvPr>
+          <p:cNvSpPr>
+            <a:spLocks noGrp="1"/>
+          </p:cNvSpPr>
+          <p:nvPr>
+            <p:ph idx="1"/>
+          </p:nvPr>
+        </p:nvSpPr>
+        <p:spPr>
+          <a:xfrm>
+            <a:off x="1288938" y="2938077"/>
+            <a:ext cx="9434480" cy="3791848"/>
+          </a:xfrm>
+        </p:spPr>
+        <p:txBody>
+          <a:bodyPr>
+            <a:normAutofit/>
+          </a:bodyPr>
+          <a:lstStyle/>
+          <a:p>
+            <a:r>
+              <a:rPr lang="en-US" dirty="0">
+                <a:solidFill>
+                  <a:schemeClr val="bg1"/>
+                </a:solidFill>
+              </a:rPr>
+              <a:t> </a:t>
+            </a:r>
+            <a:r>
+              <a:rPr lang="en-US" sz="3200" dirty="0">
+                <a:solidFill>
+                  <a:schemeClr val="bg1"/>
+                </a:solidFill>
+              </a:rPr>
+              <a:t>Disney </a:t>
+            </a:r>
+            <a:r>
+              <a:rPr lang="en-US" sz="3200" dirty="0" err="1">
+                <a:solidFill>
+                  <a:schemeClr val="bg1"/>
+                </a:solidFill>
+              </a:rPr>
+              <a:t>Plus’</a:t>
+            </a:r>
+            <a:r>
+              <a:rPr lang="en-US" sz="3200" dirty="0">
+                <a:solidFill>
+                  <a:schemeClr val="bg1"/>
+                </a:solidFill>
+              </a:rPr>
+              <a:t> top producing genres also has grown in number, while maintaining higher IMDB ratings than Netflix. </a:t>
+            </a:r>
+            <a:endParaRPr lang="en-US" sz="3200" dirty="0"/>
+          </a:p>
+        </p:txBody>
+      </p:sp>
+    </p:spTree>
+    <p:extLst>
+      <p:ext uri="{BB962C8B-B14F-4D97-AF65-F5344CB8AC3E}">
+        <p14:creationId xmlns:p14="http://schemas.microsoft.com/office/powerpoint/2010/main" val="3701728251"/>
+      </p:ext>
+    </p:extLst>
+  </p:cSld>
+  <p:clrMapOvr>
+    <a:masterClrMapping/>
+  </p:clrMapOvr>
+</p:sld>
+</file>
+
+<file path=ppt/slides/slide11.xml><?xml version="1.0" encoding="utf-8"?>
+<p:sld xmlns:a="http://schemas.openxmlformats.org/drawingml/2006/main" xmlns:r="http://schemas.openxmlformats.org/officeDocument/2006/relationships" xmlns:p="http://schemas.openxmlformats.org/presentationml/2006/main">
+  <p:cSld>
     <p:spTree>
       <p:nvGrpSpPr>
         <p:cNvPr id="1" name=""/>
@@ -7988,7 +6597,7 @@
 </p:sld>
 </file>
 
-<file path=ppt/slides/slide11.xml><?xml version="1.0" encoding="utf-8"?>
+<file path=ppt/slides/slide12.xml><?xml version="1.0" encoding="utf-8"?>
 <p:sld xmlns:a="http://schemas.openxmlformats.org/drawingml/2006/main" xmlns:r="http://schemas.openxmlformats.org/officeDocument/2006/relationships" xmlns:p="http://schemas.openxmlformats.org/presentationml/2006/main">
   <p:cSld>
     <p:bg>
@@ -8062,7 +6671,7 @@
           <p:nvPr>
             <p:extLst>
               <p:ext uri="{D42A27DB-BD31-4B8C-83A1-F6EECF244321}">
-                <p14:modId xmlns:p14="http://schemas.microsoft.com/office/powerpoint/2010/main" val="1218475165"/>
+                <p14:modId xmlns:p14="http://schemas.microsoft.com/office/powerpoint/2010/main" val="587446651"/>
               </p:ext>
             </p:extLst>
           </p:nvPr>
@@ -8317,16 +6926,13 @@
                     <a:lstStyle/>
                     <a:p>
                       <a:pPr algn="l" fontAlgn="b"/>
-                      <a:r>
-                        <a:rPr lang="en-US" sz="2000" b="0" i="0" u="none" strike="noStrike">
-                          <a:solidFill>
-                            <a:schemeClr val="bg1"/>
-                          </a:solidFill>
-                          <a:effectLst/>
-                          <a:latin typeface="Calibri" panose="020F0502020204030204" pitchFamily="34" charset="0"/>
-                        </a:rPr>
-                        <a:t>Disney _plus</a:t>
-                      </a:r>
+                      <a:endParaRPr lang="en-US" sz="2000" b="0" i="0" u="none" strike="noStrike" dirty="0">
+                        <a:solidFill>
+                          <a:schemeClr val="bg1"/>
+                        </a:solidFill>
+                        <a:effectLst/>
+                        <a:latin typeface="Calibri" panose="020F0502020204030204" pitchFamily="34" charset="0"/>
+                      </a:endParaRPr>
                     </a:p>
                   </a:txBody>
                   <a:tcPr marL="9525" marR="9525" marT="9525" marB="0" anchor="b">
@@ -8529,16 +7135,13 @@
                     <a:lstStyle/>
                     <a:p>
                       <a:pPr algn="l" fontAlgn="b"/>
-                      <a:r>
-                        <a:rPr lang="en-US" sz="2000" b="0" i="0" u="none" strike="noStrike">
-                          <a:solidFill>
-                            <a:schemeClr val="bg1"/>
-                          </a:solidFill>
-                          <a:effectLst/>
-                          <a:latin typeface="Calibri" panose="020F0502020204030204" pitchFamily="34" charset="0"/>
-                        </a:rPr>
-                        <a:t>Netflix</a:t>
-                      </a:r>
+                      <a:endParaRPr lang="en-US" sz="2000" b="0" i="0" u="none" strike="noStrike">
+                        <a:solidFill>
+                          <a:schemeClr val="bg1"/>
+                        </a:solidFill>
+                        <a:effectLst/>
+                        <a:latin typeface="Calibri" panose="020F0502020204030204" pitchFamily="34" charset="0"/>
+                      </a:endParaRPr>
                     </a:p>
                   </a:txBody>
                   <a:tcPr marL="9525" marR="9525" marT="9525" marB="0" anchor="b">
@@ -8648,7 +7251,7 @@
             <p:ph idx="1"/>
             <p:extLst>
               <p:ext uri="{D42A27DB-BD31-4B8C-83A1-F6EECF244321}">
-                <p14:modId xmlns:p14="http://schemas.microsoft.com/office/powerpoint/2010/main" val="1946850641"/>
+                <p14:modId xmlns:p14="http://schemas.microsoft.com/office/powerpoint/2010/main" val="1713164164"/>
               </p:ext>
             </p:extLst>
           </p:nvPr>
@@ -8903,16 +7506,13 @@
                     <a:lstStyle/>
                     <a:p>
                       <a:pPr algn="l" fontAlgn="b"/>
-                      <a:r>
-                        <a:rPr lang="en-US" sz="2000" b="0" i="0" u="none" strike="noStrike">
-                          <a:solidFill>
-                            <a:schemeClr val="bg1"/>
-                          </a:solidFill>
-                          <a:effectLst/>
-                          <a:latin typeface="Calibri" panose="020F0502020204030204" pitchFamily="34" charset="0"/>
-                        </a:rPr>
-                        <a:t>Disney _plus</a:t>
-                      </a:r>
+                      <a:endParaRPr lang="en-US" sz="2000" b="0" i="0" u="none" strike="noStrike" dirty="0">
+                        <a:solidFill>
+                          <a:schemeClr val="bg1"/>
+                        </a:solidFill>
+                        <a:effectLst/>
+                        <a:latin typeface="Calibri" panose="020F0502020204030204" pitchFamily="34" charset="0"/>
+                      </a:endParaRPr>
                     </a:p>
                   </a:txBody>
                   <a:tcPr marL="9525" marR="9525" marT="9525" marB="0" anchor="b">
@@ -9010,7 +7610,7 @@
                     <a:p>
                       <a:pPr algn="l" fontAlgn="b"/>
                       <a:r>
-                        <a:rPr lang="en-US" sz="2000" b="0" i="0" u="none" strike="noStrike">
+                        <a:rPr lang="en-US" sz="2000" b="0" i="0" u="none" strike="noStrike" dirty="0">
                           <a:solidFill>
                             <a:schemeClr val="bg1"/>
                           </a:solidFill>
@@ -9115,16 +7715,13 @@
                     <a:lstStyle/>
                     <a:p>
                       <a:pPr algn="l" fontAlgn="b"/>
-                      <a:r>
-                        <a:rPr lang="en-US" sz="2000" b="0" i="0" u="none" strike="noStrike">
-                          <a:solidFill>
-                            <a:schemeClr val="bg1"/>
-                          </a:solidFill>
-                          <a:effectLst/>
-                          <a:latin typeface="Calibri" panose="020F0502020204030204" pitchFamily="34" charset="0"/>
-                        </a:rPr>
-                        <a:t>Netflix</a:t>
-                      </a:r>
+                      <a:endParaRPr lang="en-US" sz="2000" b="0" i="0" u="none" strike="noStrike" dirty="0">
+                        <a:solidFill>
+                          <a:schemeClr val="bg1"/>
+                        </a:solidFill>
+                        <a:effectLst/>
+                        <a:latin typeface="Calibri" panose="020F0502020204030204" pitchFamily="34" charset="0"/>
+                      </a:endParaRPr>
                     </a:p>
                   </a:txBody>
                   <a:tcPr marL="9525" marR="9525" marT="9525" marB="0" anchor="b">
@@ -9149,7 +7746,7 @@
                     <a:p>
                       <a:pPr algn="l" fontAlgn="b"/>
                       <a:r>
-                        <a:rPr lang="en-US" sz="2000" b="0" i="0" u="none" strike="noStrike">
+                        <a:rPr lang="en-US" sz="2000" b="0" i="0" u="none" strike="noStrike" dirty="0">
                           <a:solidFill>
                             <a:schemeClr val="bg1"/>
                           </a:solidFill>
@@ -9231,7 +7828,7 @@
 </p:sld>
 </file>
 
-<file path=ppt/slides/slide12.xml><?xml version="1.0" encoding="utf-8"?>
+<file path=ppt/slides/slide13.xml><?xml version="1.0" encoding="utf-8"?>
 <p:sld xmlns:a="http://schemas.openxmlformats.org/drawingml/2006/main" xmlns:r="http://schemas.openxmlformats.org/officeDocument/2006/relationships" xmlns:p="http://schemas.openxmlformats.org/presentationml/2006/main">
   <p:cSld>
     <p:bg>
@@ -9285,7 +7882,7 @@
                   <a:schemeClr val="tx1"/>
                 </a:solidFill>
               </a:rPr>
-              <a:t>Net Steps </a:t>
+              <a:t>Next Steps </a:t>
             </a:r>
           </a:p>
         </p:txBody>
@@ -9347,34 +7944,22 @@
             </a:pPr>
             <a:r>
               <a:rPr lang="en-US" dirty="0"/>
-              <a:t>A deeper dive into subtypes of products provided: </a:t>
-            </a:r>
-          </a:p>
-          <a:p>
+              <a:t>A deeper dive into subtypes of products provided what affects the the </a:t>
+            </a:r>
+            <a:r>
+              <a:rPr lang="en-US" dirty="0" err="1"/>
+              <a:t>viewship</a:t>
+            </a:r>
+            <a:endParaRPr lang="en-US" dirty="0"/>
+          </a:p>
+          <a:p>
+            <a:pPr marL="0" indent="0">
+              <a:buNone/>
+            </a:pPr>
             <a:r>
               <a:rPr lang="en-US" dirty="0"/>
-              <a:t>Movies  </a:t>
-            </a:r>
-            <a:r>
-              <a:rPr lang="en-US" dirty="0">
-                <a:sym typeface="Wingdings" pitchFamily="2" charset="2"/>
-              </a:rPr>
-              <a:t> TV movies </a:t>
-            </a:r>
-          </a:p>
-          <a:p>
-            <a:r>
-              <a:rPr lang="en-US" dirty="0">
-                <a:sym typeface="Wingdings" pitchFamily="2" charset="2"/>
-              </a:rPr>
-              <a:t>TV shows  mini series </a:t>
-            </a:r>
-            <a:endParaRPr lang="en-US" dirty="0"/>
-          </a:p>
-          <a:p>
-            <a:endParaRPr lang="en-US" dirty="0"/>
-          </a:p>
-          <a:p>
+              <a:t>How do viewers decide whether to see a movie on a big screen rather than streaming it? What are the factors that suggest a family might want to see a movie on the big screen? </a:t>
+            </a:r>
             <a:endParaRPr dirty="0"/>
           </a:p>
         </p:txBody>
@@ -9392,7 +7977,7 @@
 </p:sld>
 </file>
 
-<file path=ppt/slides/slide13.xml><?xml version="1.0" encoding="utf-8"?>
+<file path=ppt/slides/slide14.xml><?xml version="1.0" encoding="utf-8"?>
 <p:sld xmlns:a="http://schemas.openxmlformats.org/drawingml/2006/main" xmlns:r="http://schemas.openxmlformats.org/officeDocument/2006/relationships" xmlns:p="http://schemas.openxmlformats.org/presentationml/2006/main">
   <p:cSld>
     <p:bg>
@@ -9647,13 +8232,13 @@
           <a:p>
             <a:r>
               <a:rPr lang="en-US" dirty="0"/>
-              <a:t>Comparison of the contents </a:t>
+              <a:t>Findings</a:t>
             </a:r>
           </a:p>
           <a:p>
             <a:r>
               <a:rPr lang="en-US" dirty="0"/>
-              <a:t>Disney’s Growth strategy based on it’s competitive edge</a:t>
+              <a:t>Disney’s growth strategy going forward </a:t>
             </a:r>
           </a:p>
           <a:p>
@@ -9731,43 +8316,12 @@
           <a:lstStyle/>
           <a:p>
             <a:r>
-              <a:rPr lang="en-US" sz="4300"/>
+              <a:rPr lang="en-US" sz="4300" dirty="0"/>
               <a:t>Background</a:t>
             </a:r>
           </a:p>
         </p:txBody>
       </p:sp>
-      <p:graphicFrame>
-        <p:nvGraphicFramePr>
-          <p:cNvPr id="5" name="Content Placeholder 2">
-            <a:extLst>
-              <a:ext uri="{FF2B5EF4-FFF2-40B4-BE49-F238E27FC236}">
-                <a16:creationId xmlns:a16="http://schemas.microsoft.com/office/drawing/2014/main" id="{CE652A83-AB3D-4774-BA9E-A7CB5375C816}"/>
-              </a:ext>
-            </a:extLst>
-          </p:cNvPr>
-          <p:cNvGraphicFramePr>
-            <a:graphicFrameLocks noGrp="1"/>
-          </p:cNvGraphicFramePr>
-          <p:nvPr>
-            <p:ph idx="1"/>
-            <p:extLst>
-              <p:ext uri="{D42A27DB-BD31-4B8C-83A1-F6EECF244321}">
-                <p14:modId xmlns:p14="http://schemas.microsoft.com/office/powerpoint/2010/main" val="2119937409"/>
-              </p:ext>
-            </p:extLst>
-          </p:nvPr>
-        </p:nvGraphicFramePr>
-        <p:xfrm>
-          <a:off x="4713404" y="3124200"/>
-          <a:ext cx="6711884" cy="3087833"/>
-        </p:xfrm>
-        <a:graphic>
-          <a:graphicData uri="http://schemas.openxmlformats.org/drawingml/2006/diagram">
-            <dgm:relIds xmlns:dgm="http://schemas.openxmlformats.org/drawingml/2006/diagram" xmlns:r="http://schemas.openxmlformats.org/officeDocument/2006/relationships" r:dm="rId3" r:lo="rId4" r:qs="rId5" r:cs="rId6"/>
-          </a:graphicData>
-        </a:graphic>
-      </p:graphicFrame>
       <p:pic>
         <p:nvPicPr>
           <p:cNvPr id="7" name="Picture 6" descr="Chart, pie chart&#10;&#10;Description automatically generated">
@@ -9783,15 +8337,15 @@
           <p:nvPr/>
         </p:nvPicPr>
         <p:blipFill>
-          <a:blip r:embed="rId8"/>
+          <a:blip r:embed="rId3"/>
           <a:stretch>
             <a:fillRect/>
           </a:stretch>
         </p:blipFill>
         <p:spPr>
           <a:xfrm>
-            <a:off x="5486400" y="221701"/>
-            <a:ext cx="5872805" cy="3420909"/>
+            <a:off x="4491722" y="2333670"/>
+            <a:ext cx="5739451" cy="3343230"/>
           </a:xfrm>
           <a:prstGeom prst="rect">
             <a:avLst/>
@@ -9812,8 +8366,8 @@
         </p:nvSpPr>
         <p:spPr>
           <a:xfrm>
-            <a:off x="4937760" y="5790155"/>
-            <a:ext cx="5730240" cy="1200329"/>
+            <a:off x="650450" y="3921675"/>
+            <a:ext cx="2930950" cy="2031325"/>
           </a:xfrm>
           <a:prstGeom prst="rect">
             <a:avLst/>
@@ -9857,6 +8411,44 @@
               <a:buChar char="•"/>
             </a:pPr>
             <a:endParaRPr lang="en-US" dirty="0"/>
+          </a:p>
+        </p:txBody>
+      </p:sp>
+      <p:sp>
+        <p:nvSpPr>
+          <p:cNvPr id="6" name="Content Placeholder 5">
+            <a:extLst>
+              <a:ext uri="{FF2B5EF4-FFF2-40B4-BE49-F238E27FC236}">
+                <a16:creationId xmlns:a16="http://schemas.microsoft.com/office/drawing/2014/main" id="{82516764-5EA0-C34F-8662-4878E37BFA33}"/>
+              </a:ext>
+            </a:extLst>
+          </p:cNvPr>
+          <p:cNvSpPr>
+            <a:spLocks noGrp="1"/>
+          </p:cNvSpPr>
+          <p:nvPr>
+            <p:ph idx="1"/>
+          </p:nvPr>
+        </p:nvSpPr>
+        <p:spPr>
+          <a:xfrm>
+            <a:off x="915823" y="1345830"/>
+            <a:ext cx="10891100" cy="1200329"/>
+          </a:xfrm>
+        </p:spPr>
+        <p:txBody>
+          <a:bodyPr>
+            <a:noAutofit/>
+          </a:bodyPr>
+          <a:lstStyle/>
+          <a:p>
+            <a:pPr marL="0" indent="0">
+              <a:buNone/>
+            </a:pPr>
+            <a:r>
+              <a:rPr lang="en-US" sz="2800" dirty="0"/>
+              <a:t> Disney Plus is projected to overtake Netflix in overall subscribers by 2024 at the latest. </a:t>
+            </a:r>
           </a:p>
         </p:txBody>
       </p:sp>
@@ -10048,6 +8640,14 @@
 <file path=ppt/slides/slide5.xml><?xml version="1.0" encoding="utf-8"?>
 <p:sld xmlns:a="http://schemas.openxmlformats.org/drawingml/2006/main" xmlns:r="http://schemas.openxmlformats.org/officeDocument/2006/relationships" xmlns:p="http://schemas.openxmlformats.org/presentationml/2006/main">
   <p:cSld>
+    <p:bg>
+      <p:bgPr>
+        <a:solidFill>
+          <a:schemeClr val="tx1"/>
+        </a:solidFill>
+        <a:effectLst/>
+      </p:bgPr>
+    </p:bg>
     <p:spTree>
       <p:nvGrpSpPr>
         <p:cNvPr id="1" name=""/>
@@ -10067,6 +8667,179 @@
           <p:cNvPr id="2" name="Title 1">
             <a:extLst>
               <a:ext uri="{FF2B5EF4-FFF2-40B4-BE49-F238E27FC236}">
+                <a16:creationId xmlns:a16="http://schemas.microsoft.com/office/drawing/2014/main" id="{934FB31C-D40D-5B4A-8E35-C20AC1500516}"/>
+              </a:ext>
+            </a:extLst>
+          </p:cNvPr>
+          <p:cNvSpPr>
+            <a:spLocks noGrp="1"/>
+          </p:cNvSpPr>
+          <p:nvPr>
+            <p:ph type="title"/>
+          </p:nvPr>
+        </p:nvSpPr>
+        <p:spPr/>
+        <p:txBody>
+          <a:bodyPr/>
+          <a:lstStyle/>
+          <a:p>
+            <a:r>
+              <a:rPr lang="en-US" dirty="0">
+                <a:solidFill>
+                  <a:schemeClr val="bg1"/>
+                </a:solidFill>
+              </a:rPr>
+              <a:t>The Data</a:t>
+            </a:r>
+          </a:p>
+        </p:txBody>
+      </p:sp>
+      <p:sp>
+        <p:nvSpPr>
+          <p:cNvPr id="3" name="Content Placeholder 2">
+            <a:extLst>
+              <a:ext uri="{FF2B5EF4-FFF2-40B4-BE49-F238E27FC236}">
+                <a16:creationId xmlns:a16="http://schemas.microsoft.com/office/drawing/2014/main" id="{983AF3B5-2728-9545-B529-149802F726BB}"/>
+              </a:ext>
+            </a:extLst>
+          </p:cNvPr>
+          <p:cNvSpPr>
+            <a:spLocks noGrp="1"/>
+          </p:cNvSpPr>
+          <p:nvPr>
+            <p:ph idx="1"/>
+          </p:nvPr>
+        </p:nvSpPr>
+        <p:spPr/>
+        <p:txBody>
+          <a:bodyPr>
+            <a:normAutofit/>
+          </a:bodyPr>
+          <a:lstStyle/>
+          <a:p>
+            <a:r>
+              <a:rPr lang="en-US" sz="2800" dirty="0">
+                <a:solidFill>
+                  <a:schemeClr val="bg1"/>
+                </a:solidFill>
+              </a:rPr>
+              <a:t>Disney plus data contains the data from October 2019 to May of 2020 by month</a:t>
+            </a:r>
+          </a:p>
+          <a:p>
+            <a:r>
+              <a:rPr lang="en-US" sz="2800" dirty="0">
+                <a:solidFill>
+                  <a:schemeClr val="bg1"/>
+                </a:solidFill>
+              </a:rPr>
+              <a:t>Netflix data contains movies dated from 1932 to 2021 by year</a:t>
+            </a:r>
+          </a:p>
+        </p:txBody>
+      </p:sp>
+      <p:sp>
+        <p:nvSpPr>
+          <p:cNvPr id="4" name="TextBox 3">
+            <a:extLst>
+              <a:ext uri="{FF2B5EF4-FFF2-40B4-BE49-F238E27FC236}">
+                <a16:creationId xmlns:a16="http://schemas.microsoft.com/office/drawing/2014/main" id="{4015A3B9-9643-614F-98FE-E1864DF670FF}"/>
+              </a:ext>
+            </a:extLst>
+          </p:cNvPr>
+          <p:cNvSpPr txBox="1"/>
+          <p:nvPr/>
+        </p:nvSpPr>
+        <p:spPr>
+          <a:xfrm>
+            <a:off x="5181600" y="3820229"/>
+            <a:ext cx="5731300" cy="1200329"/>
+          </a:xfrm>
+          <a:prstGeom prst="rect">
+            <a:avLst/>
+          </a:prstGeom>
+          <a:noFill/>
+        </p:spPr>
+        <p:txBody>
+          <a:bodyPr wrap="square" rtlCol="0">
+            <a:spAutoFit/>
+          </a:bodyPr>
+          <a:lstStyle/>
+          <a:p>
+            <a:r>
+              <a:rPr lang="en-US" sz="2400" dirty="0">
+                <a:solidFill>
+                  <a:schemeClr val="bg1"/>
+                </a:solidFill>
+              </a:rPr>
+              <a:t>Metrics  I used: </a:t>
+            </a:r>
+          </a:p>
+          <a:p>
+            <a:r>
+              <a:rPr lang="en-US" sz="2400" dirty="0">
+                <a:solidFill>
+                  <a:schemeClr val="bg1"/>
+                </a:solidFill>
+              </a:rPr>
+              <a:t>- IMDB Ratings</a:t>
+            </a:r>
+          </a:p>
+          <a:p>
+            <a:r>
+              <a:rPr lang="en-US" sz="2400" dirty="0">
+                <a:solidFill>
+                  <a:schemeClr val="bg1"/>
+                </a:solidFill>
+              </a:rPr>
+              <a:t>- Number of IMDB Votes</a:t>
+            </a:r>
+          </a:p>
+        </p:txBody>
+      </p:sp>
+    </p:spTree>
+    <p:extLst>
+      <p:ext uri="{BB962C8B-B14F-4D97-AF65-F5344CB8AC3E}">
+        <p14:creationId xmlns:p14="http://schemas.microsoft.com/office/powerpoint/2010/main" val="4148883076"/>
+      </p:ext>
+    </p:extLst>
+  </p:cSld>
+  <p:clrMapOvr>
+    <a:masterClrMapping/>
+  </p:clrMapOvr>
+</p:sld>
+</file>
+
+<file path=ppt/slides/slide6.xml><?xml version="1.0" encoding="utf-8"?>
+<p:sld xmlns:a="http://schemas.openxmlformats.org/drawingml/2006/main" xmlns:r="http://schemas.openxmlformats.org/officeDocument/2006/relationships" xmlns:p="http://schemas.openxmlformats.org/presentationml/2006/main">
+  <p:cSld>
+    <p:bg>
+      <p:bgPr>
+        <a:solidFill>
+          <a:schemeClr val="tx1"/>
+        </a:solidFill>
+        <a:effectLst/>
+      </p:bgPr>
+    </p:bg>
+    <p:spTree>
+      <p:nvGrpSpPr>
+        <p:cNvPr id="1" name=""/>
+        <p:cNvGrpSpPr/>
+        <p:nvPr/>
+      </p:nvGrpSpPr>
+      <p:grpSpPr>
+        <a:xfrm>
+          <a:off x="0" y="0"/>
+          <a:ext cx="0" cy="0"/>
+          <a:chOff x="0" y="0"/>
+          <a:chExt cx="0" cy="0"/>
+        </a:xfrm>
+      </p:grpSpPr>
+      <p:sp>
+        <p:nvSpPr>
+          <p:cNvPr id="2" name="Title 1">
+            <a:extLst>
+              <a:ext uri="{FF2B5EF4-FFF2-40B4-BE49-F238E27FC236}">
                 <a16:creationId xmlns:a16="http://schemas.microsoft.com/office/drawing/2014/main" id="{D01853E3-70EB-A041-968D-49ACEF6978F2}"/>
               </a:ext>
             </a:extLst>
@@ -10078,13 +8851,22 @@
             <p:ph type="title"/>
           </p:nvPr>
         </p:nvSpPr>
-        <p:spPr/>
+        <p:spPr>
+          <a:xfrm>
+            <a:off x="400050" y="574733"/>
+            <a:ext cx="3833906" cy="4952492"/>
+          </a:xfrm>
+        </p:spPr>
         <p:txBody>
           <a:bodyPr/>
           <a:lstStyle/>
           <a:p>
             <a:r>
-              <a:rPr lang="en-US" dirty="0"/>
+              <a:rPr lang="en-US" dirty="0">
+                <a:solidFill>
+                  <a:schemeClr val="bg1"/>
+                </a:solidFill>
+              </a:rPr>
               <a:t>Contents of Disney Plus</a:t>
             </a:r>
           </a:p>
@@ -10107,7 +8889,7 @@
           </p:nvPr>
         </p:nvPicPr>
         <p:blipFill>
-          <a:blip r:embed="rId2"/>
+          <a:blip r:embed="rId3"/>
           <a:stretch>
             <a:fillRect/>
           </a:stretch>
@@ -10132,88 +8914,10 @@
   <p:clrMapOvr>
     <a:masterClrMapping/>
   </p:clrMapOvr>
-  <p:timing>
-    <p:tnLst>
-      <p:par>
-        <p:cTn id="1" dur="indefinite" restart="never" nodeType="tmRoot">
-          <p:childTnLst>
-            <p:seq concurrent="1" nextAc="seek">
-              <p:cTn id="2" restart="whenNotActive" fill="hold" evtFilter="cancelBubble" nodeType="interactiveSeq">
-                <p:stCondLst>
-                  <p:cond evt="onClick" delay="0">
-                    <p:tgtEl>
-                      <p:spTgt spid="4"/>
-                    </p:tgtEl>
-                  </p:cond>
-                </p:stCondLst>
-                <p:endSync evt="end" delay="0">
-                  <p:rtn val="all"/>
-                </p:endSync>
-                <p:childTnLst>
-                  <p:par>
-                    <p:cTn id="3" fill="hold">
-                      <p:stCondLst>
-                        <p:cond delay="0"/>
-                      </p:stCondLst>
-                      <p:childTnLst>
-                        <p:par>
-                          <p:cTn id="4" fill="hold">
-                            <p:stCondLst>
-                              <p:cond delay="0"/>
-                            </p:stCondLst>
-                            <p:childTnLst>
-                              <p:par>
-                                <p:cTn id="5" presetID="1" presetClass="entr" presetSubtype="0" fill="hold" nodeType="clickEffect">
-                                  <p:stCondLst>
-                                    <p:cond delay="0"/>
-                                  </p:stCondLst>
-                                  <p:childTnLst>
-                                    <p:set>
-                                      <p:cBhvr>
-                                        <p:cTn id="6" dur="1" fill="hold">
-                                          <p:stCondLst>
-                                            <p:cond delay="0"/>
-                                          </p:stCondLst>
-                                        </p:cTn>
-                                        <p:tgtEl>
-                                          <p:spTgt spid="4"/>
-                                        </p:tgtEl>
-                                        <p:attrNameLst>
-                                          <p:attrName>style.visibility</p:attrName>
-                                        </p:attrNameLst>
-                                      </p:cBhvr>
-                                      <p:to>
-                                        <p:strVal val="visible"/>
-                                      </p:to>
-                                    </p:set>
-                                  </p:childTnLst>
-                                </p:cTn>
-                              </p:par>
-                            </p:childTnLst>
-                          </p:cTn>
-                        </p:par>
-                      </p:childTnLst>
-                    </p:cTn>
-                  </p:par>
-                </p:childTnLst>
-              </p:cTn>
-              <p:nextCondLst>
-                <p:cond evt="onClick" delay="0">
-                  <p:tgtEl>
-                    <p:spTgt spid="4"/>
-                  </p:tgtEl>
-                </p:cond>
-              </p:nextCondLst>
-            </p:seq>
-          </p:childTnLst>
-        </p:cTn>
-      </p:par>
-    </p:tnLst>
-  </p:timing>
 </p:sld>
 </file>
 
-<file path=ppt/slides/slide6.xml><?xml version="1.0" encoding="utf-8"?>
+<file path=ppt/slides/slide7.xml><?xml version="1.0" encoding="utf-8"?>
 <p:sld xmlns:a="http://schemas.openxmlformats.org/drawingml/2006/main" xmlns:r="http://schemas.openxmlformats.org/officeDocument/2006/relationships" xmlns:p="http://schemas.openxmlformats.org/presentationml/2006/main">
   <p:cSld>
     <p:bg>
@@ -10319,14 +9023,14 @@
           </p:nvPr>
         </p:nvPicPr>
         <p:blipFill>
-          <a:blip r:embed="rId2"/>
+          <a:blip r:embed="rId3"/>
           <a:stretch>
             <a:fillRect/>
           </a:stretch>
         </p:blipFill>
         <p:spPr>
           <a:xfrm>
-            <a:off x="404735" y="2818151"/>
+            <a:off x="2407076" y="2818151"/>
             <a:ext cx="2178122" cy="3098555"/>
           </a:xfrm>
         </p:spPr>
@@ -10346,14 +9050,14 @@
           <p:nvPr/>
         </p:nvPicPr>
         <p:blipFill>
-          <a:blip r:embed="rId3"/>
+          <a:blip r:embed="rId4"/>
           <a:stretch>
             <a:fillRect/>
           </a:stretch>
         </p:blipFill>
         <p:spPr>
           <a:xfrm>
-            <a:off x="2614154" y="2818151"/>
+            <a:off x="444373" y="2815390"/>
             <a:ext cx="1962703" cy="3101316"/>
           </a:xfrm>
           <a:prstGeom prst="rect">
@@ -10376,7 +9080,7 @@
           <p:nvPr/>
         </p:nvPicPr>
         <p:blipFill>
-          <a:blip r:embed="rId4"/>
+          <a:blip r:embed="rId5"/>
           <a:stretch>
             <a:fillRect/>
           </a:stretch>
@@ -10406,7 +9110,7 @@
           <p:nvPr/>
         </p:nvPicPr>
         <p:blipFill>
-          <a:blip r:embed="rId5"/>
+          <a:blip r:embed="rId6"/>
           <a:stretch>
             <a:fillRect/>
           </a:stretch>
@@ -10436,7 +9140,7 @@
           <p:nvPr/>
         </p:nvPicPr>
         <p:blipFill>
-          <a:blip r:embed="rId6"/>
+          <a:blip r:embed="rId7"/>
           <a:stretch>
             <a:fillRect/>
           </a:stretch>
@@ -10464,7 +9168,7 @@
 </p:sld>
 </file>
 
-<file path=ppt/slides/slide7.xml><?xml version="1.0" encoding="utf-8"?>
+<file path=ppt/slides/slide8.xml><?xml version="1.0" encoding="utf-8"?>
 <p:sld xmlns:a="http://schemas.openxmlformats.org/drawingml/2006/main" xmlns:r="http://schemas.openxmlformats.org/officeDocument/2006/relationships" xmlns:p="http://schemas.openxmlformats.org/presentationml/2006/main">
   <p:cSld>
     <p:bg>
@@ -11253,7 +9957,7 @@
 </p:sld>
 </file>
 
-<file path=ppt/slides/slide8.xml><?xml version="1.0" encoding="utf-8"?>
+<file path=ppt/slides/slide9.xml><?xml version="1.0" encoding="utf-8"?>
 <p:sld xmlns:a="http://schemas.openxmlformats.org/drawingml/2006/main" xmlns:r="http://schemas.openxmlformats.org/officeDocument/2006/relationships" xmlns:p="http://schemas.openxmlformats.org/presentationml/2006/main">
   <p:cSld>
     <p:bg>
@@ -11723,7 +10427,7 @@
           </p:nvPr>
         </p:nvPicPr>
         <p:blipFill>
-          <a:blip r:embed="rId2"/>
+          <a:blip r:embed="rId3"/>
           <a:stretch>
             <a:fillRect/>
           </a:stretch>
@@ -11750,7 +10454,7 @@
           <p:nvPr/>
         </p:nvPicPr>
         <p:blipFill>
-          <a:blip r:embed="rId3"/>
+          <a:blip r:embed="rId4"/>
           <a:stretch>
             <a:fillRect/>
           </a:stretch>
@@ -11780,7 +10484,7 @@
           <p:nvPr/>
         </p:nvPicPr>
         <p:blipFill>
-          <a:blip r:embed="rId4"/>
+          <a:blip r:embed="rId5"/>
           <a:stretch>
             <a:fillRect/>
           </a:stretch>
@@ -11810,7 +10514,7 @@
           <p:nvPr/>
         </p:nvPicPr>
         <p:blipFill>
-          <a:blip r:embed="rId5"/>
+          <a:blip r:embed="rId6"/>
           <a:stretch>
             <a:fillRect/>
           </a:stretch>
@@ -11840,7 +10544,7 @@
           <p:nvPr/>
         </p:nvPicPr>
         <p:blipFill>
-          <a:blip r:embed="rId6"/>
+          <a:blip r:embed="rId7"/>
           <a:stretch>
             <a:fillRect/>
           </a:stretch>
@@ -11859,169 +10563,6 @@
     <p:extLst>
       <p:ext uri="{BB962C8B-B14F-4D97-AF65-F5344CB8AC3E}">
         <p14:creationId xmlns:p14="http://schemas.microsoft.com/office/powerpoint/2010/main" val="3418427250"/>
-      </p:ext>
-    </p:extLst>
-  </p:cSld>
-  <p:clrMapOvr>
-    <a:masterClrMapping/>
-  </p:clrMapOvr>
-</p:sld>
-</file>
-
-<file path=ppt/slides/slide9.xml><?xml version="1.0" encoding="utf-8"?>
-<p:sld xmlns:a="http://schemas.openxmlformats.org/drawingml/2006/main" xmlns:r="http://schemas.openxmlformats.org/officeDocument/2006/relationships" xmlns:p="http://schemas.openxmlformats.org/presentationml/2006/main">
-  <p:cSld>
-    <p:bg>
-      <p:bgPr>
-        <a:solidFill>
-          <a:schemeClr val="tx1"/>
-        </a:solidFill>
-        <a:effectLst/>
-      </p:bgPr>
-    </p:bg>
-    <p:spTree>
-      <p:nvGrpSpPr>
-        <p:cNvPr id="1" name=""/>
-        <p:cNvGrpSpPr/>
-        <p:nvPr/>
-      </p:nvGrpSpPr>
-      <p:grpSpPr>
-        <a:xfrm>
-          <a:off x="0" y="0"/>
-          <a:ext cx="0" cy="0"/>
-          <a:chOff x="0" y="0"/>
-          <a:chExt cx="0" cy="0"/>
-        </a:xfrm>
-      </p:grpSpPr>
-      <p:sp>
-        <p:nvSpPr>
-          <p:cNvPr id="2" name="Title 1"/>
-          <p:cNvSpPr>
-            <a:spLocks noGrp="1"/>
-          </p:cNvSpPr>
-          <p:nvPr>
-            <p:ph type="title"/>
-          </p:nvPr>
-        </p:nvSpPr>
-        <p:spPr>
-          <a:xfrm>
-            <a:off x="1064029" y="663373"/>
-            <a:ext cx="10493233" cy="2454581"/>
-          </a:xfrm>
-        </p:spPr>
-        <p:txBody>
-          <a:bodyPr>
-            <a:normAutofit/>
-          </a:bodyPr>
-          <a:lstStyle/>
-          <a:p>
-            <a:pPr algn="l"/>
-            <a:r>
-              <a:rPr lang="en-US" sz="3100" dirty="0">
-                <a:solidFill>
-                  <a:schemeClr val="bg1"/>
-                </a:solidFill>
-              </a:rPr>
-              <a:t>So what is Disney </a:t>
-            </a:r>
-            <a:r>
-              <a:rPr lang="en-US" sz="3100" dirty="0" err="1">
-                <a:solidFill>
-                  <a:schemeClr val="bg1"/>
-                </a:solidFill>
-              </a:rPr>
-              <a:t>Plus’</a:t>
-            </a:r>
-            <a:r>
-              <a:rPr lang="en-US" sz="3100" dirty="0">
-                <a:solidFill>
-                  <a:schemeClr val="bg1"/>
-                </a:solidFill>
-              </a:rPr>
-              <a:t> strategy going forward to sustain its market share in the streaming business?</a:t>
-            </a:r>
-            <a:br>
-              <a:rPr lang="en-US" sz="3100" dirty="0">
-                <a:solidFill>
-                  <a:schemeClr val="bg1"/>
-                </a:solidFill>
-              </a:rPr>
-            </a:br>
-            <a:br>
-              <a:rPr lang="en-US" sz="3100" dirty="0">
-                <a:solidFill>
-                  <a:schemeClr val="bg1"/>
-                </a:solidFill>
-              </a:rPr>
-            </a:br>
-            <a:endParaRPr lang="en-US" sz="3100" dirty="0">
-              <a:solidFill>
-                <a:schemeClr val="bg1"/>
-              </a:solidFill>
-            </a:endParaRPr>
-          </a:p>
-        </p:txBody>
-      </p:sp>
-      <p:sp>
-        <p:nvSpPr>
-          <p:cNvPr id="26" name="Content Placeholder 25">
-            <a:extLst>
-              <a:ext uri="{FF2B5EF4-FFF2-40B4-BE49-F238E27FC236}">
-                <a16:creationId xmlns:a16="http://schemas.microsoft.com/office/drawing/2014/main" id="{E12FEED7-279A-407F-82ED-BF88D8956AFB}"/>
-              </a:ext>
-            </a:extLst>
-          </p:cNvPr>
-          <p:cNvSpPr>
-            <a:spLocks noGrp="1"/>
-          </p:cNvSpPr>
-          <p:nvPr>
-            <p:ph idx="1"/>
-          </p:nvPr>
-        </p:nvSpPr>
-        <p:spPr>
-          <a:xfrm>
-            <a:off x="1288938" y="2938077"/>
-            <a:ext cx="9434480" cy="3791848"/>
-          </a:xfrm>
-        </p:spPr>
-        <p:txBody>
-          <a:bodyPr>
-            <a:normAutofit/>
-          </a:bodyPr>
-          <a:lstStyle/>
-          <a:p>
-            <a:r>
-              <a:rPr lang="en-US" dirty="0">
-                <a:solidFill>
-                  <a:schemeClr val="bg1"/>
-                </a:solidFill>
-              </a:rPr>
-              <a:t> Disney </a:t>
-            </a:r>
-            <a:r>
-              <a:rPr lang="en-US" dirty="0" err="1">
-                <a:solidFill>
-                  <a:schemeClr val="bg1"/>
-                </a:solidFill>
-              </a:rPr>
-              <a:t>Plus’</a:t>
-            </a:r>
-            <a:r>
-              <a:rPr lang="en-US" dirty="0">
-                <a:solidFill>
-                  <a:schemeClr val="bg1"/>
-                </a:solidFill>
-              </a:rPr>
-              <a:t> top producing genres also has grown in number, while maintaining higher IMDB ratings than Netflix. </a:t>
-            </a:r>
-            <a:endParaRPr lang="en-US" dirty="0"/>
-          </a:p>
-        </p:txBody>
-      </p:sp>
-    </p:spTree>
-    <p:extLst>
-      <p:ext uri="{BB962C8B-B14F-4D97-AF65-F5344CB8AC3E}">
-        <p14:creationId xmlns:p14="http://schemas.microsoft.com/office/powerpoint/2010/main" val="3701728251"/>
       </p:ext>
     </p:extLst>
   </p:cSld>

</xml_diff>

<commit_message>
Netflix & Disney plus compare
</commit_message>
<xml_diff>
--- a/Analysis of Disney Plus Competitiveness over Netflix.pptx
+++ b/Analysis of Disney Plus Competitiveness over Netflix.pptx
@@ -240,7 +240,7 @@
           <a:p>
             <a:fld id="{A5C20BB3-3CCB-4FE5-991B-82F6BCB48AF3}" type="datetimeFigureOut">
               <a:rPr lang="en-US" smtClean="0"/>
-              <a:t>10/19/21</a:t>
+              <a:t>10/24/21</a:t>
             </a:fld>
             <a:endParaRPr lang="en-US"/>
           </a:p>
@@ -2052,7 +2052,7 @@
             <a:fld id="{3C633830-2244-49AE-BC4A-47F415C177C6}" type="datetimeFigureOut">
               <a:rPr lang="en-US" dirty="0"/>
               <a:pPr/>
-              <a:t>10/19/21</a:t>
+              <a:t>10/24/21</a:t>
             </a:fld>
             <a:endParaRPr lang="en-US" dirty="0"/>
           </a:p>
@@ -2300,7 +2300,7 @@
           <a:p>
             <a:fld id="{3C633830-2244-49AE-BC4A-47F415C177C6}" type="datetimeFigureOut">
               <a:rPr lang="en-US" dirty="0"/>
-              <a:t>10/19/21</a:t>
+              <a:t>10/24/21</a:t>
             </a:fld>
             <a:endParaRPr lang="en-US" dirty="0"/>
           </a:p>
@@ -2686,7 +2686,7 @@
           <a:p>
             <a:fld id="{3C633830-2244-49AE-BC4A-47F415C177C6}" type="datetimeFigureOut">
               <a:rPr lang="en-US" dirty="0"/>
-              <a:t>10/19/21</a:t>
+              <a:t>10/24/21</a:t>
             </a:fld>
             <a:endParaRPr lang="en-US" dirty="0"/>
           </a:p>
@@ -2915,7 +2915,7 @@
           <a:p>
             <a:fld id="{3C633830-2244-49AE-BC4A-47F415C177C6}" type="datetimeFigureOut">
               <a:rPr lang="en-US" dirty="0"/>
-              <a:t>10/19/21</a:t>
+              <a:t>10/24/21</a:t>
             </a:fld>
             <a:endParaRPr lang="en-US" dirty="0"/>
           </a:p>
@@ -3407,7 +3407,7 @@
             <a:fld id="{3C633830-2244-49AE-BC4A-47F415C177C6}" type="datetimeFigureOut">
               <a:rPr lang="en-US" dirty="0"/>
               <a:pPr/>
-              <a:t>10/19/21</a:t>
+              <a:t>10/24/21</a:t>
             </a:fld>
             <a:endParaRPr lang="en-US" dirty="0"/>
           </a:p>
@@ -3718,7 +3718,7 @@
           <a:p>
             <a:fld id="{3C633830-2244-49AE-BC4A-47F415C177C6}" type="datetimeFigureOut">
               <a:rPr lang="en-US" dirty="0"/>
-              <a:t>10/19/21</a:t>
+              <a:t>10/24/21</a:t>
             </a:fld>
             <a:endParaRPr lang="en-US" dirty="0"/>
           </a:p>
@@ -4109,7 +4109,7 @@
           <a:p>
             <a:fld id="{3C633830-2244-49AE-BC4A-47F415C177C6}" type="datetimeFigureOut">
               <a:rPr lang="en-US" dirty="0"/>
-              <a:t>10/19/21</a:t>
+              <a:t>10/24/21</a:t>
             </a:fld>
             <a:endParaRPr lang="en-US" dirty="0"/>
           </a:p>
@@ -4227,7 +4227,7 @@
           <a:p>
             <a:fld id="{3C633830-2244-49AE-BC4A-47F415C177C6}" type="datetimeFigureOut">
               <a:rPr lang="en-US" dirty="0"/>
-              <a:t>10/19/21</a:t>
+              <a:t>10/24/21</a:t>
             </a:fld>
             <a:endParaRPr lang="en-US" dirty="0"/>
           </a:p>
@@ -4322,7 +4322,7 @@
           <a:p>
             <a:fld id="{3C633830-2244-49AE-BC4A-47F415C177C6}" type="datetimeFigureOut">
               <a:rPr lang="en-US" dirty="0"/>
-              <a:t>10/19/21</a:t>
+              <a:t>10/24/21</a:t>
             </a:fld>
             <a:endParaRPr lang="en-US" dirty="0"/>
           </a:p>
@@ -4622,7 +4622,7 @@
           <a:p>
             <a:fld id="{3C633830-2244-49AE-BC4A-47F415C177C6}" type="datetimeFigureOut">
               <a:rPr lang="en-US" dirty="0"/>
-              <a:t>10/19/21</a:t>
+              <a:t>10/24/21</a:t>
             </a:fld>
             <a:endParaRPr lang="en-US" dirty="0"/>
           </a:p>
@@ -4887,7 +4887,7 @@
           <a:p>
             <a:fld id="{3C633830-2244-49AE-BC4A-47F415C177C6}" type="datetimeFigureOut">
               <a:rPr lang="en-US" dirty="0"/>
-              <a:t>10/19/21</a:t>
+              <a:t>10/24/21</a:t>
             </a:fld>
             <a:endParaRPr lang="en-US" dirty="0"/>
           </a:p>
@@ -5306,7 +5306,7 @@
             <a:fld id="{3C633830-2244-49AE-BC4A-47F415C177C6}" type="datetimeFigureOut">
               <a:rPr lang="en-US" dirty="0"/>
               <a:pPr/>
-              <a:t>10/19/21</a:t>
+              <a:t>10/24/21</a:t>
             </a:fld>
             <a:endParaRPr lang="en-US" dirty="0"/>
           </a:p>
@@ -8874,10 +8874,10 @@
       </p:sp>
       <p:pic>
         <p:nvPicPr>
-          <p:cNvPr id="4" name="Content Placeholder 3" descr="Chart, bar chart&#10;&#10;Description automatically generated">
+          <p:cNvPr id="7" name="Content Placeholder 6" descr="Chart, bar chart&#10;&#10;Description automatically generated">
             <a:extLst>
               <a:ext uri="{FF2B5EF4-FFF2-40B4-BE49-F238E27FC236}">
-                <a16:creationId xmlns:a16="http://schemas.microsoft.com/office/drawing/2014/main" id="{6A3E329A-CC45-314C-9969-D4A52C45F9C8}"/>
+                <a16:creationId xmlns:a16="http://schemas.microsoft.com/office/drawing/2014/main" id="{2B30288C-2D54-034C-AAE6-B8E5D78C7D33}"/>
               </a:ext>
             </a:extLst>
           </p:cNvPr>
@@ -8896,12 +8896,9 @@
         </p:blipFill>
         <p:spPr>
           <a:xfrm>
-            <a:off x="4569025" y="847898"/>
-            <a:ext cx="6860975" cy="4679327"/>
+            <a:off x="5181600" y="1255801"/>
+            <a:ext cx="6248400" cy="4281311"/>
           </a:xfrm>
-          <a:prstGeom prst="rect">
-            <a:avLst/>
-          </a:prstGeom>
         </p:spPr>
       </p:pic>
     </p:spTree>

</xml_diff>